<commit_message>
Added section about orbits
</commit_message>
<xml_diff>
--- a/tex/figures/Gravity/Figures.pptx
+++ b/tex/figures/Gravity/Figures.pptx
@@ -9,6 +9,7 @@
     <p:sldId id="272" r:id="rId3"/>
     <p:sldId id="273" r:id="rId4"/>
     <p:sldId id="274" r:id="rId5"/>
+    <p:sldId id="275" r:id="rId6"/>
   </p:sldIdLst>
   <p:sldSz cx="12192000" cy="6858000"/>
   <p:notesSz cx="6858000" cy="9144000"/>
@@ -246,7 +247,7 @@
           <a:p>
             <a:fld id="{F7249F8D-641B-4CAF-BAE5-10524742F6F1}" type="datetimeFigureOut">
               <a:rPr lang="en-CA" smtClean="0"/>
-              <a:t>2018-06-19</a:t>
+              <a:t>2018-06-20</a:t>
             </a:fld>
             <a:endParaRPr lang="en-CA"/>
           </a:p>
@@ -416,7 +417,7 @@
           <a:p>
             <a:fld id="{F7249F8D-641B-4CAF-BAE5-10524742F6F1}" type="datetimeFigureOut">
               <a:rPr lang="en-CA" smtClean="0"/>
-              <a:t>2018-06-19</a:t>
+              <a:t>2018-06-20</a:t>
             </a:fld>
             <a:endParaRPr lang="en-CA"/>
           </a:p>
@@ -596,7 +597,7 @@
           <a:p>
             <a:fld id="{F7249F8D-641B-4CAF-BAE5-10524742F6F1}" type="datetimeFigureOut">
               <a:rPr lang="en-CA" smtClean="0"/>
-              <a:t>2018-06-19</a:t>
+              <a:t>2018-06-20</a:t>
             </a:fld>
             <a:endParaRPr lang="en-CA"/>
           </a:p>
@@ -766,7 +767,7 @@
           <a:p>
             <a:fld id="{F7249F8D-641B-4CAF-BAE5-10524742F6F1}" type="datetimeFigureOut">
               <a:rPr lang="en-CA" smtClean="0"/>
-              <a:t>2018-06-19</a:t>
+              <a:t>2018-06-20</a:t>
             </a:fld>
             <a:endParaRPr lang="en-CA"/>
           </a:p>
@@ -1012,7 +1013,7 @@
           <a:p>
             <a:fld id="{F7249F8D-641B-4CAF-BAE5-10524742F6F1}" type="datetimeFigureOut">
               <a:rPr lang="en-CA" smtClean="0"/>
-              <a:t>2018-06-19</a:t>
+              <a:t>2018-06-20</a:t>
             </a:fld>
             <a:endParaRPr lang="en-CA"/>
           </a:p>
@@ -1244,7 +1245,7 @@
           <a:p>
             <a:fld id="{F7249F8D-641B-4CAF-BAE5-10524742F6F1}" type="datetimeFigureOut">
               <a:rPr lang="en-CA" smtClean="0"/>
-              <a:t>2018-06-19</a:t>
+              <a:t>2018-06-20</a:t>
             </a:fld>
             <a:endParaRPr lang="en-CA"/>
           </a:p>
@@ -1611,7 +1612,7 @@
           <a:p>
             <a:fld id="{F7249F8D-641B-4CAF-BAE5-10524742F6F1}" type="datetimeFigureOut">
               <a:rPr lang="en-CA" smtClean="0"/>
-              <a:t>2018-06-19</a:t>
+              <a:t>2018-06-20</a:t>
             </a:fld>
             <a:endParaRPr lang="en-CA"/>
           </a:p>
@@ -1729,7 +1730,7 @@
           <a:p>
             <a:fld id="{F7249F8D-641B-4CAF-BAE5-10524742F6F1}" type="datetimeFigureOut">
               <a:rPr lang="en-CA" smtClean="0"/>
-              <a:t>2018-06-19</a:t>
+              <a:t>2018-06-20</a:t>
             </a:fld>
             <a:endParaRPr lang="en-CA"/>
           </a:p>
@@ -1824,7 +1825,7 @@
           <a:p>
             <a:fld id="{F7249F8D-641B-4CAF-BAE5-10524742F6F1}" type="datetimeFigureOut">
               <a:rPr lang="en-CA" smtClean="0"/>
-              <a:t>2018-06-19</a:t>
+              <a:t>2018-06-20</a:t>
             </a:fld>
             <a:endParaRPr lang="en-CA"/>
           </a:p>
@@ -2101,7 +2102,7 @@
           <a:p>
             <a:fld id="{F7249F8D-641B-4CAF-BAE5-10524742F6F1}" type="datetimeFigureOut">
               <a:rPr lang="en-CA" smtClean="0"/>
-              <a:t>2018-06-19</a:t>
+              <a:t>2018-06-20</a:t>
             </a:fld>
             <a:endParaRPr lang="en-CA"/>
           </a:p>
@@ -2354,7 +2355,7 @@
           <a:p>
             <a:fld id="{F7249F8D-641B-4CAF-BAE5-10524742F6F1}" type="datetimeFigureOut">
               <a:rPr lang="en-CA" smtClean="0"/>
-              <a:t>2018-06-19</a:t>
+              <a:t>2018-06-20</a:t>
             </a:fld>
             <a:endParaRPr lang="en-CA"/>
           </a:p>
@@ -2567,7 +2568,7 @@
           <a:p>
             <a:fld id="{F7249F8D-641B-4CAF-BAE5-10524742F6F1}" type="datetimeFigureOut">
               <a:rPr lang="en-CA" smtClean="0"/>
-              <a:t>2018-06-19</a:t>
+              <a:t>2018-06-20</a:t>
             </a:fld>
             <a:endParaRPr lang="en-CA"/>
           </a:p>
@@ -11112,8 +11113,8 @@
             </p:sp>
           </p:grpSp>
         </p:grpSp>
-        <mc:AlternateContent xmlns:mc="http://schemas.openxmlformats.org/markup-compatibility/2006">
-          <mc:Choice xmlns:a14="http://schemas.microsoft.com/office/drawing/2010/main" Requires="a14">
+        <mc:AlternateContent xmlns:mc="http://schemas.openxmlformats.org/markup-compatibility/2006" xmlns:a14="http://schemas.microsoft.com/office/drawing/2010/main">
+          <mc:Choice Requires="a14">
             <p:sp>
               <p:nvSpPr>
                 <p:cNvPr id="20" name="TextBox 19"/>
@@ -11136,6 +11137,7 @@
                 </a:bodyPr>
                 <a:lstStyle/>
                 <a:p>
+                  <a:pPr/>
                   <a14:m>
                     <m:oMathPara xmlns:m="http://schemas.openxmlformats.org/officeDocument/2006/math">
                       <m:oMathParaPr>
@@ -11174,7 +11176,7 @@
               </p:txBody>
             </p:sp>
           </mc:Choice>
-          <mc:Fallback>
+          <mc:Fallback xmlns="">
             <p:sp>
               <p:nvSpPr>
                 <p:cNvPr id="20" name="TextBox 19"/>
@@ -11549,8 +11551,8 @@
               </a:fontRef>
             </p:style>
           </p:cxnSp>
-          <mc:AlternateContent xmlns:mc="http://schemas.openxmlformats.org/markup-compatibility/2006">
-            <mc:Choice xmlns:a14="http://schemas.microsoft.com/office/drawing/2010/main" Requires="a14">
+          <mc:AlternateContent xmlns:mc="http://schemas.openxmlformats.org/markup-compatibility/2006" xmlns:a14="http://schemas.microsoft.com/office/drawing/2010/main">
+            <mc:Choice Requires="a14">
               <p:sp>
                 <p:nvSpPr>
                   <p:cNvPr id="35" name="TextBox 34"/>
@@ -11573,6 +11575,7 @@
                   </a:bodyPr>
                   <a:lstStyle/>
                   <a:p>
+                    <a:pPr/>
                     <a14:m>
                       <m:oMathPara xmlns:m="http://schemas.openxmlformats.org/officeDocument/2006/math">
                         <m:oMathParaPr>
@@ -11597,7 +11600,7 @@
                 </p:txBody>
               </p:sp>
             </mc:Choice>
-            <mc:Fallback>
+            <mc:Fallback xmlns="">
               <p:sp>
                 <p:nvSpPr>
                   <p:cNvPr id="35" name="TextBox 34"/>
@@ -11636,8 +11639,8 @@
               </p:sp>
             </mc:Fallback>
           </mc:AlternateContent>
-          <mc:AlternateContent xmlns:mc="http://schemas.openxmlformats.org/markup-compatibility/2006">
-            <mc:Choice xmlns:a14="http://schemas.microsoft.com/office/drawing/2010/main" Requires="a14">
+          <mc:AlternateContent xmlns:mc="http://schemas.openxmlformats.org/markup-compatibility/2006" xmlns:a14="http://schemas.microsoft.com/office/drawing/2010/main">
+            <mc:Choice Requires="a14">
               <p:sp>
                 <p:nvSpPr>
                   <p:cNvPr id="38" name="TextBox 37"/>
@@ -11660,6 +11663,7 @@
                   </a:bodyPr>
                   <a:lstStyle/>
                   <a:p>
+                    <a:pPr/>
                     <a14:m>
                       <m:oMathPara xmlns:m="http://schemas.openxmlformats.org/officeDocument/2006/math">
                         <m:oMathParaPr>
@@ -11731,7 +11735,7 @@
                 </p:txBody>
               </p:sp>
             </mc:Choice>
-            <mc:Fallback>
+            <mc:Fallback xmlns="">
               <p:sp>
                 <p:nvSpPr>
                   <p:cNvPr id="38" name="TextBox 37"/>
@@ -12061,8 +12065,8 @@
               </a:fontRef>
             </p:style>
           </p:cxnSp>
-          <mc:AlternateContent xmlns:mc="http://schemas.openxmlformats.org/markup-compatibility/2006">
-            <mc:Choice xmlns:a14="http://schemas.microsoft.com/office/drawing/2010/main" Requires="a14">
+          <mc:AlternateContent xmlns:mc="http://schemas.openxmlformats.org/markup-compatibility/2006" xmlns:a14="http://schemas.microsoft.com/office/drawing/2010/main">
+            <mc:Choice Requires="a14">
               <p:sp>
                 <p:nvSpPr>
                   <p:cNvPr id="51" name="TextBox 50"/>
@@ -12085,6 +12089,7 @@
                   </a:bodyPr>
                   <a:lstStyle/>
                   <a:p>
+                    <a:pPr/>
                     <a14:m>
                       <m:oMathPara xmlns:m="http://schemas.openxmlformats.org/officeDocument/2006/math">
                         <m:oMathParaPr>
@@ -12141,7 +12146,7 @@
                 </p:txBody>
               </p:sp>
             </mc:Choice>
-            <mc:Fallback>
+            <mc:Fallback xmlns="">
               <p:sp>
                 <p:nvSpPr>
                   <p:cNvPr id="51" name="TextBox 50"/>
@@ -12180,8 +12185,8 @@
               </p:sp>
             </mc:Fallback>
           </mc:AlternateContent>
-          <mc:AlternateContent xmlns:mc="http://schemas.openxmlformats.org/markup-compatibility/2006">
-            <mc:Choice xmlns:a14="http://schemas.microsoft.com/office/drawing/2010/main" Requires="a14">
+          <mc:AlternateContent xmlns:mc="http://schemas.openxmlformats.org/markup-compatibility/2006" xmlns:a14="http://schemas.microsoft.com/office/drawing/2010/main">
+            <mc:Choice Requires="a14">
               <p:sp>
                 <p:nvSpPr>
                   <p:cNvPr id="57" name="TextBox 56"/>
@@ -12204,6 +12209,7 @@
                   </a:bodyPr>
                   <a:lstStyle/>
                   <a:p>
+                    <a:pPr/>
                     <a14:m>
                       <m:oMathPara xmlns:m="http://schemas.openxmlformats.org/officeDocument/2006/math">
                         <m:oMathParaPr>
@@ -12228,7 +12234,7 @@
                 </p:txBody>
               </p:sp>
             </mc:Choice>
-            <mc:Fallback>
+            <mc:Fallback xmlns="">
               <p:sp>
                 <p:nvSpPr>
                   <p:cNvPr id="57" name="TextBox 56"/>
@@ -12268,8 +12274,8 @@
             </mc:Fallback>
           </mc:AlternateContent>
         </p:grpSp>
-        <mc:AlternateContent xmlns:mc="http://schemas.openxmlformats.org/markup-compatibility/2006">
-          <mc:Choice xmlns:a14="http://schemas.microsoft.com/office/drawing/2010/main" Requires="a14">
+        <mc:AlternateContent xmlns:mc="http://schemas.openxmlformats.org/markup-compatibility/2006" xmlns:a14="http://schemas.microsoft.com/office/drawing/2010/main">
+          <mc:Choice Requires="a14">
             <p:sp>
               <p:nvSpPr>
                 <p:cNvPr id="59" name="TextBox 58"/>
@@ -12292,6 +12298,7 @@
                 </a:bodyPr>
                 <a:lstStyle/>
                 <a:p>
+                  <a:pPr/>
                   <a14:m>
                     <m:oMathPara xmlns:m="http://schemas.openxmlformats.org/officeDocument/2006/math">
                       <m:oMathParaPr>
@@ -12330,7 +12337,7 @@
               </p:txBody>
             </p:sp>
           </mc:Choice>
-          <mc:Fallback>
+          <mc:Fallback xmlns="">
             <p:sp>
               <p:nvSpPr>
                 <p:cNvPr id="59" name="TextBox 58"/>
@@ -12729,8 +12736,8 @@
             </p:txBody>
           </p:sp>
         </p:grpSp>
-        <mc:AlternateContent xmlns:mc="http://schemas.openxmlformats.org/markup-compatibility/2006">
-          <mc:Choice xmlns:a14="http://schemas.microsoft.com/office/drawing/2010/main" Requires="a14">
+        <mc:AlternateContent xmlns:mc="http://schemas.openxmlformats.org/markup-compatibility/2006" xmlns:a14="http://schemas.microsoft.com/office/drawing/2010/main">
+          <mc:Choice Requires="a14">
             <p:sp>
               <p:nvSpPr>
                 <p:cNvPr id="70" name="TextBox 69"/>
@@ -12753,6 +12760,7 @@
                 </a:bodyPr>
                 <a:lstStyle/>
                 <a:p>
+                  <a:pPr/>
                   <a14:m>
                     <m:oMathPara xmlns:m="http://schemas.openxmlformats.org/officeDocument/2006/math">
                       <m:oMathParaPr>
@@ -12791,7 +12799,7 @@
               </p:txBody>
             </p:sp>
           </mc:Choice>
-          <mc:Fallback>
+          <mc:Fallback xmlns="">
             <p:sp>
               <p:nvSpPr>
                 <p:cNvPr id="70" name="TextBox 69"/>
@@ -12868,8 +12876,8 @@
             </a:fontRef>
           </p:style>
         </p:cxnSp>
-        <mc:AlternateContent xmlns:mc="http://schemas.openxmlformats.org/markup-compatibility/2006">
-          <mc:Choice xmlns:a14="http://schemas.microsoft.com/office/drawing/2010/main" Requires="a14">
+        <mc:AlternateContent xmlns:mc="http://schemas.openxmlformats.org/markup-compatibility/2006" xmlns:a14="http://schemas.microsoft.com/office/drawing/2010/main">
+          <mc:Choice Requires="a14">
             <p:sp>
               <p:nvSpPr>
                 <p:cNvPr id="72" name="TextBox 71"/>
@@ -12892,6 +12900,7 @@
                 </a:bodyPr>
                 <a:lstStyle/>
                 <a:p>
+                  <a:pPr/>
                   <a14:m>
                     <m:oMathPara xmlns:m="http://schemas.openxmlformats.org/officeDocument/2006/math">
                       <m:oMathParaPr>
@@ -12916,7 +12925,7 @@
               </p:txBody>
             </p:sp>
           </mc:Choice>
-          <mc:Fallback>
+          <mc:Fallback xmlns="">
             <p:sp>
               <p:nvSpPr>
                 <p:cNvPr id="72" name="TextBox 71"/>
@@ -12955,8 +12964,8 @@
             </p:sp>
           </mc:Fallback>
         </mc:AlternateContent>
-        <mc:AlternateContent xmlns:mc="http://schemas.openxmlformats.org/markup-compatibility/2006">
-          <mc:Choice xmlns:a14="http://schemas.microsoft.com/office/drawing/2010/main" Requires="a14">
+        <mc:AlternateContent xmlns:mc="http://schemas.openxmlformats.org/markup-compatibility/2006" xmlns:a14="http://schemas.microsoft.com/office/drawing/2010/main">
+          <mc:Choice Requires="a14">
             <p:sp>
               <p:nvSpPr>
                 <p:cNvPr id="74" name="TextBox 73"/>
@@ -12979,6 +12988,7 @@
                 </a:bodyPr>
                 <a:lstStyle/>
                 <a:p>
+                  <a:pPr/>
                   <a14:m>
                     <m:oMathPara xmlns:m="http://schemas.openxmlformats.org/officeDocument/2006/math">
                       <m:oMathParaPr>
@@ -13003,7 +13013,7 @@
               </p:txBody>
             </p:sp>
           </mc:Choice>
-          <mc:Fallback>
+          <mc:Fallback xmlns="">
             <p:sp>
               <p:nvSpPr>
                 <p:cNvPr id="74" name="TextBox 73"/>
@@ -13297,8 +13307,8 @@
             </a:p>
           </p:txBody>
         </p:sp>
-        <mc:AlternateContent xmlns:mc="http://schemas.openxmlformats.org/markup-compatibility/2006">
-          <mc:Choice xmlns:a14="http://schemas.microsoft.com/office/drawing/2010/main" Requires="a14">
+        <mc:AlternateContent xmlns:mc="http://schemas.openxmlformats.org/markup-compatibility/2006" xmlns:a14="http://schemas.microsoft.com/office/drawing/2010/main">
+          <mc:Choice Requires="a14">
             <p:sp>
               <p:nvSpPr>
                 <p:cNvPr id="78" name="TextBox 77"/>
@@ -13321,6 +13331,7 @@
                 </a:bodyPr>
                 <a:lstStyle/>
                 <a:p>
+                  <a:pPr/>
                   <a14:m>
                     <m:oMathPara xmlns:m="http://schemas.openxmlformats.org/officeDocument/2006/math">
                       <m:oMathParaPr>
@@ -13377,7 +13388,7 @@
               </p:txBody>
             </p:sp>
           </mc:Choice>
-          <mc:Fallback>
+          <mc:Fallback xmlns="">
             <p:sp>
               <p:nvSpPr>
                 <p:cNvPr id="78" name="TextBox 77"/>
@@ -13452,8 +13463,8 @@
             </a:fontRef>
           </p:style>
         </p:cxnSp>
-        <mc:AlternateContent xmlns:mc="http://schemas.openxmlformats.org/markup-compatibility/2006">
-          <mc:Choice xmlns:a14="http://schemas.microsoft.com/office/drawing/2010/main" Requires="a14">
+        <mc:AlternateContent xmlns:mc="http://schemas.openxmlformats.org/markup-compatibility/2006" xmlns:a14="http://schemas.microsoft.com/office/drawing/2010/main">
+          <mc:Choice Requires="a14">
             <p:sp>
               <p:nvSpPr>
                 <p:cNvPr id="81" name="TextBox 80"/>
@@ -13476,6 +13487,7 @@
                 </a:bodyPr>
                 <a:lstStyle/>
                 <a:p>
+                  <a:pPr/>
                   <a14:m>
                     <m:oMathPara xmlns:m="http://schemas.openxmlformats.org/officeDocument/2006/math">
                       <m:oMathParaPr>
@@ -13547,7 +13559,7 @@
               </p:txBody>
             </p:sp>
           </mc:Choice>
-          <mc:Fallback>
+          <mc:Fallback xmlns="">
             <p:sp>
               <p:nvSpPr>
                 <p:cNvPr id="81" name="TextBox 80"/>
@@ -13699,8 +13711,8 @@
               </a:fontRef>
             </p:style>
           </p:cxnSp>
-          <mc:AlternateContent xmlns:mc="http://schemas.openxmlformats.org/markup-compatibility/2006">
-            <mc:Choice xmlns:a14="http://schemas.microsoft.com/office/drawing/2010/main" Requires="a14">
+          <mc:AlternateContent xmlns:mc="http://schemas.openxmlformats.org/markup-compatibility/2006" xmlns:a14="http://schemas.microsoft.com/office/drawing/2010/main">
+            <mc:Choice Requires="a14">
               <p:sp>
                 <p:nvSpPr>
                   <p:cNvPr id="86" name="TextBox 85"/>
@@ -13723,6 +13735,7 @@
                   </a:bodyPr>
                   <a:lstStyle/>
                   <a:p>
+                    <a:pPr/>
                     <a14:m>
                       <m:oMathPara xmlns:m="http://schemas.openxmlformats.org/officeDocument/2006/math">
                         <m:oMathParaPr>
@@ -13747,7 +13760,7 @@
                 </p:txBody>
               </p:sp>
             </mc:Choice>
-            <mc:Fallback>
+            <mc:Fallback xmlns="">
               <p:sp>
                 <p:nvSpPr>
                   <p:cNvPr id="86" name="TextBox 85"/>
@@ -13821,8 +13834,8 @@
               </a:fontRef>
             </p:style>
           </p:cxnSp>
-          <mc:AlternateContent xmlns:mc="http://schemas.openxmlformats.org/markup-compatibility/2006">
-            <mc:Choice xmlns:a14="http://schemas.microsoft.com/office/drawing/2010/main" Requires="a14">
+          <mc:AlternateContent xmlns:mc="http://schemas.openxmlformats.org/markup-compatibility/2006" xmlns:a14="http://schemas.microsoft.com/office/drawing/2010/main">
+            <mc:Choice Requires="a14">
               <p:sp>
                 <p:nvSpPr>
                   <p:cNvPr id="88" name="TextBox 87"/>
@@ -13845,6 +13858,7 @@
                   </a:bodyPr>
                   <a:lstStyle/>
                   <a:p>
+                    <a:pPr/>
                     <a14:m>
                       <m:oMathPara xmlns:m="http://schemas.openxmlformats.org/officeDocument/2006/math">
                         <m:oMathParaPr>
@@ -13869,7 +13883,7 @@
                 </p:txBody>
               </p:sp>
             </mc:Choice>
-            <mc:Fallback>
+            <mc:Fallback xmlns="">
               <p:sp>
                 <p:nvSpPr>
                   <p:cNvPr id="88" name="TextBox 87"/>
@@ -13978,8 +13992,8 @@
               </a:fontRef>
             </p:style>
           </p:cxnSp>
-          <mc:AlternateContent xmlns:mc="http://schemas.openxmlformats.org/markup-compatibility/2006">
-            <mc:Choice xmlns:a14="http://schemas.microsoft.com/office/drawing/2010/main" Requires="a14">
+          <mc:AlternateContent xmlns:mc="http://schemas.openxmlformats.org/markup-compatibility/2006" xmlns:a14="http://schemas.microsoft.com/office/drawing/2010/main">
+            <mc:Choice Requires="a14">
               <p:sp>
                 <p:nvSpPr>
                   <p:cNvPr id="92" name="TextBox 91"/>
@@ -14002,6 +14016,7 @@
                   </a:bodyPr>
                   <a:lstStyle/>
                   <a:p>
+                    <a:pPr/>
                     <a14:m>
                       <m:oMathPara xmlns:m="http://schemas.openxmlformats.org/officeDocument/2006/math">
                         <m:oMathParaPr>
@@ -14047,7 +14062,7 @@
                 </p:txBody>
               </p:sp>
             </mc:Choice>
-            <mc:Fallback>
+            <mc:Fallback xmlns="">
               <p:sp>
                 <p:nvSpPr>
                   <p:cNvPr id="92" name="TextBox 91"/>
@@ -14086,8 +14101,8 @@
               </p:sp>
             </mc:Fallback>
           </mc:AlternateContent>
-          <mc:AlternateContent xmlns:mc="http://schemas.openxmlformats.org/markup-compatibility/2006">
-            <mc:Choice xmlns:a14="http://schemas.microsoft.com/office/drawing/2010/main" Requires="a14">
+          <mc:AlternateContent xmlns:mc="http://schemas.openxmlformats.org/markup-compatibility/2006" xmlns:a14="http://schemas.microsoft.com/office/drawing/2010/main">
+            <mc:Choice Requires="a14">
               <p:sp>
                 <p:nvSpPr>
                   <p:cNvPr id="93" name="TextBox 92"/>
@@ -14110,6 +14125,7 @@
                   </a:bodyPr>
                   <a:lstStyle/>
                   <a:p>
+                    <a:pPr/>
                     <a14:m>
                       <m:oMathPara xmlns:m="http://schemas.openxmlformats.org/officeDocument/2006/math">
                         <m:oMathParaPr>
@@ -14155,7 +14171,7 @@
                 </p:txBody>
               </p:sp>
             </mc:Choice>
-            <mc:Fallback>
+            <mc:Fallback xmlns="">
               <p:sp>
                 <p:nvSpPr>
                   <p:cNvPr id="93" name="TextBox 92"/>
@@ -14230,8 +14246,8 @@
               </a:fontRef>
             </p:style>
           </p:cxnSp>
-          <mc:AlternateContent xmlns:mc="http://schemas.openxmlformats.org/markup-compatibility/2006">
-            <mc:Choice xmlns:a14="http://schemas.microsoft.com/office/drawing/2010/main" Requires="a14">
+          <mc:AlternateContent xmlns:mc="http://schemas.openxmlformats.org/markup-compatibility/2006" xmlns:a14="http://schemas.microsoft.com/office/drawing/2010/main">
+            <mc:Choice Requires="a14">
               <p:sp>
                 <p:nvSpPr>
                   <p:cNvPr id="96" name="TextBox 95"/>
@@ -14254,6 +14270,7 @@
                   </a:bodyPr>
                   <a:lstStyle/>
                   <a:p>
+                    <a:pPr/>
                     <a14:m>
                       <m:oMathPara xmlns:m="http://schemas.openxmlformats.org/officeDocument/2006/math">
                         <m:oMathParaPr>
@@ -14312,7 +14329,7 @@
                 </p:txBody>
               </p:sp>
             </mc:Choice>
-            <mc:Fallback>
+            <mc:Fallback xmlns="">
               <p:sp>
                 <p:nvSpPr>
                   <p:cNvPr id="96" name="TextBox 95"/>
@@ -14400,8 +14417,8 @@
             </a:p>
           </p:txBody>
         </p:sp>
-        <mc:AlternateContent xmlns:mc="http://schemas.openxmlformats.org/markup-compatibility/2006">
-          <mc:Choice xmlns:a14="http://schemas.microsoft.com/office/drawing/2010/main" Requires="a14">
+        <mc:AlternateContent xmlns:mc="http://schemas.openxmlformats.org/markup-compatibility/2006" xmlns:a14="http://schemas.microsoft.com/office/drawing/2010/main">
+          <mc:Choice Requires="a14">
             <p:sp>
               <p:nvSpPr>
                 <p:cNvPr id="100" name="TextBox 99"/>
@@ -14424,6 +14441,7 @@
                 </a:bodyPr>
                 <a:lstStyle/>
                 <a:p>
+                  <a:pPr/>
                   <a14:m>
                     <m:oMathPara xmlns:m="http://schemas.openxmlformats.org/officeDocument/2006/math">
                       <m:oMathParaPr>
@@ -14448,7 +14466,7 @@
               </p:txBody>
             </p:sp>
           </mc:Choice>
-          <mc:Fallback>
+          <mc:Fallback xmlns="">
             <p:sp>
               <p:nvSpPr>
                 <p:cNvPr id="100" name="TextBox 99"/>
@@ -14487,8 +14505,8 @@
             </p:sp>
           </mc:Fallback>
         </mc:AlternateContent>
-        <mc:AlternateContent xmlns:mc="http://schemas.openxmlformats.org/markup-compatibility/2006">
-          <mc:Choice xmlns:a14="http://schemas.microsoft.com/office/drawing/2010/main" Requires="a14">
+        <mc:AlternateContent xmlns:mc="http://schemas.openxmlformats.org/markup-compatibility/2006" xmlns:a14="http://schemas.microsoft.com/office/drawing/2010/main">
+          <mc:Choice Requires="a14">
             <p:sp>
               <p:nvSpPr>
                 <p:cNvPr id="101" name="TextBox 100"/>
@@ -14511,6 +14529,7 @@
                 </a:bodyPr>
                 <a:lstStyle/>
                 <a:p>
+                  <a:pPr/>
                   <a14:m>
                     <m:oMathPara xmlns:m="http://schemas.openxmlformats.org/officeDocument/2006/math">
                       <m:oMathParaPr>
@@ -14535,7 +14554,7 @@
               </p:txBody>
             </p:sp>
           </mc:Choice>
-          <mc:Fallback>
+          <mc:Fallback xmlns="">
             <p:sp>
               <p:nvSpPr>
                 <p:cNvPr id="101" name="TextBox 100"/>
@@ -14579,6 +14598,1431 @@
     <p:extLst>
       <p:ext uri="{BB962C8B-B14F-4D97-AF65-F5344CB8AC3E}">
         <p14:creationId xmlns:p14="http://schemas.microsoft.com/office/powerpoint/2010/main" val="277899403"/>
+      </p:ext>
+    </p:extLst>
+  </p:cSld>
+  <p:clrMapOvr>
+    <a:masterClrMapping/>
+  </p:clrMapOvr>
+</p:sld>
+</file>
+
+<file path=ppt/slides/slide5.xml><?xml version="1.0" encoding="utf-8"?>
+<p:sld xmlns:a="http://schemas.openxmlformats.org/drawingml/2006/main" xmlns:r="http://schemas.openxmlformats.org/officeDocument/2006/relationships" xmlns:p="http://schemas.openxmlformats.org/presentationml/2006/main">
+  <p:cSld>
+    <p:spTree>
+      <p:nvGrpSpPr>
+        <p:cNvPr id="1" name=""/>
+        <p:cNvGrpSpPr/>
+        <p:nvPr/>
+      </p:nvGrpSpPr>
+      <p:grpSpPr>
+        <a:xfrm>
+          <a:off x="0" y="0"/>
+          <a:ext cx="0" cy="0"/>
+          <a:chOff x="0" y="0"/>
+          <a:chExt cx="0" cy="0"/>
+        </a:xfrm>
+      </p:grpSpPr>
+      <p:grpSp>
+        <p:nvGrpSpPr>
+          <p:cNvPr id="27" name="Group 26"/>
+          <p:cNvGrpSpPr/>
+          <p:nvPr/>
+        </p:nvGrpSpPr>
+        <p:grpSpPr>
+          <a:xfrm>
+            <a:off x="878969" y="194358"/>
+            <a:ext cx="6011310" cy="6123315"/>
+            <a:chOff x="878969" y="194358"/>
+            <a:chExt cx="6011310" cy="6123315"/>
+          </a:xfrm>
+        </p:grpSpPr>
+        <p:grpSp>
+          <p:nvGrpSpPr>
+            <p:cNvPr id="25" name="Group 24"/>
+            <p:cNvGrpSpPr/>
+            <p:nvPr/>
+          </p:nvGrpSpPr>
+          <p:grpSpPr>
+            <a:xfrm>
+              <a:off x="878969" y="512618"/>
+              <a:ext cx="6011310" cy="5805055"/>
+              <a:chOff x="1086787" y="207818"/>
+              <a:chExt cx="6011310" cy="5805055"/>
+            </a:xfrm>
+          </p:grpSpPr>
+          <p:grpSp>
+            <p:nvGrpSpPr>
+              <p:cNvPr id="8" name="Group 7"/>
+              <p:cNvGrpSpPr/>
+              <p:nvPr/>
+            </p:nvGrpSpPr>
+            <p:grpSpPr>
+              <a:xfrm>
+                <a:off x="1086787" y="1233055"/>
+                <a:ext cx="6011310" cy="3759970"/>
+                <a:chOff x="6464716" y="466283"/>
+                <a:chExt cx="5262880" cy="3291840"/>
+              </a:xfrm>
+            </p:grpSpPr>
+            <p:sp>
+              <p:nvSpPr>
+                <p:cNvPr id="14" name="Oval 13"/>
+                <p:cNvSpPr/>
+                <p:nvPr/>
+              </p:nvSpPr>
+              <p:spPr>
+                <a:xfrm>
+                  <a:off x="6464716" y="466283"/>
+                  <a:ext cx="5262880" cy="3291840"/>
+                </a:xfrm>
+                <a:prstGeom prst="ellipse">
+                  <a:avLst/>
+                </a:prstGeom>
+                <a:noFill/>
+                <a:ln w="38100">
+                  <a:solidFill>
+                    <a:schemeClr val="tx1"/>
+                  </a:solidFill>
+                </a:ln>
+              </p:spPr>
+              <p:style>
+                <a:lnRef idx="2">
+                  <a:schemeClr val="accent1">
+                    <a:shade val="50000"/>
+                  </a:schemeClr>
+                </a:lnRef>
+                <a:fillRef idx="1">
+                  <a:schemeClr val="accent1"/>
+                </a:fillRef>
+                <a:effectRef idx="0">
+                  <a:schemeClr val="accent1"/>
+                </a:effectRef>
+                <a:fontRef idx="minor">
+                  <a:schemeClr val="lt1"/>
+                </a:fontRef>
+              </p:style>
+              <p:txBody>
+                <a:bodyPr rtlCol="0" anchor="ctr"/>
+                <a:lstStyle/>
+                <a:p>
+                  <a:pPr algn="ctr"/>
+                  <a:endParaRPr lang="en-US"/>
+                </a:p>
+              </p:txBody>
+            </p:sp>
+            <p:sp>
+              <p:nvSpPr>
+                <p:cNvPr id="17" name="Oval 16"/>
+                <p:cNvSpPr/>
+                <p:nvPr/>
+              </p:nvSpPr>
+              <p:spPr>
+                <a:xfrm>
+                  <a:off x="11114047" y="2064450"/>
+                  <a:ext cx="120943" cy="119766"/>
+                </a:xfrm>
+                <a:prstGeom prst="ellipse">
+                  <a:avLst/>
+                </a:prstGeom>
+                <a:solidFill>
+                  <a:schemeClr val="tx1"/>
+                </a:solidFill>
+                <a:ln w="38100">
+                  <a:solidFill>
+                    <a:schemeClr val="tx1"/>
+                  </a:solidFill>
+                </a:ln>
+              </p:spPr>
+              <p:style>
+                <a:lnRef idx="2">
+                  <a:schemeClr val="accent1">
+                    <a:shade val="50000"/>
+                  </a:schemeClr>
+                </a:lnRef>
+                <a:fillRef idx="1">
+                  <a:schemeClr val="accent1"/>
+                </a:fillRef>
+                <a:effectRef idx="0">
+                  <a:schemeClr val="accent1"/>
+                </a:effectRef>
+                <a:fontRef idx="minor">
+                  <a:schemeClr val="lt1"/>
+                </a:fontRef>
+              </p:style>
+              <p:txBody>
+                <a:bodyPr rtlCol="0" anchor="ctr"/>
+                <a:lstStyle/>
+                <a:p>
+                  <a:pPr algn="ctr"/>
+                  <a:endParaRPr lang="en-US"/>
+                </a:p>
+              </p:txBody>
+            </p:sp>
+          </p:grpSp>
+          <p:sp>
+            <p:nvSpPr>
+              <p:cNvPr id="6" name="TextBox 5"/>
+              <p:cNvSpPr txBox="1"/>
+              <p:nvPr/>
+            </p:nvSpPr>
+            <p:spPr>
+              <a:xfrm>
+                <a:off x="3791794" y="855030"/>
+                <a:ext cx="65" cy="615553"/>
+              </a:xfrm>
+              <a:prstGeom prst="rect">
+                <a:avLst/>
+              </a:prstGeom>
+              <a:noFill/>
+            </p:spPr>
+            <p:txBody>
+              <a:bodyPr wrap="none" lIns="0" tIns="0" rIns="0" bIns="0" rtlCol="0">
+                <a:spAutoFit/>
+              </a:bodyPr>
+              <a:lstStyle/>
+              <a:p>
+                <a:pPr/>
+                <a:endParaRPr lang="en-US" sz="2000" b="0" dirty="0" smtClean="0">
+                  <a:latin typeface="Arial" panose="020B0604020202020204" pitchFamily="34" charset="0"/>
+                  <a:cs typeface="Arial" panose="020B0604020202020204" pitchFamily="34" charset="0"/>
+                </a:endParaRPr>
+              </a:p>
+              <a:p>
+                <a:pPr/>
+                <a:endParaRPr lang="en-US" sz="2000" dirty="0" smtClean="0">
+                  <a:latin typeface="Arial" panose="020B0604020202020204" pitchFamily="34" charset="0"/>
+                  <a:cs typeface="Arial" panose="020B0604020202020204" pitchFamily="34" charset="0"/>
+                </a:endParaRPr>
+              </a:p>
+            </p:txBody>
+          </p:sp>
+          <mc:AlternateContent xmlns:mc="http://schemas.openxmlformats.org/markup-compatibility/2006">
+            <mc:Choice xmlns:a14="http://schemas.microsoft.com/office/drawing/2010/main" Requires="a14">
+              <p:sp>
+                <p:nvSpPr>
+                  <p:cNvPr id="7" name="TextBox 6"/>
+                  <p:cNvSpPr txBox="1"/>
+                  <p:nvPr/>
+                </p:nvSpPr>
+                <p:spPr>
+                  <a:xfrm>
+                    <a:off x="5862680" y="2866371"/>
+                    <a:ext cx="598848" cy="369332"/>
+                  </a:xfrm>
+                  <a:prstGeom prst="rect">
+                    <a:avLst/>
+                  </a:prstGeom>
+                  <a:noFill/>
+                </p:spPr>
+                <p:txBody>
+                  <a:bodyPr wrap="square" lIns="0" tIns="0" rIns="0" bIns="0" rtlCol="0">
+                    <a:spAutoFit/>
+                  </a:bodyPr>
+                  <a:lstStyle/>
+                  <a:p>
+                    <a:pPr/>
+                    <a14:m>
+                      <m:oMathPara xmlns:m="http://schemas.openxmlformats.org/officeDocument/2006/math">
+                        <m:oMathParaPr>
+                          <m:jc m:val="centerGroup"/>
+                        </m:oMathParaPr>
+                        <m:oMath xmlns:m="http://schemas.openxmlformats.org/officeDocument/2006/math">
+                          <m:r>
+                            <a:rPr lang="en-US" sz="2400" b="0" i="1" smtClean="0">
+                              <a:latin typeface="Cambria Math" panose="02040503050406030204" pitchFamily="18" charset="0"/>
+                              <a:cs typeface="Arial" panose="020B0604020202020204" pitchFamily="34" charset="0"/>
+                            </a:rPr>
+                            <m:t>𝑀</m:t>
+                          </m:r>
+                        </m:oMath>
+                      </m:oMathPara>
+                    </a14:m>
+                    <a:endParaRPr lang="en-US" sz="2400" dirty="0" smtClean="0">
+                      <a:latin typeface="Arial" panose="020B0604020202020204" pitchFamily="34" charset="0"/>
+                      <a:cs typeface="Arial" panose="020B0604020202020204" pitchFamily="34" charset="0"/>
+                    </a:endParaRPr>
+                  </a:p>
+                </p:txBody>
+              </p:sp>
+            </mc:Choice>
+            <mc:Fallback>
+              <p:sp>
+                <p:nvSpPr>
+                  <p:cNvPr id="7" name="TextBox 6"/>
+                  <p:cNvSpPr txBox="1">
+                    <a:spLocks noRot="1" noChangeAspect="1" noMove="1" noResize="1" noEditPoints="1" noAdjustHandles="1" noChangeArrowheads="1" noChangeShapeType="1" noTextEdit="1"/>
+                  </p:cNvSpPr>
+                  <p:nvPr/>
+                </p:nvSpPr>
+                <p:spPr>
+                  <a:xfrm>
+                    <a:off x="5862680" y="2866371"/>
+                    <a:ext cx="598848" cy="369332"/>
+                  </a:xfrm>
+                  <a:prstGeom prst="rect">
+                    <a:avLst/>
+                  </a:prstGeom>
+                  <a:blipFill>
+                    <a:blip r:embed="rId2"/>
+                    <a:stretch>
+                      <a:fillRect b="-9836"/>
+                    </a:stretch>
+                  </a:blipFill>
+                </p:spPr>
+                <p:txBody>
+                  <a:bodyPr/>
+                  <a:lstStyle/>
+                  <a:p>
+                    <a:r>
+                      <a:rPr lang="en-US">
+                        <a:noFill/>
+                      </a:rPr>
+                      <a:t> </a:t>
+                    </a:r>
+                  </a:p>
+                </p:txBody>
+              </p:sp>
+            </mc:Fallback>
+          </mc:AlternateContent>
+          <p:sp>
+            <p:nvSpPr>
+              <p:cNvPr id="18" name="Oval 17"/>
+              <p:cNvSpPr/>
+              <p:nvPr/>
+            </p:nvSpPr>
+            <p:spPr>
+              <a:xfrm>
+                <a:off x="5866185" y="2547557"/>
+                <a:ext cx="1207025" cy="1207025"/>
+              </a:xfrm>
+              <a:prstGeom prst="ellipse">
+                <a:avLst/>
+              </a:prstGeom>
+              <a:noFill/>
+              <a:ln w="38100">
+                <a:solidFill>
+                  <a:schemeClr val="tx1"/>
+                </a:solidFill>
+              </a:ln>
+            </p:spPr>
+            <p:style>
+              <a:lnRef idx="2">
+                <a:schemeClr val="accent1">
+                  <a:shade val="50000"/>
+                </a:schemeClr>
+              </a:lnRef>
+              <a:fillRef idx="1">
+                <a:schemeClr val="accent1"/>
+              </a:fillRef>
+              <a:effectRef idx="0">
+                <a:schemeClr val="accent1"/>
+              </a:effectRef>
+              <a:fontRef idx="minor">
+                <a:schemeClr val="lt1"/>
+              </a:fontRef>
+            </p:style>
+            <p:txBody>
+              <a:bodyPr rtlCol="0" anchor="ctr"/>
+              <a:lstStyle/>
+              <a:p>
+                <a:pPr algn="ctr"/>
+                <a:endParaRPr lang="en-US"/>
+              </a:p>
+            </p:txBody>
+          </p:sp>
+          <p:grpSp>
+            <p:nvGrpSpPr>
+              <p:cNvPr id="24" name="Group 23"/>
+              <p:cNvGrpSpPr/>
+              <p:nvPr/>
+            </p:nvGrpSpPr>
+            <p:grpSpPr>
+              <a:xfrm>
+                <a:off x="4094741" y="263236"/>
+                <a:ext cx="2997109" cy="5606508"/>
+                <a:chOff x="4142509" y="263236"/>
+                <a:chExt cx="2997109" cy="5606508"/>
+              </a:xfrm>
+            </p:grpSpPr>
+            <p:sp>
+              <p:nvSpPr>
+                <p:cNvPr id="20" name="Freeform 19"/>
+                <p:cNvSpPr/>
+                <p:nvPr/>
+              </p:nvSpPr>
+              <p:spPr>
+                <a:xfrm>
+                  <a:off x="4142509" y="263236"/>
+                  <a:ext cx="2997109" cy="2881745"/>
+                </a:xfrm>
+                <a:custGeom>
+                  <a:avLst/>
+                  <a:gdLst>
+                    <a:gd name="connsiteX0" fmla="*/ 0 w 2997109"/>
+                    <a:gd name="connsiteY0" fmla="*/ 0 h 2881745"/>
+                    <a:gd name="connsiteX1" fmla="*/ 304800 w 2997109"/>
+                    <a:gd name="connsiteY1" fmla="*/ 138545 h 2881745"/>
+                    <a:gd name="connsiteX2" fmla="*/ 568036 w 2997109"/>
+                    <a:gd name="connsiteY2" fmla="*/ 290945 h 2881745"/>
+                    <a:gd name="connsiteX3" fmla="*/ 914400 w 2997109"/>
+                    <a:gd name="connsiteY3" fmla="*/ 471054 h 2881745"/>
+                    <a:gd name="connsiteX4" fmla="*/ 1149927 w 2997109"/>
+                    <a:gd name="connsiteY4" fmla="*/ 623454 h 2881745"/>
+                    <a:gd name="connsiteX5" fmla="*/ 1385454 w 2997109"/>
+                    <a:gd name="connsiteY5" fmla="*/ 762000 h 2881745"/>
+                    <a:gd name="connsiteX6" fmla="*/ 1870363 w 2997109"/>
+                    <a:gd name="connsiteY6" fmla="*/ 1108364 h 2881745"/>
+                    <a:gd name="connsiteX7" fmla="*/ 2105891 w 2997109"/>
+                    <a:gd name="connsiteY7" fmla="*/ 1330036 h 2881745"/>
+                    <a:gd name="connsiteX8" fmla="*/ 2313709 w 2997109"/>
+                    <a:gd name="connsiteY8" fmla="*/ 1482436 h 2881745"/>
+                    <a:gd name="connsiteX9" fmla="*/ 2563091 w 2997109"/>
+                    <a:gd name="connsiteY9" fmla="*/ 1801091 h 2881745"/>
+                    <a:gd name="connsiteX10" fmla="*/ 2770909 w 2997109"/>
+                    <a:gd name="connsiteY10" fmla="*/ 2105891 h 2881745"/>
+                    <a:gd name="connsiteX11" fmla="*/ 2909454 w 2997109"/>
+                    <a:gd name="connsiteY11" fmla="*/ 2396836 h 2881745"/>
+                    <a:gd name="connsiteX12" fmla="*/ 2992581 w 2997109"/>
+                    <a:gd name="connsiteY12" fmla="*/ 2757054 h 2881745"/>
+                    <a:gd name="connsiteX13" fmla="*/ 2978727 w 2997109"/>
+                    <a:gd name="connsiteY13" fmla="*/ 2881745 h 2881745"/>
+                    <a:gd name="connsiteX0" fmla="*/ 0 w 2997109"/>
+                    <a:gd name="connsiteY0" fmla="*/ 0 h 2881745"/>
+                    <a:gd name="connsiteX1" fmla="*/ 304800 w 2997109"/>
+                    <a:gd name="connsiteY1" fmla="*/ 138545 h 2881745"/>
+                    <a:gd name="connsiteX2" fmla="*/ 568036 w 2997109"/>
+                    <a:gd name="connsiteY2" fmla="*/ 290945 h 2881745"/>
+                    <a:gd name="connsiteX3" fmla="*/ 914400 w 2997109"/>
+                    <a:gd name="connsiteY3" fmla="*/ 471054 h 2881745"/>
+                    <a:gd name="connsiteX4" fmla="*/ 1149927 w 2997109"/>
+                    <a:gd name="connsiteY4" fmla="*/ 623454 h 2881745"/>
+                    <a:gd name="connsiteX5" fmla="*/ 1385454 w 2997109"/>
+                    <a:gd name="connsiteY5" fmla="*/ 762000 h 2881745"/>
+                    <a:gd name="connsiteX6" fmla="*/ 1870363 w 2997109"/>
+                    <a:gd name="connsiteY6" fmla="*/ 1108364 h 2881745"/>
+                    <a:gd name="connsiteX7" fmla="*/ 2133601 w 2997109"/>
+                    <a:gd name="connsiteY7" fmla="*/ 1330036 h 2881745"/>
+                    <a:gd name="connsiteX8" fmla="*/ 2313709 w 2997109"/>
+                    <a:gd name="connsiteY8" fmla="*/ 1482436 h 2881745"/>
+                    <a:gd name="connsiteX9" fmla="*/ 2563091 w 2997109"/>
+                    <a:gd name="connsiteY9" fmla="*/ 1801091 h 2881745"/>
+                    <a:gd name="connsiteX10" fmla="*/ 2770909 w 2997109"/>
+                    <a:gd name="connsiteY10" fmla="*/ 2105891 h 2881745"/>
+                    <a:gd name="connsiteX11" fmla="*/ 2909454 w 2997109"/>
+                    <a:gd name="connsiteY11" fmla="*/ 2396836 h 2881745"/>
+                    <a:gd name="connsiteX12" fmla="*/ 2992581 w 2997109"/>
+                    <a:gd name="connsiteY12" fmla="*/ 2757054 h 2881745"/>
+                    <a:gd name="connsiteX13" fmla="*/ 2978727 w 2997109"/>
+                    <a:gd name="connsiteY13" fmla="*/ 2881745 h 2881745"/>
+                    <a:gd name="connsiteX0" fmla="*/ 0 w 2997109"/>
+                    <a:gd name="connsiteY0" fmla="*/ 0 h 2881745"/>
+                    <a:gd name="connsiteX1" fmla="*/ 304800 w 2997109"/>
+                    <a:gd name="connsiteY1" fmla="*/ 138545 h 2881745"/>
+                    <a:gd name="connsiteX2" fmla="*/ 568036 w 2997109"/>
+                    <a:gd name="connsiteY2" fmla="*/ 290945 h 2881745"/>
+                    <a:gd name="connsiteX3" fmla="*/ 914400 w 2997109"/>
+                    <a:gd name="connsiteY3" fmla="*/ 471054 h 2881745"/>
+                    <a:gd name="connsiteX4" fmla="*/ 1149927 w 2997109"/>
+                    <a:gd name="connsiteY4" fmla="*/ 623454 h 2881745"/>
+                    <a:gd name="connsiteX5" fmla="*/ 1385454 w 2997109"/>
+                    <a:gd name="connsiteY5" fmla="*/ 762000 h 2881745"/>
+                    <a:gd name="connsiteX6" fmla="*/ 1870363 w 2997109"/>
+                    <a:gd name="connsiteY6" fmla="*/ 1108364 h 2881745"/>
+                    <a:gd name="connsiteX7" fmla="*/ 2133601 w 2997109"/>
+                    <a:gd name="connsiteY7" fmla="*/ 1330036 h 2881745"/>
+                    <a:gd name="connsiteX8" fmla="*/ 2355272 w 2997109"/>
+                    <a:gd name="connsiteY8" fmla="*/ 1551709 h 2881745"/>
+                    <a:gd name="connsiteX9" fmla="*/ 2563091 w 2997109"/>
+                    <a:gd name="connsiteY9" fmla="*/ 1801091 h 2881745"/>
+                    <a:gd name="connsiteX10" fmla="*/ 2770909 w 2997109"/>
+                    <a:gd name="connsiteY10" fmla="*/ 2105891 h 2881745"/>
+                    <a:gd name="connsiteX11" fmla="*/ 2909454 w 2997109"/>
+                    <a:gd name="connsiteY11" fmla="*/ 2396836 h 2881745"/>
+                    <a:gd name="connsiteX12" fmla="*/ 2992581 w 2997109"/>
+                    <a:gd name="connsiteY12" fmla="*/ 2757054 h 2881745"/>
+                    <a:gd name="connsiteX13" fmla="*/ 2978727 w 2997109"/>
+                    <a:gd name="connsiteY13" fmla="*/ 2881745 h 2881745"/>
+                  </a:gdLst>
+                  <a:ahLst/>
+                  <a:cxnLst>
+                    <a:cxn ang="0">
+                      <a:pos x="connsiteX0" y="connsiteY0"/>
+                    </a:cxn>
+                    <a:cxn ang="0">
+                      <a:pos x="connsiteX1" y="connsiteY1"/>
+                    </a:cxn>
+                    <a:cxn ang="0">
+                      <a:pos x="connsiteX2" y="connsiteY2"/>
+                    </a:cxn>
+                    <a:cxn ang="0">
+                      <a:pos x="connsiteX3" y="connsiteY3"/>
+                    </a:cxn>
+                    <a:cxn ang="0">
+                      <a:pos x="connsiteX4" y="connsiteY4"/>
+                    </a:cxn>
+                    <a:cxn ang="0">
+                      <a:pos x="connsiteX5" y="connsiteY5"/>
+                    </a:cxn>
+                    <a:cxn ang="0">
+                      <a:pos x="connsiteX6" y="connsiteY6"/>
+                    </a:cxn>
+                    <a:cxn ang="0">
+                      <a:pos x="connsiteX7" y="connsiteY7"/>
+                    </a:cxn>
+                    <a:cxn ang="0">
+                      <a:pos x="connsiteX8" y="connsiteY8"/>
+                    </a:cxn>
+                    <a:cxn ang="0">
+                      <a:pos x="connsiteX9" y="connsiteY9"/>
+                    </a:cxn>
+                    <a:cxn ang="0">
+                      <a:pos x="connsiteX10" y="connsiteY10"/>
+                    </a:cxn>
+                    <a:cxn ang="0">
+                      <a:pos x="connsiteX11" y="connsiteY11"/>
+                    </a:cxn>
+                    <a:cxn ang="0">
+                      <a:pos x="connsiteX12" y="connsiteY12"/>
+                    </a:cxn>
+                    <a:cxn ang="0">
+                      <a:pos x="connsiteX13" y="connsiteY13"/>
+                    </a:cxn>
+                  </a:cxnLst>
+                  <a:rect l="l" t="t" r="r" b="b"/>
+                  <a:pathLst>
+                    <a:path w="2997109" h="2881745">
+                      <a:moveTo>
+                        <a:pt x="0" y="0"/>
+                      </a:moveTo>
+                      <a:cubicBezTo>
+                        <a:pt x="105063" y="45027"/>
+                        <a:pt x="210127" y="90054"/>
+                        <a:pt x="304800" y="138545"/>
+                      </a:cubicBezTo>
+                      <a:cubicBezTo>
+                        <a:pt x="399473" y="187036"/>
+                        <a:pt x="466436" y="235527"/>
+                        <a:pt x="568036" y="290945"/>
+                      </a:cubicBezTo>
+                      <a:cubicBezTo>
+                        <a:pt x="669636" y="346363"/>
+                        <a:pt x="817418" y="415636"/>
+                        <a:pt x="914400" y="471054"/>
+                      </a:cubicBezTo>
+                      <a:cubicBezTo>
+                        <a:pt x="1011382" y="526472"/>
+                        <a:pt x="1071418" y="574963"/>
+                        <a:pt x="1149927" y="623454"/>
+                      </a:cubicBezTo>
+                      <a:cubicBezTo>
+                        <a:pt x="1228436" y="671945"/>
+                        <a:pt x="1265381" y="681182"/>
+                        <a:pt x="1385454" y="762000"/>
+                      </a:cubicBezTo>
+                      <a:cubicBezTo>
+                        <a:pt x="1505527" y="842818"/>
+                        <a:pt x="1745672" y="1013691"/>
+                        <a:pt x="1870363" y="1108364"/>
+                      </a:cubicBezTo>
+                      <a:cubicBezTo>
+                        <a:pt x="1995054" y="1203037"/>
+                        <a:pt x="2052783" y="1256145"/>
+                        <a:pt x="2133601" y="1330036"/>
+                      </a:cubicBezTo>
+                      <a:cubicBezTo>
+                        <a:pt x="2214419" y="1403927"/>
+                        <a:pt x="2283690" y="1473200"/>
+                        <a:pt x="2355272" y="1551709"/>
+                      </a:cubicBezTo>
+                      <a:cubicBezTo>
+                        <a:pt x="2426854" y="1630218"/>
+                        <a:pt x="2493818" y="1708727"/>
+                        <a:pt x="2563091" y="1801091"/>
+                      </a:cubicBezTo>
+                      <a:cubicBezTo>
+                        <a:pt x="2632364" y="1893455"/>
+                        <a:pt x="2713182" y="2006600"/>
+                        <a:pt x="2770909" y="2105891"/>
+                      </a:cubicBezTo>
+                      <a:cubicBezTo>
+                        <a:pt x="2828636" y="2205182"/>
+                        <a:pt x="2872509" y="2288309"/>
+                        <a:pt x="2909454" y="2396836"/>
+                      </a:cubicBezTo>
+                      <a:cubicBezTo>
+                        <a:pt x="2946399" y="2505363"/>
+                        <a:pt x="2981036" y="2676236"/>
+                        <a:pt x="2992581" y="2757054"/>
+                      </a:cubicBezTo>
+                      <a:cubicBezTo>
+                        <a:pt x="3004127" y="2837872"/>
+                        <a:pt x="2991427" y="2859808"/>
+                        <a:pt x="2978727" y="2881745"/>
+                      </a:cubicBezTo>
+                    </a:path>
+                  </a:pathLst>
+                </a:custGeom>
+                <a:noFill/>
+                <a:ln w="57150">
+                  <a:solidFill>
+                    <a:schemeClr val="tx1"/>
+                  </a:solidFill>
+                </a:ln>
+              </p:spPr>
+              <p:style>
+                <a:lnRef idx="2">
+                  <a:schemeClr val="accent1">
+                    <a:shade val="50000"/>
+                  </a:schemeClr>
+                </a:lnRef>
+                <a:fillRef idx="1">
+                  <a:schemeClr val="accent1"/>
+                </a:fillRef>
+                <a:effectRef idx="0">
+                  <a:schemeClr val="accent1"/>
+                </a:effectRef>
+                <a:fontRef idx="minor">
+                  <a:schemeClr val="lt1"/>
+                </a:fontRef>
+              </p:style>
+              <p:txBody>
+                <a:bodyPr rtlCol="0" anchor="ctr"/>
+                <a:lstStyle/>
+                <a:p>
+                  <a:pPr algn="ctr"/>
+                  <a:endParaRPr lang="en-US"/>
+                </a:p>
+              </p:txBody>
+            </p:sp>
+            <p:sp>
+              <p:nvSpPr>
+                <p:cNvPr id="22" name="Freeform 21"/>
+                <p:cNvSpPr/>
+                <p:nvPr/>
+              </p:nvSpPr>
+              <p:spPr>
+                <a:xfrm flipV="1">
+                  <a:off x="4293455" y="3139874"/>
+                  <a:ext cx="2839154" cy="2729870"/>
+                </a:xfrm>
+                <a:custGeom>
+                  <a:avLst/>
+                  <a:gdLst>
+                    <a:gd name="connsiteX0" fmla="*/ 0 w 2997109"/>
+                    <a:gd name="connsiteY0" fmla="*/ 0 h 2881745"/>
+                    <a:gd name="connsiteX1" fmla="*/ 304800 w 2997109"/>
+                    <a:gd name="connsiteY1" fmla="*/ 138545 h 2881745"/>
+                    <a:gd name="connsiteX2" fmla="*/ 568036 w 2997109"/>
+                    <a:gd name="connsiteY2" fmla="*/ 290945 h 2881745"/>
+                    <a:gd name="connsiteX3" fmla="*/ 914400 w 2997109"/>
+                    <a:gd name="connsiteY3" fmla="*/ 471054 h 2881745"/>
+                    <a:gd name="connsiteX4" fmla="*/ 1149927 w 2997109"/>
+                    <a:gd name="connsiteY4" fmla="*/ 623454 h 2881745"/>
+                    <a:gd name="connsiteX5" fmla="*/ 1385454 w 2997109"/>
+                    <a:gd name="connsiteY5" fmla="*/ 762000 h 2881745"/>
+                    <a:gd name="connsiteX6" fmla="*/ 1870363 w 2997109"/>
+                    <a:gd name="connsiteY6" fmla="*/ 1108364 h 2881745"/>
+                    <a:gd name="connsiteX7" fmla="*/ 2105891 w 2997109"/>
+                    <a:gd name="connsiteY7" fmla="*/ 1330036 h 2881745"/>
+                    <a:gd name="connsiteX8" fmla="*/ 2313709 w 2997109"/>
+                    <a:gd name="connsiteY8" fmla="*/ 1482436 h 2881745"/>
+                    <a:gd name="connsiteX9" fmla="*/ 2563091 w 2997109"/>
+                    <a:gd name="connsiteY9" fmla="*/ 1801091 h 2881745"/>
+                    <a:gd name="connsiteX10" fmla="*/ 2770909 w 2997109"/>
+                    <a:gd name="connsiteY10" fmla="*/ 2105891 h 2881745"/>
+                    <a:gd name="connsiteX11" fmla="*/ 2909454 w 2997109"/>
+                    <a:gd name="connsiteY11" fmla="*/ 2396836 h 2881745"/>
+                    <a:gd name="connsiteX12" fmla="*/ 2992581 w 2997109"/>
+                    <a:gd name="connsiteY12" fmla="*/ 2757054 h 2881745"/>
+                    <a:gd name="connsiteX13" fmla="*/ 2978727 w 2997109"/>
+                    <a:gd name="connsiteY13" fmla="*/ 2881745 h 2881745"/>
+                    <a:gd name="connsiteX0" fmla="*/ 0 w 2997109"/>
+                    <a:gd name="connsiteY0" fmla="*/ 0 h 2881745"/>
+                    <a:gd name="connsiteX1" fmla="*/ 304800 w 2997109"/>
+                    <a:gd name="connsiteY1" fmla="*/ 138545 h 2881745"/>
+                    <a:gd name="connsiteX2" fmla="*/ 568036 w 2997109"/>
+                    <a:gd name="connsiteY2" fmla="*/ 290945 h 2881745"/>
+                    <a:gd name="connsiteX3" fmla="*/ 914400 w 2997109"/>
+                    <a:gd name="connsiteY3" fmla="*/ 471054 h 2881745"/>
+                    <a:gd name="connsiteX4" fmla="*/ 1149927 w 2997109"/>
+                    <a:gd name="connsiteY4" fmla="*/ 623454 h 2881745"/>
+                    <a:gd name="connsiteX5" fmla="*/ 1385454 w 2997109"/>
+                    <a:gd name="connsiteY5" fmla="*/ 762000 h 2881745"/>
+                    <a:gd name="connsiteX6" fmla="*/ 1870363 w 2997109"/>
+                    <a:gd name="connsiteY6" fmla="*/ 1108364 h 2881745"/>
+                    <a:gd name="connsiteX7" fmla="*/ 2133601 w 2997109"/>
+                    <a:gd name="connsiteY7" fmla="*/ 1330036 h 2881745"/>
+                    <a:gd name="connsiteX8" fmla="*/ 2313709 w 2997109"/>
+                    <a:gd name="connsiteY8" fmla="*/ 1482436 h 2881745"/>
+                    <a:gd name="connsiteX9" fmla="*/ 2563091 w 2997109"/>
+                    <a:gd name="connsiteY9" fmla="*/ 1801091 h 2881745"/>
+                    <a:gd name="connsiteX10" fmla="*/ 2770909 w 2997109"/>
+                    <a:gd name="connsiteY10" fmla="*/ 2105891 h 2881745"/>
+                    <a:gd name="connsiteX11" fmla="*/ 2909454 w 2997109"/>
+                    <a:gd name="connsiteY11" fmla="*/ 2396836 h 2881745"/>
+                    <a:gd name="connsiteX12" fmla="*/ 2992581 w 2997109"/>
+                    <a:gd name="connsiteY12" fmla="*/ 2757054 h 2881745"/>
+                    <a:gd name="connsiteX13" fmla="*/ 2978727 w 2997109"/>
+                    <a:gd name="connsiteY13" fmla="*/ 2881745 h 2881745"/>
+                    <a:gd name="connsiteX0" fmla="*/ 0 w 2997109"/>
+                    <a:gd name="connsiteY0" fmla="*/ 0 h 2881745"/>
+                    <a:gd name="connsiteX1" fmla="*/ 304800 w 2997109"/>
+                    <a:gd name="connsiteY1" fmla="*/ 138545 h 2881745"/>
+                    <a:gd name="connsiteX2" fmla="*/ 568036 w 2997109"/>
+                    <a:gd name="connsiteY2" fmla="*/ 290945 h 2881745"/>
+                    <a:gd name="connsiteX3" fmla="*/ 914400 w 2997109"/>
+                    <a:gd name="connsiteY3" fmla="*/ 471054 h 2881745"/>
+                    <a:gd name="connsiteX4" fmla="*/ 1149927 w 2997109"/>
+                    <a:gd name="connsiteY4" fmla="*/ 623454 h 2881745"/>
+                    <a:gd name="connsiteX5" fmla="*/ 1385454 w 2997109"/>
+                    <a:gd name="connsiteY5" fmla="*/ 762000 h 2881745"/>
+                    <a:gd name="connsiteX6" fmla="*/ 1870363 w 2997109"/>
+                    <a:gd name="connsiteY6" fmla="*/ 1108364 h 2881745"/>
+                    <a:gd name="connsiteX7" fmla="*/ 2133601 w 2997109"/>
+                    <a:gd name="connsiteY7" fmla="*/ 1330036 h 2881745"/>
+                    <a:gd name="connsiteX8" fmla="*/ 2355272 w 2997109"/>
+                    <a:gd name="connsiteY8" fmla="*/ 1551709 h 2881745"/>
+                    <a:gd name="connsiteX9" fmla="*/ 2563091 w 2997109"/>
+                    <a:gd name="connsiteY9" fmla="*/ 1801091 h 2881745"/>
+                    <a:gd name="connsiteX10" fmla="*/ 2770909 w 2997109"/>
+                    <a:gd name="connsiteY10" fmla="*/ 2105891 h 2881745"/>
+                    <a:gd name="connsiteX11" fmla="*/ 2909454 w 2997109"/>
+                    <a:gd name="connsiteY11" fmla="*/ 2396836 h 2881745"/>
+                    <a:gd name="connsiteX12" fmla="*/ 2992581 w 2997109"/>
+                    <a:gd name="connsiteY12" fmla="*/ 2757054 h 2881745"/>
+                    <a:gd name="connsiteX13" fmla="*/ 2978727 w 2997109"/>
+                    <a:gd name="connsiteY13" fmla="*/ 2881745 h 2881745"/>
+                  </a:gdLst>
+                  <a:ahLst/>
+                  <a:cxnLst>
+                    <a:cxn ang="0">
+                      <a:pos x="connsiteX0" y="connsiteY0"/>
+                    </a:cxn>
+                    <a:cxn ang="0">
+                      <a:pos x="connsiteX1" y="connsiteY1"/>
+                    </a:cxn>
+                    <a:cxn ang="0">
+                      <a:pos x="connsiteX2" y="connsiteY2"/>
+                    </a:cxn>
+                    <a:cxn ang="0">
+                      <a:pos x="connsiteX3" y="connsiteY3"/>
+                    </a:cxn>
+                    <a:cxn ang="0">
+                      <a:pos x="connsiteX4" y="connsiteY4"/>
+                    </a:cxn>
+                    <a:cxn ang="0">
+                      <a:pos x="connsiteX5" y="connsiteY5"/>
+                    </a:cxn>
+                    <a:cxn ang="0">
+                      <a:pos x="connsiteX6" y="connsiteY6"/>
+                    </a:cxn>
+                    <a:cxn ang="0">
+                      <a:pos x="connsiteX7" y="connsiteY7"/>
+                    </a:cxn>
+                    <a:cxn ang="0">
+                      <a:pos x="connsiteX8" y="connsiteY8"/>
+                    </a:cxn>
+                    <a:cxn ang="0">
+                      <a:pos x="connsiteX9" y="connsiteY9"/>
+                    </a:cxn>
+                    <a:cxn ang="0">
+                      <a:pos x="connsiteX10" y="connsiteY10"/>
+                    </a:cxn>
+                    <a:cxn ang="0">
+                      <a:pos x="connsiteX11" y="connsiteY11"/>
+                    </a:cxn>
+                    <a:cxn ang="0">
+                      <a:pos x="connsiteX12" y="connsiteY12"/>
+                    </a:cxn>
+                    <a:cxn ang="0">
+                      <a:pos x="connsiteX13" y="connsiteY13"/>
+                    </a:cxn>
+                  </a:cxnLst>
+                  <a:rect l="l" t="t" r="r" b="b"/>
+                  <a:pathLst>
+                    <a:path w="2997109" h="2881745">
+                      <a:moveTo>
+                        <a:pt x="0" y="0"/>
+                      </a:moveTo>
+                      <a:cubicBezTo>
+                        <a:pt x="105063" y="45027"/>
+                        <a:pt x="210127" y="90054"/>
+                        <a:pt x="304800" y="138545"/>
+                      </a:cubicBezTo>
+                      <a:cubicBezTo>
+                        <a:pt x="399473" y="187036"/>
+                        <a:pt x="466436" y="235527"/>
+                        <a:pt x="568036" y="290945"/>
+                      </a:cubicBezTo>
+                      <a:cubicBezTo>
+                        <a:pt x="669636" y="346363"/>
+                        <a:pt x="817418" y="415636"/>
+                        <a:pt x="914400" y="471054"/>
+                      </a:cubicBezTo>
+                      <a:cubicBezTo>
+                        <a:pt x="1011382" y="526472"/>
+                        <a:pt x="1071418" y="574963"/>
+                        <a:pt x="1149927" y="623454"/>
+                      </a:cubicBezTo>
+                      <a:cubicBezTo>
+                        <a:pt x="1228436" y="671945"/>
+                        <a:pt x="1265381" y="681182"/>
+                        <a:pt x="1385454" y="762000"/>
+                      </a:cubicBezTo>
+                      <a:cubicBezTo>
+                        <a:pt x="1505527" y="842818"/>
+                        <a:pt x="1745672" y="1013691"/>
+                        <a:pt x="1870363" y="1108364"/>
+                      </a:cubicBezTo>
+                      <a:cubicBezTo>
+                        <a:pt x="1995054" y="1203037"/>
+                        <a:pt x="2052783" y="1256145"/>
+                        <a:pt x="2133601" y="1330036"/>
+                      </a:cubicBezTo>
+                      <a:cubicBezTo>
+                        <a:pt x="2214419" y="1403927"/>
+                        <a:pt x="2283690" y="1473200"/>
+                        <a:pt x="2355272" y="1551709"/>
+                      </a:cubicBezTo>
+                      <a:cubicBezTo>
+                        <a:pt x="2426854" y="1630218"/>
+                        <a:pt x="2493818" y="1708727"/>
+                        <a:pt x="2563091" y="1801091"/>
+                      </a:cubicBezTo>
+                      <a:cubicBezTo>
+                        <a:pt x="2632364" y="1893455"/>
+                        <a:pt x="2713182" y="2006600"/>
+                        <a:pt x="2770909" y="2105891"/>
+                      </a:cubicBezTo>
+                      <a:cubicBezTo>
+                        <a:pt x="2828636" y="2205182"/>
+                        <a:pt x="2872509" y="2288309"/>
+                        <a:pt x="2909454" y="2396836"/>
+                      </a:cubicBezTo>
+                      <a:cubicBezTo>
+                        <a:pt x="2946399" y="2505363"/>
+                        <a:pt x="2981036" y="2676236"/>
+                        <a:pt x="2992581" y="2757054"/>
+                      </a:cubicBezTo>
+                      <a:cubicBezTo>
+                        <a:pt x="3004127" y="2837872"/>
+                        <a:pt x="2991427" y="2859808"/>
+                        <a:pt x="2978727" y="2881745"/>
+                      </a:cubicBezTo>
+                    </a:path>
+                  </a:pathLst>
+                </a:custGeom>
+                <a:noFill/>
+                <a:ln w="57150">
+                  <a:solidFill>
+                    <a:schemeClr val="tx1"/>
+                  </a:solidFill>
+                </a:ln>
+              </p:spPr>
+              <p:style>
+                <a:lnRef idx="2">
+                  <a:schemeClr val="accent1">
+                    <a:shade val="50000"/>
+                  </a:schemeClr>
+                </a:lnRef>
+                <a:fillRef idx="1">
+                  <a:schemeClr val="accent1"/>
+                </a:fillRef>
+                <a:effectRef idx="0">
+                  <a:schemeClr val="accent1"/>
+                </a:effectRef>
+                <a:fontRef idx="minor">
+                  <a:schemeClr val="lt1"/>
+                </a:fontRef>
+              </p:style>
+              <p:txBody>
+                <a:bodyPr rtlCol="0" anchor="ctr"/>
+                <a:lstStyle/>
+                <a:p>
+                  <a:pPr algn="ctr"/>
+                  <a:endParaRPr lang="en-US"/>
+                </a:p>
+              </p:txBody>
+            </p:sp>
+          </p:grpSp>
+          <p:sp>
+            <p:nvSpPr>
+              <p:cNvPr id="23" name="Freeform 22"/>
+              <p:cNvSpPr/>
+              <p:nvPr/>
+            </p:nvSpPr>
+            <p:spPr>
+              <a:xfrm>
+                <a:off x="5134452" y="207818"/>
+                <a:ext cx="1953566" cy="5805055"/>
+              </a:xfrm>
+              <a:custGeom>
+                <a:avLst/>
+                <a:gdLst>
+                  <a:gd name="connsiteX0" fmla="*/ 0 w 1953566"/>
+                  <a:gd name="connsiteY0" fmla="*/ 0 h 5805055"/>
+                  <a:gd name="connsiteX1" fmla="*/ 346363 w 1953566"/>
+                  <a:gd name="connsiteY1" fmla="*/ 346364 h 5805055"/>
+                  <a:gd name="connsiteX2" fmla="*/ 720436 w 1953566"/>
+                  <a:gd name="connsiteY2" fmla="*/ 748146 h 5805055"/>
+                  <a:gd name="connsiteX3" fmla="*/ 1052945 w 1953566"/>
+                  <a:gd name="connsiteY3" fmla="*/ 1122218 h 5805055"/>
+                  <a:gd name="connsiteX4" fmla="*/ 1330036 w 1953566"/>
+                  <a:gd name="connsiteY4" fmla="*/ 1454727 h 5805055"/>
+                  <a:gd name="connsiteX5" fmla="*/ 1662545 w 1953566"/>
+                  <a:gd name="connsiteY5" fmla="*/ 1953491 h 5805055"/>
+                  <a:gd name="connsiteX6" fmla="*/ 1856509 w 1953566"/>
+                  <a:gd name="connsiteY6" fmla="*/ 2466109 h 5805055"/>
+                  <a:gd name="connsiteX7" fmla="*/ 1953491 w 1953566"/>
+                  <a:gd name="connsiteY7" fmla="*/ 2923309 h 5805055"/>
+                  <a:gd name="connsiteX8" fmla="*/ 1842654 w 1953566"/>
+                  <a:gd name="connsiteY8" fmla="*/ 3532909 h 5805055"/>
+                  <a:gd name="connsiteX9" fmla="*/ 1496291 w 1953566"/>
+                  <a:gd name="connsiteY9" fmla="*/ 4170218 h 5805055"/>
+                  <a:gd name="connsiteX10" fmla="*/ 1011381 w 1953566"/>
+                  <a:gd name="connsiteY10" fmla="*/ 4807527 h 5805055"/>
+                  <a:gd name="connsiteX11" fmla="*/ 706581 w 1953566"/>
+                  <a:gd name="connsiteY11" fmla="*/ 5126182 h 5805055"/>
+                  <a:gd name="connsiteX12" fmla="*/ 387927 w 1953566"/>
+                  <a:gd name="connsiteY12" fmla="*/ 5444837 h 5805055"/>
+                  <a:gd name="connsiteX13" fmla="*/ 0 w 1953566"/>
+                  <a:gd name="connsiteY13" fmla="*/ 5805055 h 5805055"/>
+                </a:gdLst>
+                <a:ahLst/>
+                <a:cxnLst>
+                  <a:cxn ang="0">
+                    <a:pos x="connsiteX0" y="connsiteY0"/>
+                  </a:cxn>
+                  <a:cxn ang="0">
+                    <a:pos x="connsiteX1" y="connsiteY1"/>
+                  </a:cxn>
+                  <a:cxn ang="0">
+                    <a:pos x="connsiteX2" y="connsiteY2"/>
+                  </a:cxn>
+                  <a:cxn ang="0">
+                    <a:pos x="connsiteX3" y="connsiteY3"/>
+                  </a:cxn>
+                  <a:cxn ang="0">
+                    <a:pos x="connsiteX4" y="connsiteY4"/>
+                  </a:cxn>
+                  <a:cxn ang="0">
+                    <a:pos x="connsiteX5" y="connsiteY5"/>
+                  </a:cxn>
+                  <a:cxn ang="0">
+                    <a:pos x="connsiteX6" y="connsiteY6"/>
+                  </a:cxn>
+                  <a:cxn ang="0">
+                    <a:pos x="connsiteX7" y="connsiteY7"/>
+                  </a:cxn>
+                  <a:cxn ang="0">
+                    <a:pos x="connsiteX8" y="connsiteY8"/>
+                  </a:cxn>
+                  <a:cxn ang="0">
+                    <a:pos x="connsiteX9" y="connsiteY9"/>
+                  </a:cxn>
+                  <a:cxn ang="0">
+                    <a:pos x="connsiteX10" y="connsiteY10"/>
+                  </a:cxn>
+                  <a:cxn ang="0">
+                    <a:pos x="connsiteX11" y="connsiteY11"/>
+                  </a:cxn>
+                  <a:cxn ang="0">
+                    <a:pos x="connsiteX12" y="connsiteY12"/>
+                  </a:cxn>
+                  <a:cxn ang="0">
+                    <a:pos x="connsiteX13" y="connsiteY13"/>
+                  </a:cxn>
+                </a:cxnLst>
+                <a:rect l="l" t="t" r="r" b="b"/>
+                <a:pathLst>
+                  <a:path w="1953566" h="5805055">
+                    <a:moveTo>
+                      <a:pt x="0" y="0"/>
+                    </a:moveTo>
+                    <a:cubicBezTo>
+                      <a:pt x="113145" y="110836"/>
+                      <a:pt x="226290" y="221673"/>
+                      <a:pt x="346363" y="346364"/>
+                    </a:cubicBezTo>
+                    <a:cubicBezTo>
+                      <a:pt x="466436" y="471055"/>
+                      <a:pt x="602672" y="618837"/>
+                      <a:pt x="720436" y="748146"/>
+                    </a:cubicBezTo>
+                    <a:cubicBezTo>
+                      <a:pt x="838200" y="877455"/>
+                      <a:pt x="951345" y="1004455"/>
+                      <a:pt x="1052945" y="1122218"/>
+                    </a:cubicBezTo>
+                    <a:cubicBezTo>
+                      <a:pt x="1154545" y="1239981"/>
+                      <a:pt x="1228436" y="1316182"/>
+                      <a:pt x="1330036" y="1454727"/>
+                    </a:cubicBezTo>
+                    <a:cubicBezTo>
+                      <a:pt x="1431636" y="1593272"/>
+                      <a:pt x="1574800" y="1784927"/>
+                      <a:pt x="1662545" y="1953491"/>
+                    </a:cubicBezTo>
+                    <a:cubicBezTo>
+                      <a:pt x="1750290" y="2122055"/>
+                      <a:pt x="1808018" y="2304473"/>
+                      <a:pt x="1856509" y="2466109"/>
+                    </a:cubicBezTo>
+                    <a:cubicBezTo>
+                      <a:pt x="1905000" y="2627745"/>
+                      <a:pt x="1955800" y="2745509"/>
+                      <a:pt x="1953491" y="2923309"/>
+                    </a:cubicBezTo>
+                    <a:cubicBezTo>
+                      <a:pt x="1951182" y="3101109"/>
+                      <a:pt x="1918854" y="3325091"/>
+                      <a:pt x="1842654" y="3532909"/>
+                    </a:cubicBezTo>
+                    <a:cubicBezTo>
+                      <a:pt x="1766454" y="3740727"/>
+                      <a:pt x="1634837" y="3957782"/>
+                      <a:pt x="1496291" y="4170218"/>
+                    </a:cubicBezTo>
+                    <a:cubicBezTo>
+                      <a:pt x="1357746" y="4382654"/>
+                      <a:pt x="1142999" y="4648200"/>
+                      <a:pt x="1011381" y="4807527"/>
+                    </a:cubicBezTo>
+                    <a:cubicBezTo>
+                      <a:pt x="879763" y="4966854"/>
+                      <a:pt x="810490" y="5019964"/>
+                      <a:pt x="706581" y="5126182"/>
+                    </a:cubicBezTo>
+                    <a:cubicBezTo>
+                      <a:pt x="602672" y="5232400"/>
+                      <a:pt x="505690" y="5331692"/>
+                      <a:pt x="387927" y="5444837"/>
+                    </a:cubicBezTo>
+                    <a:cubicBezTo>
+                      <a:pt x="270164" y="5557982"/>
+                      <a:pt x="135082" y="5681518"/>
+                      <a:pt x="0" y="5805055"/>
+                    </a:cubicBezTo>
+                  </a:path>
+                </a:pathLst>
+              </a:custGeom>
+              <a:noFill/>
+              <a:ln w="57150">
+                <a:solidFill>
+                  <a:schemeClr val="tx1"/>
+                </a:solidFill>
+              </a:ln>
+            </p:spPr>
+            <p:style>
+              <a:lnRef idx="2">
+                <a:schemeClr val="accent1">
+                  <a:shade val="50000"/>
+                </a:schemeClr>
+              </a:lnRef>
+              <a:fillRef idx="1">
+                <a:schemeClr val="accent1"/>
+              </a:fillRef>
+              <a:effectRef idx="0">
+                <a:schemeClr val="accent1"/>
+              </a:effectRef>
+              <a:fontRef idx="minor">
+                <a:schemeClr val="lt1"/>
+              </a:fontRef>
+            </p:style>
+            <p:txBody>
+              <a:bodyPr rtlCol="0" anchor="ctr"/>
+              <a:lstStyle/>
+              <a:p>
+                <a:pPr algn="ctr"/>
+                <a:endParaRPr lang="en-US"/>
+              </a:p>
+            </p:txBody>
+          </p:sp>
+        </p:grpSp>
+        <mc:AlternateContent xmlns:mc="http://schemas.openxmlformats.org/markup-compatibility/2006">
+          <mc:Choice xmlns:a14="http://schemas.microsoft.com/office/drawing/2010/main" Requires="a14">
+            <p:sp>
+              <p:nvSpPr>
+                <p:cNvPr id="26" name="TextBox 25"/>
+                <p:cNvSpPr txBox="1"/>
+                <p:nvPr/>
+              </p:nvSpPr>
+              <p:spPr>
+                <a:xfrm>
+                  <a:off x="2905275" y="416820"/>
+                  <a:ext cx="859466" cy="369332"/>
+                </a:xfrm>
+                <a:prstGeom prst="rect">
+                  <a:avLst/>
+                </a:prstGeom>
+                <a:noFill/>
+              </p:spPr>
+              <p:txBody>
+                <a:bodyPr wrap="none" lIns="0" tIns="0" rIns="0" bIns="0" rtlCol="0">
+                  <a:spAutoFit/>
+                </a:bodyPr>
+                <a:lstStyle/>
+                <a:p>
+                  <a14:m>
+                    <m:oMathPara xmlns:m="http://schemas.openxmlformats.org/officeDocument/2006/math">
+                      <m:oMathParaPr>
+                        <m:jc m:val="centerGroup"/>
+                      </m:oMathParaPr>
+                      <m:oMath xmlns:m="http://schemas.openxmlformats.org/officeDocument/2006/math">
+                        <m:r>
+                          <a:rPr lang="en-US" sz="2400" b="0" i="1" smtClean="0">
+                            <a:latin typeface="Cambria Math" panose="02040503050406030204" pitchFamily="18" charset="0"/>
+                            <a:cs typeface="Arial" panose="020B0604020202020204" pitchFamily="34" charset="0"/>
+                          </a:rPr>
+                          <m:t>𝐸</m:t>
+                        </m:r>
+                        <m:r>
+                          <a:rPr lang="en-US" sz="2400" b="0" i="1" smtClean="0">
+                            <a:latin typeface="Cambria Math" panose="02040503050406030204" pitchFamily="18" charset="0"/>
+                            <a:cs typeface="Arial" panose="020B0604020202020204" pitchFamily="34" charset="0"/>
+                          </a:rPr>
+                          <m:t>=0</m:t>
+                        </m:r>
+                      </m:oMath>
+                    </m:oMathPara>
+                  </a14:m>
+                  <a:endParaRPr lang="en-US" sz="2400" dirty="0" smtClean="0">
+                    <a:latin typeface="Arial" panose="020B0604020202020204" pitchFamily="34" charset="0"/>
+                    <a:cs typeface="Arial" panose="020B0604020202020204" pitchFamily="34" charset="0"/>
+                  </a:endParaRPr>
+                </a:p>
+              </p:txBody>
+            </p:sp>
+          </mc:Choice>
+          <mc:Fallback>
+            <p:sp>
+              <p:nvSpPr>
+                <p:cNvPr id="26" name="TextBox 25"/>
+                <p:cNvSpPr txBox="1">
+                  <a:spLocks noRot="1" noChangeAspect="1" noMove="1" noResize="1" noEditPoints="1" noAdjustHandles="1" noChangeArrowheads="1" noChangeShapeType="1" noTextEdit="1"/>
+                </p:cNvSpPr>
+                <p:nvPr/>
+              </p:nvSpPr>
+              <p:spPr>
+                <a:xfrm>
+                  <a:off x="2905275" y="416820"/>
+                  <a:ext cx="859466" cy="369332"/>
+                </a:xfrm>
+                <a:prstGeom prst="rect">
+                  <a:avLst/>
+                </a:prstGeom>
+                <a:blipFill>
+                  <a:blip r:embed="rId3"/>
+                  <a:stretch>
+                    <a:fillRect l="-7092" r="-7092" b="-9836"/>
+                  </a:stretch>
+                </a:blipFill>
+              </p:spPr>
+              <p:txBody>
+                <a:bodyPr/>
+                <a:lstStyle/>
+                <a:p>
+                  <a:r>
+                    <a:rPr lang="en-US">
+                      <a:noFill/>
+                    </a:rPr>
+                    <a:t> </a:t>
+                  </a:r>
+                </a:p>
+              </p:txBody>
+            </p:sp>
+          </mc:Fallback>
+        </mc:AlternateContent>
+        <mc:AlternateContent xmlns:mc="http://schemas.openxmlformats.org/markup-compatibility/2006">
+          <mc:Choice xmlns:a14="http://schemas.microsoft.com/office/drawing/2010/main" Requires="a14">
+            <p:sp>
+              <p:nvSpPr>
+                <p:cNvPr id="29" name="TextBox 28"/>
+                <p:cNvSpPr txBox="1"/>
+                <p:nvPr/>
+              </p:nvSpPr>
+              <p:spPr>
+                <a:xfrm>
+                  <a:off x="5094820" y="194358"/>
+                  <a:ext cx="859466" cy="369332"/>
+                </a:xfrm>
+                <a:prstGeom prst="rect">
+                  <a:avLst/>
+                </a:prstGeom>
+                <a:noFill/>
+              </p:spPr>
+              <p:txBody>
+                <a:bodyPr wrap="none" lIns="0" tIns="0" rIns="0" bIns="0" rtlCol="0">
+                  <a:spAutoFit/>
+                </a:bodyPr>
+                <a:lstStyle/>
+                <a:p>
+                  <a14:m>
+                    <m:oMathPara xmlns:m="http://schemas.openxmlformats.org/officeDocument/2006/math">
+                      <m:oMathParaPr>
+                        <m:jc m:val="centerGroup"/>
+                      </m:oMathParaPr>
+                      <m:oMath xmlns:m="http://schemas.openxmlformats.org/officeDocument/2006/math">
+                        <m:r>
+                          <a:rPr lang="en-US" sz="2400" b="0" i="1" smtClean="0">
+                            <a:latin typeface="Cambria Math" panose="02040503050406030204" pitchFamily="18" charset="0"/>
+                            <a:cs typeface="Arial" panose="020B0604020202020204" pitchFamily="34" charset="0"/>
+                          </a:rPr>
+                          <m:t>𝐸</m:t>
+                        </m:r>
+                        <m:r>
+                          <a:rPr lang="en-US" sz="2400" b="0" i="1" smtClean="0">
+                            <a:latin typeface="Cambria Math" panose="02040503050406030204" pitchFamily="18" charset="0"/>
+                            <a:cs typeface="Arial" panose="020B0604020202020204" pitchFamily="34" charset="0"/>
+                          </a:rPr>
+                          <m:t>&gt;0</m:t>
+                        </m:r>
+                      </m:oMath>
+                    </m:oMathPara>
+                  </a14:m>
+                  <a:endParaRPr lang="en-US" sz="2400" dirty="0" smtClean="0">
+                    <a:latin typeface="Arial" panose="020B0604020202020204" pitchFamily="34" charset="0"/>
+                    <a:cs typeface="Arial" panose="020B0604020202020204" pitchFamily="34" charset="0"/>
+                  </a:endParaRPr>
+                </a:p>
+              </p:txBody>
+            </p:sp>
+          </mc:Choice>
+          <mc:Fallback>
+            <p:sp>
+              <p:nvSpPr>
+                <p:cNvPr id="29" name="TextBox 28"/>
+                <p:cNvSpPr txBox="1">
+                  <a:spLocks noRot="1" noChangeAspect="1" noMove="1" noResize="1" noEditPoints="1" noAdjustHandles="1" noChangeArrowheads="1" noChangeShapeType="1" noTextEdit="1"/>
+                </p:cNvSpPr>
+                <p:nvPr/>
+              </p:nvSpPr>
+              <p:spPr>
+                <a:xfrm>
+                  <a:off x="5094820" y="194358"/>
+                  <a:ext cx="859466" cy="369332"/>
+                </a:xfrm>
+                <a:prstGeom prst="rect">
+                  <a:avLst/>
+                </a:prstGeom>
+                <a:blipFill>
+                  <a:blip r:embed="rId4"/>
+                  <a:stretch>
+                    <a:fillRect l="-7801" r="-7092" b="-10000"/>
+                  </a:stretch>
+                </a:blipFill>
+              </p:spPr>
+              <p:txBody>
+                <a:bodyPr/>
+                <a:lstStyle/>
+                <a:p>
+                  <a:r>
+                    <a:rPr lang="en-US">
+                      <a:noFill/>
+                    </a:rPr>
+                    <a:t> </a:t>
+                  </a:r>
+                </a:p>
+              </p:txBody>
+            </p:sp>
+          </mc:Fallback>
+        </mc:AlternateContent>
+        <mc:AlternateContent xmlns:mc="http://schemas.openxmlformats.org/markup-compatibility/2006">
+          <mc:Choice xmlns:a14="http://schemas.microsoft.com/office/drawing/2010/main" Requires="a14">
+            <p:sp>
+              <p:nvSpPr>
+                <p:cNvPr id="30" name="TextBox 29"/>
+                <p:cNvSpPr txBox="1"/>
+                <p:nvPr/>
+              </p:nvSpPr>
+              <p:spPr>
+                <a:xfrm>
+                  <a:off x="1018274" y="3178630"/>
+                  <a:ext cx="859466" cy="369332"/>
+                </a:xfrm>
+                <a:prstGeom prst="rect">
+                  <a:avLst/>
+                </a:prstGeom>
+                <a:noFill/>
+              </p:spPr>
+              <p:txBody>
+                <a:bodyPr wrap="none" lIns="0" tIns="0" rIns="0" bIns="0" rtlCol="0">
+                  <a:spAutoFit/>
+                </a:bodyPr>
+                <a:lstStyle/>
+                <a:p>
+                  <a14:m>
+                    <m:oMathPara xmlns:m="http://schemas.openxmlformats.org/officeDocument/2006/math">
+                      <m:oMathParaPr>
+                        <m:jc m:val="centerGroup"/>
+                      </m:oMathParaPr>
+                      <m:oMath xmlns:m="http://schemas.openxmlformats.org/officeDocument/2006/math">
+                        <m:r>
+                          <a:rPr lang="en-US" sz="2400" b="0" i="1" smtClean="0">
+                            <a:latin typeface="Cambria Math" panose="02040503050406030204" pitchFamily="18" charset="0"/>
+                            <a:cs typeface="Arial" panose="020B0604020202020204" pitchFamily="34" charset="0"/>
+                          </a:rPr>
+                          <m:t>𝐸</m:t>
+                        </m:r>
+                        <m:r>
+                          <a:rPr lang="en-US" sz="2400" b="0" i="1" smtClean="0">
+                            <a:latin typeface="Cambria Math" panose="02040503050406030204" pitchFamily="18" charset="0"/>
+                            <a:cs typeface="Arial" panose="020B0604020202020204" pitchFamily="34" charset="0"/>
+                          </a:rPr>
+                          <m:t>&lt;0</m:t>
+                        </m:r>
+                      </m:oMath>
+                    </m:oMathPara>
+                  </a14:m>
+                  <a:endParaRPr lang="en-US" sz="2400" dirty="0" smtClean="0">
+                    <a:latin typeface="Arial" panose="020B0604020202020204" pitchFamily="34" charset="0"/>
+                    <a:cs typeface="Arial" panose="020B0604020202020204" pitchFamily="34" charset="0"/>
+                  </a:endParaRPr>
+                </a:p>
+              </p:txBody>
+            </p:sp>
+          </mc:Choice>
+          <mc:Fallback>
+            <p:sp>
+              <p:nvSpPr>
+                <p:cNvPr id="30" name="TextBox 29"/>
+                <p:cNvSpPr txBox="1">
+                  <a:spLocks noRot="1" noChangeAspect="1" noMove="1" noResize="1" noEditPoints="1" noAdjustHandles="1" noChangeArrowheads="1" noChangeShapeType="1" noTextEdit="1"/>
+                </p:cNvSpPr>
+                <p:nvPr/>
+              </p:nvSpPr>
+              <p:spPr>
+                <a:xfrm>
+                  <a:off x="1018274" y="3178630"/>
+                  <a:ext cx="859466" cy="369332"/>
+                </a:xfrm>
+                <a:prstGeom prst="rect">
+                  <a:avLst/>
+                </a:prstGeom>
+                <a:blipFill>
+                  <a:blip r:embed="rId5"/>
+                  <a:stretch>
+                    <a:fillRect l="-7092" r="-7801" b="-9836"/>
+                  </a:stretch>
+                </a:blipFill>
+              </p:spPr>
+              <p:txBody>
+                <a:bodyPr/>
+                <a:lstStyle/>
+                <a:p>
+                  <a:r>
+                    <a:rPr lang="en-US">
+                      <a:noFill/>
+                    </a:rPr>
+                    <a:t> </a:t>
+                  </a:r>
+                </a:p>
+              </p:txBody>
+            </p:sp>
+          </mc:Fallback>
+        </mc:AlternateContent>
+        <mc:AlternateContent xmlns:mc="http://schemas.openxmlformats.org/markup-compatibility/2006">
+          <mc:Choice xmlns:a14="http://schemas.microsoft.com/office/drawing/2010/main" Requires="a14">
+            <p:sp>
+              <p:nvSpPr>
+                <p:cNvPr id="31" name="TextBox 30"/>
+                <p:cNvSpPr txBox="1"/>
+                <p:nvPr/>
+              </p:nvSpPr>
+              <p:spPr>
+                <a:xfrm>
+                  <a:off x="4733345" y="3236609"/>
+                  <a:ext cx="859466" cy="369332"/>
+                </a:xfrm>
+                <a:prstGeom prst="rect">
+                  <a:avLst/>
+                </a:prstGeom>
+                <a:noFill/>
+              </p:spPr>
+              <p:txBody>
+                <a:bodyPr wrap="none" lIns="0" tIns="0" rIns="0" bIns="0" rtlCol="0">
+                  <a:spAutoFit/>
+                </a:bodyPr>
+                <a:lstStyle/>
+                <a:p>
+                  <a14:m>
+                    <m:oMathPara xmlns:m="http://schemas.openxmlformats.org/officeDocument/2006/math">
+                      <m:oMathParaPr>
+                        <m:jc m:val="centerGroup"/>
+                      </m:oMathParaPr>
+                      <m:oMath xmlns:m="http://schemas.openxmlformats.org/officeDocument/2006/math">
+                        <m:r>
+                          <a:rPr lang="en-US" sz="2400" b="0" i="1" smtClean="0">
+                            <a:latin typeface="Cambria Math" panose="02040503050406030204" pitchFamily="18" charset="0"/>
+                            <a:cs typeface="Arial" panose="020B0604020202020204" pitchFamily="34" charset="0"/>
+                          </a:rPr>
+                          <m:t>𝐸</m:t>
+                        </m:r>
+                        <m:r>
+                          <a:rPr lang="en-US" sz="2400" b="0" i="1" smtClean="0">
+                            <a:latin typeface="Cambria Math" panose="02040503050406030204" pitchFamily="18" charset="0"/>
+                            <a:cs typeface="Arial" panose="020B0604020202020204" pitchFamily="34" charset="0"/>
+                          </a:rPr>
+                          <m:t>&lt;0</m:t>
+                        </m:r>
+                      </m:oMath>
+                    </m:oMathPara>
+                  </a14:m>
+                  <a:endParaRPr lang="en-US" sz="2400" dirty="0" smtClean="0">
+                    <a:latin typeface="Arial" panose="020B0604020202020204" pitchFamily="34" charset="0"/>
+                    <a:cs typeface="Arial" panose="020B0604020202020204" pitchFamily="34" charset="0"/>
+                  </a:endParaRPr>
+                </a:p>
+              </p:txBody>
+            </p:sp>
+          </mc:Choice>
+          <mc:Fallback>
+            <p:sp>
+              <p:nvSpPr>
+                <p:cNvPr id="31" name="TextBox 30"/>
+                <p:cNvSpPr txBox="1">
+                  <a:spLocks noRot="1" noChangeAspect="1" noMove="1" noResize="1" noEditPoints="1" noAdjustHandles="1" noChangeArrowheads="1" noChangeShapeType="1" noTextEdit="1"/>
+                </p:cNvSpPr>
+                <p:nvPr/>
+              </p:nvSpPr>
+              <p:spPr>
+                <a:xfrm>
+                  <a:off x="4733345" y="3236609"/>
+                  <a:ext cx="859466" cy="369332"/>
+                </a:xfrm>
+                <a:prstGeom prst="rect">
+                  <a:avLst/>
+                </a:prstGeom>
+                <a:blipFill>
+                  <a:blip r:embed="rId6"/>
+                  <a:stretch>
+                    <a:fillRect l="-7092" r="-7801" b="-8197"/>
+                  </a:stretch>
+                </a:blipFill>
+              </p:spPr>
+              <p:txBody>
+                <a:bodyPr/>
+                <a:lstStyle/>
+                <a:p>
+                  <a:r>
+                    <a:rPr lang="en-US">
+                      <a:noFill/>
+                    </a:rPr>
+                    <a:t> </a:t>
+                  </a:r>
+                </a:p>
+              </p:txBody>
+            </p:sp>
+          </mc:Fallback>
+        </mc:AlternateContent>
+      </p:grpSp>
+    </p:spTree>
+    <p:extLst>
+      <p:ext uri="{BB962C8B-B14F-4D97-AF65-F5344CB8AC3E}">
+        <p14:creationId xmlns:p14="http://schemas.microsoft.com/office/powerpoint/2010/main" val="2490243969"/>
       </p:ext>
     </p:extLst>
   </p:cSld>

</xml_diff>

<commit_message>
Simplified question in gravity chapter
</commit_message>
<xml_diff>
--- a/tex/figures/Gravity/Figures.pptx
+++ b/tex/figures/Gravity/Figures.pptx
@@ -251,7 +251,7 @@
           <a:p>
             <a:fld id="{F7249F8D-641B-4CAF-BAE5-10524742F6F1}" type="datetimeFigureOut">
               <a:rPr lang="en-CA" smtClean="0"/>
-              <a:t>2018-07-03</a:t>
+              <a:t>2018-07-18</a:t>
             </a:fld>
             <a:endParaRPr lang="en-CA"/>
           </a:p>
@@ -421,7 +421,7 @@
           <a:p>
             <a:fld id="{F7249F8D-641B-4CAF-BAE5-10524742F6F1}" type="datetimeFigureOut">
               <a:rPr lang="en-CA" smtClean="0"/>
-              <a:t>2018-07-03</a:t>
+              <a:t>2018-07-18</a:t>
             </a:fld>
             <a:endParaRPr lang="en-CA"/>
           </a:p>
@@ -601,7 +601,7 @@
           <a:p>
             <a:fld id="{F7249F8D-641B-4CAF-BAE5-10524742F6F1}" type="datetimeFigureOut">
               <a:rPr lang="en-CA" smtClean="0"/>
-              <a:t>2018-07-03</a:t>
+              <a:t>2018-07-18</a:t>
             </a:fld>
             <a:endParaRPr lang="en-CA"/>
           </a:p>
@@ -771,7 +771,7 @@
           <a:p>
             <a:fld id="{F7249F8D-641B-4CAF-BAE5-10524742F6F1}" type="datetimeFigureOut">
               <a:rPr lang="en-CA" smtClean="0"/>
-              <a:t>2018-07-03</a:t>
+              <a:t>2018-07-18</a:t>
             </a:fld>
             <a:endParaRPr lang="en-CA"/>
           </a:p>
@@ -1017,7 +1017,7 @@
           <a:p>
             <a:fld id="{F7249F8D-641B-4CAF-BAE5-10524742F6F1}" type="datetimeFigureOut">
               <a:rPr lang="en-CA" smtClean="0"/>
-              <a:t>2018-07-03</a:t>
+              <a:t>2018-07-18</a:t>
             </a:fld>
             <a:endParaRPr lang="en-CA"/>
           </a:p>
@@ -1249,7 +1249,7 @@
           <a:p>
             <a:fld id="{F7249F8D-641B-4CAF-BAE5-10524742F6F1}" type="datetimeFigureOut">
               <a:rPr lang="en-CA" smtClean="0"/>
-              <a:t>2018-07-03</a:t>
+              <a:t>2018-07-18</a:t>
             </a:fld>
             <a:endParaRPr lang="en-CA"/>
           </a:p>
@@ -1616,7 +1616,7 @@
           <a:p>
             <a:fld id="{F7249F8D-641B-4CAF-BAE5-10524742F6F1}" type="datetimeFigureOut">
               <a:rPr lang="en-CA" smtClean="0"/>
-              <a:t>2018-07-03</a:t>
+              <a:t>2018-07-18</a:t>
             </a:fld>
             <a:endParaRPr lang="en-CA"/>
           </a:p>
@@ -1734,7 +1734,7 @@
           <a:p>
             <a:fld id="{F7249F8D-641B-4CAF-BAE5-10524742F6F1}" type="datetimeFigureOut">
               <a:rPr lang="en-CA" smtClean="0"/>
-              <a:t>2018-07-03</a:t>
+              <a:t>2018-07-18</a:t>
             </a:fld>
             <a:endParaRPr lang="en-CA"/>
           </a:p>
@@ -1829,7 +1829,7 @@
           <a:p>
             <a:fld id="{F7249F8D-641B-4CAF-BAE5-10524742F6F1}" type="datetimeFigureOut">
               <a:rPr lang="en-CA" smtClean="0"/>
-              <a:t>2018-07-03</a:t>
+              <a:t>2018-07-18</a:t>
             </a:fld>
             <a:endParaRPr lang="en-CA"/>
           </a:p>
@@ -2106,7 +2106,7 @@
           <a:p>
             <a:fld id="{F7249F8D-641B-4CAF-BAE5-10524742F6F1}" type="datetimeFigureOut">
               <a:rPr lang="en-CA" smtClean="0"/>
-              <a:t>2018-07-03</a:t>
+              <a:t>2018-07-18</a:t>
             </a:fld>
             <a:endParaRPr lang="en-CA"/>
           </a:p>
@@ -2359,7 +2359,7 @@
           <a:p>
             <a:fld id="{F7249F8D-641B-4CAF-BAE5-10524742F6F1}" type="datetimeFigureOut">
               <a:rPr lang="en-CA" smtClean="0"/>
-              <a:t>2018-07-03</a:t>
+              <a:t>2018-07-18</a:t>
             </a:fld>
             <a:endParaRPr lang="en-CA"/>
           </a:p>
@@ -2572,7 +2572,7 @@
           <a:p>
             <a:fld id="{F7249F8D-641B-4CAF-BAE5-10524742F6F1}" type="datetimeFigureOut">
               <a:rPr lang="en-CA" smtClean="0"/>
-              <a:t>2018-07-03</a:t>
+              <a:t>2018-07-18</a:t>
             </a:fld>
             <a:endParaRPr lang="en-CA"/>
           </a:p>
@@ -12869,8 +12869,8 @@
             </p:txBody>
           </p:sp>
         </p:grpSp>
-        <mc:AlternateContent xmlns:mc="http://schemas.openxmlformats.org/markup-compatibility/2006">
-          <mc:Choice xmlns:a14="http://schemas.microsoft.com/office/drawing/2010/main" Requires="a14">
+        <mc:AlternateContent xmlns:mc="http://schemas.openxmlformats.org/markup-compatibility/2006" xmlns:a14="http://schemas.microsoft.com/office/drawing/2010/main">
+          <mc:Choice Requires="a14">
             <p:sp>
               <p:nvSpPr>
                 <p:cNvPr id="70" name="TextBox 69"/>
@@ -12932,7 +12932,7 @@
               </p:txBody>
             </p:sp>
           </mc:Choice>
-          <mc:Fallback>
+          <mc:Fallback xmlns="">
             <p:sp>
               <p:nvSpPr>
                 <p:cNvPr id="70" name="TextBox 69"/>
@@ -13928,8 +13928,8 @@
                 </a:fontRef>
               </p:style>
             </p:cxnSp>
-            <mc:AlternateContent xmlns:mc="http://schemas.openxmlformats.org/markup-compatibility/2006">
-              <mc:Choice xmlns:a14="http://schemas.microsoft.com/office/drawing/2010/main" Requires="a14">
+            <mc:AlternateContent xmlns:mc="http://schemas.openxmlformats.org/markup-compatibility/2006" xmlns:a14="http://schemas.microsoft.com/office/drawing/2010/main">
+              <mc:Choice Requires="a14">
                 <p:sp>
                   <p:nvSpPr>
                     <p:cNvPr id="80" name="TextBox 79"/>
@@ -13977,7 +13977,7 @@
                   </p:txBody>
                 </p:sp>
               </mc:Choice>
-              <mc:Fallback>
+              <mc:Fallback xmlns="">
                 <p:sp>
                   <p:nvSpPr>
                     <p:cNvPr id="80" name="TextBox 79"/>
@@ -14016,8 +14016,8 @@
                 </p:sp>
               </mc:Fallback>
             </mc:AlternateContent>
-            <mc:AlternateContent xmlns:mc="http://schemas.openxmlformats.org/markup-compatibility/2006">
-              <mc:Choice xmlns:a14="http://schemas.microsoft.com/office/drawing/2010/main" Requires="a14">
+            <mc:AlternateContent xmlns:mc="http://schemas.openxmlformats.org/markup-compatibility/2006" xmlns:a14="http://schemas.microsoft.com/office/drawing/2010/main">
+              <mc:Choice Requires="a14">
                 <p:sp>
                   <p:nvSpPr>
                     <p:cNvPr id="102" name="TextBox 101"/>
@@ -14065,7 +14065,7 @@
                   </p:txBody>
                 </p:sp>
               </mc:Choice>
-              <mc:Fallback>
+              <mc:Fallback xmlns="">
                 <p:sp>
                   <p:nvSpPr>
                     <p:cNvPr id="102" name="TextBox 101"/>
@@ -14105,8 +14105,8 @@
               </mc:Fallback>
             </mc:AlternateContent>
           </p:grpSp>
-          <mc:AlternateContent xmlns:mc="http://schemas.openxmlformats.org/markup-compatibility/2006">
-            <mc:Choice xmlns:a14="http://schemas.microsoft.com/office/drawing/2010/main" Requires="a14">
+          <mc:AlternateContent xmlns:mc="http://schemas.openxmlformats.org/markup-compatibility/2006" xmlns:a14="http://schemas.microsoft.com/office/drawing/2010/main">
+            <mc:Choice Requires="a14">
               <p:sp>
                 <p:nvSpPr>
                   <p:cNvPr id="55" name="TextBox 54"/>
@@ -14154,7 +14154,7 @@
                 </p:txBody>
               </p:sp>
             </mc:Choice>
-            <mc:Fallback>
+            <mc:Fallback xmlns="">
               <p:sp>
                 <p:nvSpPr>
                   <p:cNvPr id="55" name="TextBox 54"/>
@@ -14280,8 +14280,8 @@
             </a:fontRef>
           </p:style>
         </p:cxnSp>
-        <mc:AlternateContent xmlns:mc="http://schemas.openxmlformats.org/markup-compatibility/2006">
-          <mc:Choice xmlns:a14="http://schemas.microsoft.com/office/drawing/2010/main" Requires="a14">
+        <mc:AlternateContent xmlns:mc="http://schemas.openxmlformats.org/markup-compatibility/2006" xmlns:a14="http://schemas.microsoft.com/office/drawing/2010/main">
+          <mc:Choice Requires="a14">
             <p:sp>
               <p:nvSpPr>
                 <p:cNvPr id="109" name="TextBox 108"/>
@@ -14329,7 +14329,7 @@
               </p:txBody>
             </p:sp>
           </mc:Choice>
-          <mc:Fallback>
+          <mc:Fallback xmlns="">
             <p:sp>
               <p:nvSpPr>
                 <p:cNvPr id="109" name="TextBox 108"/>
@@ -14601,8 +14601,8 @@
           </a:fontRef>
         </p:style>
       </p:cxnSp>
-      <mc:AlternateContent xmlns:mc="http://schemas.openxmlformats.org/markup-compatibility/2006">
-        <mc:Choice xmlns:a14="http://schemas.microsoft.com/office/drawing/2010/main" Requires="a14">
+      <mc:AlternateContent xmlns:mc="http://schemas.openxmlformats.org/markup-compatibility/2006" xmlns:a14="http://schemas.microsoft.com/office/drawing/2010/main">
+        <mc:Choice Requires="a14">
           <p:sp>
             <p:nvSpPr>
               <p:cNvPr id="35" name="TextBox 34"/>
@@ -14650,7 +14650,7 @@
             </p:txBody>
           </p:sp>
         </mc:Choice>
-        <mc:Fallback>
+        <mc:Fallback xmlns="">
           <p:sp>
             <p:nvSpPr>
               <p:cNvPr id="35" name="TextBox 34"/>
@@ -14689,8 +14689,8 @@
           </p:sp>
         </mc:Fallback>
       </mc:AlternateContent>
-      <mc:AlternateContent xmlns:mc="http://schemas.openxmlformats.org/markup-compatibility/2006">
-        <mc:Choice xmlns:a14="http://schemas.microsoft.com/office/drawing/2010/main" Requires="a14">
+      <mc:AlternateContent xmlns:mc="http://schemas.openxmlformats.org/markup-compatibility/2006" xmlns:a14="http://schemas.microsoft.com/office/drawing/2010/main">
+        <mc:Choice Requires="a14">
           <p:sp>
             <p:nvSpPr>
               <p:cNvPr id="38" name="TextBox 37"/>
@@ -14785,7 +14785,7 @@
             </p:txBody>
           </p:sp>
         </mc:Choice>
-        <mc:Fallback>
+        <mc:Fallback xmlns="">
           <p:sp>
             <p:nvSpPr>
               <p:cNvPr id="38" name="TextBox 37"/>
@@ -15115,8 +15115,8 @@
           </a:fontRef>
         </p:style>
       </p:cxnSp>
-      <mc:AlternateContent xmlns:mc="http://schemas.openxmlformats.org/markup-compatibility/2006">
-        <mc:Choice xmlns:a14="http://schemas.microsoft.com/office/drawing/2010/main" Requires="a14">
+      <mc:AlternateContent xmlns:mc="http://schemas.openxmlformats.org/markup-compatibility/2006" xmlns:a14="http://schemas.microsoft.com/office/drawing/2010/main">
+        <mc:Choice Requires="a14">
           <p:sp>
             <p:nvSpPr>
               <p:cNvPr id="51" name="TextBox 50"/>
@@ -15196,7 +15196,7 @@
             </p:txBody>
           </p:sp>
         </mc:Choice>
-        <mc:Fallback>
+        <mc:Fallback xmlns="">
           <p:sp>
             <p:nvSpPr>
               <p:cNvPr id="51" name="TextBox 50"/>
@@ -15235,8 +15235,8 @@
           </p:sp>
         </mc:Fallback>
       </mc:AlternateContent>
-      <mc:AlternateContent xmlns:mc="http://schemas.openxmlformats.org/markup-compatibility/2006">
-        <mc:Choice xmlns:a14="http://schemas.microsoft.com/office/drawing/2010/main" Requires="a14">
+      <mc:AlternateContent xmlns:mc="http://schemas.openxmlformats.org/markup-compatibility/2006" xmlns:a14="http://schemas.microsoft.com/office/drawing/2010/main">
+        <mc:Choice Requires="a14">
           <p:sp>
             <p:nvSpPr>
               <p:cNvPr id="57" name="TextBox 56"/>
@@ -15284,7 +15284,7 @@
             </p:txBody>
           </p:sp>
         </mc:Choice>
-        <mc:Fallback>
+        <mc:Fallback xmlns="">
           <p:sp>
             <p:nvSpPr>
               <p:cNvPr id="57" name="TextBox 56"/>
@@ -15323,8 +15323,8 @@
           </p:sp>
         </mc:Fallback>
       </mc:AlternateContent>
-      <mc:AlternateContent xmlns:mc="http://schemas.openxmlformats.org/markup-compatibility/2006">
-        <mc:Choice xmlns:a14="http://schemas.microsoft.com/office/drawing/2010/main" Requires="a14">
+      <mc:AlternateContent xmlns:mc="http://schemas.openxmlformats.org/markup-compatibility/2006" xmlns:a14="http://schemas.microsoft.com/office/drawing/2010/main">
+        <mc:Choice Requires="a14">
           <p:sp>
             <p:nvSpPr>
               <p:cNvPr id="59" name="TextBox 58"/>
@@ -15372,7 +15372,7 @@
             </p:txBody>
           </p:sp>
         </mc:Choice>
-        <mc:Fallback>
+        <mc:Fallback xmlns="">
           <p:sp>
             <p:nvSpPr>
               <p:cNvPr id="59" name="TextBox 58"/>
@@ -15606,8 +15606,8 @@
                 </a:fontRef>
               </p:style>
             </p:cxnSp>
-            <mc:AlternateContent xmlns:mc="http://schemas.openxmlformats.org/markup-compatibility/2006">
-              <mc:Choice xmlns:a14="http://schemas.microsoft.com/office/drawing/2010/main" Requires="a14">
+            <mc:AlternateContent xmlns:mc="http://schemas.openxmlformats.org/markup-compatibility/2006" xmlns:a14="http://schemas.microsoft.com/office/drawing/2010/main">
+              <mc:Choice Requires="a14">
                 <p:sp>
                   <p:nvSpPr>
                     <p:cNvPr id="119" name="TextBox 118"/>
@@ -15655,7 +15655,7 @@
                   </p:txBody>
                 </p:sp>
               </mc:Choice>
-              <mc:Fallback>
+              <mc:Fallback xmlns="">
                 <p:sp>
                   <p:nvSpPr>
                     <p:cNvPr id="119" name="TextBox 118"/>
@@ -15694,8 +15694,8 @@
                 </p:sp>
               </mc:Fallback>
             </mc:AlternateContent>
-            <mc:AlternateContent xmlns:mc="http://schemas.openxmlformats.org/markup-compatibility/2006">
-              <mc:Choice xmlns:a14="http://schemas.microsoft.com/office/drawing/2010/main" Requires="a14">
+            <mc:AlternateContent xmlns:mc="http://schemas.openxmlformats.org/markup-compatibility/2006" xmlns:a14="http://schemas.microsoft.com/office/drawing/2010/main">
+              <mc:Choice Requires="a14">
                 <p:sp>
                   <p:nvSpPr>
                     <p:cNvPr id="120" name="TextBox 119"/>
@@ -15743,7 +15743,7 @@
                   </p:txBody>
                 </p:sp>
               </mc:Choice>
-              <mc:Fallback>
+              <mc:Fallback xmlns="">
                 <p:sp>
                   <p:nvSpPr>
                     <p:cNvPr id="120" name="TextBox 119"/>
@@ -15830,8 +15830,8 @@
               </p:txBody>
             </p:sp>
           </p:grpSp>
-          <mc:AlternateContent xmlns:mc="http://schemas.openxmlformats.org/markup-compatibility/2006">
-            <mc:Choice xmlns:a14="http://schemas.microsoft.com/office/drawing/2010/main" Requires="a14">
+          <mc:AlternateContent xmlns:mc="http://schemas.openxmlformats.org/markup-compatibility/2006" xmlns:a14="http://schemas.microsoft.com/office/drawing/2010/main">
+            <mc:Choice Requires="a14">
               <p:sp>
                 <p:nvSpPr>
                   <p:cNvPr id="115" name="TextBox 114"/>
@@ -15879,7 +15879,7 @@
                 </p:txBody>
               </p:sp>
             </mc:Choice>
-            <mc:Fallback>
+            <mc:Fallback xmlns="">
               <p:sp>
                 <p:nvSpPr>
                   <p:cNvPr id="115" name="TextBox 114"/>
@@ -16005,8 +16005,8 @@
             </a:fontRef>
           </p:style>
         </p:cxnSp>
-        <mc:AlternateContent xmlns:mc="http://schemas.openxmlformats.org/markup-compatibility/2006">
-          <mc:Choice xmlns:a14="http://schemas.microsoft.com/office/drawing/2010/main" Requires="a14">
+        <mc:AlternateContent xmlns:mc="http://schemas.openxmlformats.org/markup-compatibility/2006" xmlns:a14="http://schemas.microsoft.com/office/drawing/2010/main">
+          <mc:Choice Requires="a14">
             <p:sp>
               <p:nvSpPr>
                 <p:cNvPr id="123" name="TextBox 122"/>
@@ -16054,7 +16054,7 @@
               </p:txBody>
             </p:sp>
           </mc:Choice>
-          <mc:Fallback>
+          <mc:Fallback xmlns="">
             <p:sp>
               <p:nvSpPr>
                 <p:cNvPr id="123" name="TextBox 122"/>
@@ -16132,8 +16132,8 @@
           </a:fontRef>
         </p:style>
       </p:cxnSp>
-      <mc:AlternateContent xmlns:mc="http://schemas.openxmlformats.org/markup-compatibility/2006">
-        <mc:Choice xmlns:a14="http://schemas.microsoft.com/office/drawing/2010/main" Requires="a14">
+      <mc:AlternateContent xmlns:mc="http://schemas.openxmlformats.org/markup-compatibility/2006" xmlns:a14="http://schemas.microsoft.com/office/drawing/2010/main">
+        <mc:Choice Requires="a14">
           <p:sp>
             <p:nvSpPr>
               <p:cNvPr id="125" name="TextBox 124"/>
@@ -16181,7 +16181,7 @@
             </p:txBody>
           </p:sp>
         </mc:Choice>
-        <mc:Fallback>
+        <mc:Fallback xmlns="">
           <p:sp>
             <p:nvSpPr>
               <p:cNvPr id="125" name="TextBox 124"/>
@@ -23419,819 +23419,6 @@
       </p:grpSpPr>
       <p:grpSp>
         <p:nvGrpSpPr>
-          <p:cNvPr id="30" name="Group 29"/>
-          <p:cNvGrpSpPr/>
-          <p:nvPr/>
-        </p:nvGrpSpPr>
-        <p:grpSpPr>
-          <a:xfrm>
-            <a:off x="543151" y="766890"/>
-            <a:ext cx="6365865" cy="996734"/>
-            <a:chOff x="648082" y="2538406"/>
-            <a:chExt cx="6365865" cy="996734"/>
-          </a:xfrm>
-        </p:grpSpPr>
-        <p:cxnSp>
-          <p:nvCxnSpPr>
-            <p:cNvPr id="12" name="Straight Arrow Connector 11"/>
-            <p:cNvCxnSpPr/>
-            <p:nvPr/>
-          </p:nvCxnSpPr>
-          <p:spPr>
-            <a:xfrm flipH="1" flipV="1">
-              <a:off x="700256" y="3096093"/>
-              <a:ext cx="5976000" cy="2"/>
-            </a:xfrm>
-            <a:prstGeom prst="straightConnector1">
-              <a:avLst/>
-            </a:prstGeom>
-            <a:ln w="38100">
-              <a:solidFill>
-                <a:schemeClr val="tx1"/>
-              </a:solidFill>
-              <a:tailEnd type="triangle"/>
-            </a:ln>
-          </p:spPr>
-          <p:style>
-            <a:lnRef idx="1">
-              <a:schemeClr val="accent1"/>
-            </a:lnRef>
-            <a:fillRef idx="0">
-              <a:schemeClr val="accent1"/>
-            </a:fillRef>
-            <a:effectRef idx="0">
-              <a:schemeClr val="accent1"/>
-            </a:effectRef>
-            <a:fontRef idx="minor">
-              <a:schemeClr val="tx1"/>
-            </a:fontRef>
-          </p:style>
-        </p:cxnSp>
-        <p:sp>
-          <p:nvSpPr>
-            <p:cNvPr id="5" name="Rectangle 4"/>
-            <p:cNvSpPr/>
-            <p:nvPr/>
-          </p:nvSpPr>
-          <p:spPr>
-            <a:xfrm>
-              <a:off x="1085618" y="2983041"/>
-              <a:ext cx="3351471" cy="194874"/>
-            </a:xfrm>
-            <a:prstGeom prst="rect">
-              <a:avLst/>
-            </a:prstGeom>
-            <a:solidFill>
-              <a:schemeClr val="bg2"/>
-            </a:solidFill>
-            <a:ln w="38100">
-              <a:solidFill>
-                <a:schemeClr val="tx1"/>
-              </a:solidFill>
-            </a:ln>
-          </p:spPr>
-          <p:style>
-            <a:lnRef idx="2">
-              <a:schemeClr val="accent1">
-                <a:shade val="50000"/>
-              </a:schemeClr>
-            </a:lnRef>
-            <a:fillRef idx="1">
-              <a:schemeClr val="accent1"/>
-            </a:fillRef>
-            <a:effectRef idx="0">
-              <a:schemeClr val="accent1"/>
-            </a:effectRef>
-            <a:fontRef idx="minor">
-              <a:schemeClr val="lt1"/>
-            </a:fontRef>
-          </p:style>
-          <p:txBody>
-            <a:bodyPr rtlCol="0" anchor="ctr"/>
-            <a:lstStyle/>
-            <a:p>
-              <a:pPr algn="ctr"/>
-              <a:endParaRPr lang="en-US"/>
-            </a:p>
-          </p:txBody>
-        </p:sp>
-        <p:sp>
-          <p:nvSpPr>
-            <p:cNvPr id="9" name="Oval 8"/>
-            <p:cNvSpPr/>
-            <p:nvPr/>
-          </p:nvSpPr>
-          <p:spPr>
-            <a:xfrm>
-              <a:off x="6625663" y="3042998"/>
-              <a:ext cx="108000" cy="108000"/>
-            </a:xfrm>
-            <a:prstGeom prst="ellipse">
-              <a:avLst/>
-            </a:prstGeom>
-            <a:solidFill>
-              <a:schemeClr val="tx1"/>
-            </a:solidFill>
-            <a:ln w="38100">
-              <a:solidFill>
-                <a:schemeClr val="tx1"/>
-              </a:solidFill>
-            </a:ln>
-          </p:spPr>
-          <p:style>
-            <a:lnRef idx="2">
-              <a:schemeClr val="accent1">
-                <a:shade val="50000"/>
-              </a:schemeClr>
-            </a:lnRef>
-            <a:fillRef idx="1">
-              <a:schemeClr val="accent1"/>
-            </a:fillRef>
-            <a:effectRef idx="0">
-              <a:schemeClr val="accent1"/>
-            </a:effectRef>
-            <a:fontRef idx="minor">
-              <a:schemeClr val="lt1"/>
-            </a:fontRef>
-          </p:style>
-          <p:txBody>
-            <a:bodyPr rtlCol="0" anchor="ctr"/>
-            <a:lstStyle/>
-            <a:p>
-              <a:pPr algn="ctr"/>
-              <a:endParaRPr lang="en-US"/>
-            </a:p>
-          </p:txBody>
-        </p:sp>
-        <mc:AlternateContent xmlns:mc="http://schemas.openxmlformats.org/markup-compatibility/2006">
-          <mc:Choice xmlns:a14="http://schemas.microsoft.com/office/drawing/2010/main" Requires="a14">
-            <p:sp>
-              <p:nvSpPr>
-                <p:cNvPr id="10" name="TextBox 9"/>
-                <p:cNvSpPr txBox="1"/>
-                <p:nvPr/>
-              </p:nvSpPr>
-              <p:spPr>
-                <a:xfrm>
-                  <a:off x="6667327" y="2657654"/>
-                  <a:ext cx="235513" cy="307777"/>
-                </a:xfrm>
-                <a:prstGeom prst="rect">
-                  <a:avLst/>
-                </a:prstGeom>
-                <a:noFill/>
-              </p:spPr>
-              <p:txBody>
-                <a:bodyPr wrap="none" lIns="0" tIns="0" rIns="0" bIns="0" rtlCol="0">
-                  <a:spAutoFit/>
-                </a:bodyPr>
-                <a:lstStyle/>
-                <a:p>
-                  <a14:m>
-                    <m:oMathPara xmlns:m="http://schemas.openxmlformats.org/officeDocument/2006/math">
-                      <m:oMathParaPr>
-                        <m:jc m:val="centerGroup"/>
-                      </m:oMathParaPr>
-                      <m:oMath xmlns:m="http://schemas.openxmlformats.org/officeDocument/2006/math">
-                        <m:r>
-                          <a:rPr lang="en-CA" sz="2000" b="0" i="1" smtClean="0">
-                            <a:latin typeface="Cambria Math" charset="0"/>
-                            <a:cs typeface="Arial" panose="020B0604020202020204" pitchFamily="34" charset="0"/>
-                          </a:rPr>
-                          <m:t>𝑃</m:t>
-                        </m:r>
-                      </m:oMath>
-                    </m:oMathPara>
-                  </a14:m>
-                  <a:endParaRPr lang="en-US" sz="2000" dirty="0" smtClean="0">
-                    <a:latin typeface="Arial" panose="020B0604020202020204" pitchFamily="34" charset="0"/>
-                    <a:cs typeface="Arial" panose="020B0604020202020204" pitchFamily="34" charset="0"/>
-                  </a:endParaRPr>
-                </a:p>
-              </p:txBody>
-            </p:sp>
-          </mc:Choice>
-          <mc:Fallback>
-            <p:sp>
-              <p:nvSpPr>
-                <p:cNvPr id="10" name="TextBox 9"/>
-                <p:cNvSpPr txBox="1">
-                  <a:spLocks noRot="1" noChangeAspect="1" noMove="1" noResize="1" noEditPoints="1" noAdjustHandles="1" noChangeArrowheads="1" noChangeShapeType="1" noTextEdit="1"/>
-                </p:cNvSpPr>
-                <p:nvPr/>
-              </p:nvSpPr>
-              <p:spPr>
-                <a:xfrm>
-                  <a:off x="6667327" y="2657654"/>
-                  <a:ext cx="235513" cy="307777"/>
-                </a:xfrm>
-                <a:prstGeom prst="rect">
-                  <a:avLst/>
-                </a:prstGeom>
-                <a:blipFill rotWithShape="0">
-                  <a:blip r:embed="rId2"/>
-                  <a:stretch>
-                    <a:fillRect l="-23684" r="-21053" b="-9804"/>
-                  </a:stretch>
-                </a:blipFill>
-              </p:spPr>
-              <p:txBody>
-                <a:bodyPr/>
-                <a:lstStyle/>
-                <a:p>
-                  <a:r>
-                    <a:rPr lang="en-US">
-                      <a:noFill/>
-                    </a:rPr>
-                    <a:t> </a:t>
-                  </a:r>
-                </a:p>
-              </p:txBody>
-            </p:sp>
-          </mc:Fallback>
-        </mc:AlternateContent>
-        <mc:AlternateContent xmlns:mc="http://schemas.openxmlformats.org/markup-compatibility/2006">
-          <mc:Choice xmlns:a14="http://schemas.microsoft.com/office/drawing/2010/main" Requires="a14">
-            <p:sp>
-              <p:nvSpPr>
-                <p:cNvPr id="28" name="TextBox 27"/>
-                <p:cNvSpPr txBox="1"/>
-                <p:nvPr/>
-              </p:nvSpPr>
-              <p:spPr>
-                <a:xfrm>
-                  <a:off x="648082" y="2707058"/>
-                  <a:ext cx="214546" cy="307777"/>
-                </a:xfrm>
-                <a:prstGeom prst="rect">
-                  <a:avLst/>
-                </a:prstGeom>
-                <a:noFill/>
-              </p:spPr>
-              <p:txBody>
-                <a:bodyPr wrap="none" lIns="0" tIns="0" rIns="0" bIns="0" rtlCol="0">
-                  <a:spAutoFit/>
-                </a:bodyPr>
-                <a:lstStyle/>
-                <a:p>
-                  <a14:m>
-                    <m:oMathPara xmlns:m="http://schemas.openxmlformats.org/officeDocument/2006/math">
-                      <m:oMathParaPr>
-                        <m:jc m:val="centerGroup"/>
-                      </m:oMathParaPr>
-                      <m:oMath xmlns:m="http://schemas.openxmlformats.org/officeDocument/2006/math">
-                        <m:r>
-                          <a:rPr lang="en-CA" sz="2000" b="0" i="1" smtClean="0">
-                            <a:latin typeface="Cambria Math" charset="0"/>
-                            <a:cs typeface="Arial" panose="020B0604020202020204" pitchFamily="34" charset="0"/>
-                          </a:rPr>
-                          <m:t>𝑥</m:t>
-                        </m:r>
-                      </m:oMath>
-                    </m:oMathPara>
-                  </a14:m>
-                  <a:endParaRPr lang="en-US" sz="2000" dirty="0" smtClean="0">
-                    <a:latin typeface="Arial" panose="020B0604020202020204" pitchFamily="34" charset="0"/>
-                    <a:cs typeface="Arial" panose="020B0604020202020204" pitchFamily="34" charset="0"/>
-                  </a:endParaRPr>
-                </a:p>
-              </p:txBody>
-            </p:sp>
-          </mc:Choice>
-          <mc:Fallback>
-            <p:sp>
-              <p:nvSpPr>
-                <p:cNvPr id="28" name="TextBox 27"/>
-                <p:cNvSpPr txBox="1">
-                  <a:spLocks noRot="1" noChangeAspect="1" noMove="1" noResize="1" noEditPoints="1" noAdjustHandles="1" noChangeArrowheads="1" noChangeShapeType="1" noTextEdit="1"/>
-                </p:cNvSpPr>
-                <p:nvPr/>
-              </p:nvSpPr>
-              <p:spPr>
-                <a:xfrm>
-                  <a:off x="648082" y="2707058"/>
-                  <a:ext cx="214546" cy="307777"/>
-                </a:xfrm>
-                <a:prstGeom prst="rect">
-                  <a:avLst/>
-                </a:prstGeom>
-                <a:blipFill rotWithShape="0">
-                  <a:blip r:embed="rId3"/>
-                  <a:stretch>
-                    <a:fillRect l="-11429" r="-11429" b="-1961"/>
-                  </a:stretch>
-                </a:blipFill>
-              </p:spPr>
-              <p:txBody>
-                <a:bodyPr/>
-                <a:lstStyle/>
-                <a:p>
-                  <a:r>
-                    <a:rPr lang="en-US">
-                      <a:noFill/>
-                    </a:rPr>
-                    <a:t> </a:t>
-                  </a:r>
-                </a:p>
-              </p:txBody>
-            </p:sp>
-          </mc:Fallback>
-        </mc:AlternateContent>
-        <mc:AlternateContent xmlns:mc="http://schemas.openxmlformats.org/markup-compatibility/2006">
-          <mc:Choice xmlns:a14="http://schemas.microsoft.com/office/drawing/2010/main" Requires="a14">
-            <p:sp>
-              <p:nvSpPr>
-                <p:cNvPr id="31" name="TextBox 30"/>
-                <p:cNvSpPr txBox="1"/>
-                <p:nvPr/>
-              </p:nvSpPr>
-              <p:spPr>
-                <a:xfrm>
-                  <a:off x="6800748" y="2919586"/>
-                  <a:ext cx="213199" cy="307777"/>
-                </a:xfrm>
-                <a:prstGeom prst="rect">
-                  <a:avLst/>
-                </a:prstGeom>
-                <a:noFill/>
-              </p:spPr>
-              <p:txBody>
-                <a:bodyPr wrap="none" lIns="0" tIns="0" rIns="0" bIns="0" rtlCol="0">
-                  <a:spAutoFit/>
-                </a:bodyPr>
-                <a:lstStyle/>
-                <a:p>
-                  <a14:m>
-                    <m:oMathPara xmlns:m="http://schemas.openxmlformats.org/officeDocument/2006/math">
-                      <m:oMathParaPr>
-                        <m:jc m:val="centerGroup"/>
-                      </m:oMathParaPr>
-                      <m:oMath xmlns:m="http://schemas.openxmlformats.org/officeDocument/2006/math">
-                        <m:r>
-                          <a:rPr lang="en-CA" sz="2000" b="0" i="1" smtClean="0">
-                            <a:latin typeface="Cambria Math" charset="0"/>
-                            <a:cs typeface="Arial" panose="020B0604020202020204" pitchFamily="34" charset="0"/>
-                          </a:rPr>
-                          <m:t>0</m:t>
-                        </m:r>
-                      </m:oMath>
-                    </m:oMathPara>
-                  </a14:m>
-                  <a:endParaRPr lang="en-US" sz="2000" dirty="0" smtClean="0">
-                    <a:latin typeface="Arial" panose="020B0604020202020204" pitchFamily="34" charset="0"/>
-                    <a:cs typeface="Arial" panose="020B0604020202020204" pitchFamily="34" charset="0"/>
-                  </a:endParaRPr>
-                </a:p>
-              </p:txBody>
-            </p:sp>
-          </mc:Choice>
-          <mc:Fallback>
-            <p:sp>
-              <p:nvSpPr>
-                <p:cNvPr id="31" name="TextBox 30"/>
-                <p:cNvSpPr txBox="1">
-                  <a:spLocks noRot="1" noChangeAspect="1" noMove="1" noResize="1" noEditPoints="1" noAdjustHandles="1" noChangeArrowheads="1" noChangeShapeType="1" noTextEdit="1"/>
-                </p:cNvSpPr>
-                <p:nvPr/>
-              </p:nvSpPr>
-              <p:spPr>
-                <a:xfrm>
-                  <a:off x="6800748" y="2919586"/>
-                  <a:ext cx="213199" cy="307777"/>
-                </a:xfrm>
-                <a:prstGeom prst="rect">
-                  <a:avLst/>
-                </a:prstGeom>
-                <a:blipFill rotWithShape="0">
-                  <a:blip r:embed="rId4"/>
-                  <a:stretch>
-                    <a:fillRect l="-25714" r="-25714" b="-11765"/>
-                  </a:stretch>
-                </a:blipFill>
-              </p:spPr>
-              <p:txBody>
-                <a:bodyPr/>
-                <a:lstStyle/>
-                <a:p>
-                  <a:r>
-                    <a:rPr lang="en-US">
-                      <a:noFill/>
-                    </a:rPr>
-                    <a:t> </a:t>
-                  </a:r>
-                </a:p>
-              </p:txBody>
-            </p:sp>
-          </mc:Fallback>
-        </mc:AlternateContent>
-        <mc:AlternateContent xmlns:mc="http://schemas.openxmlformats.org/markup-compatibility/2006">
-          <mc:Choice xmlns:a14="http://schemas.microsoft.com/office/drawing/2010/main" Requires="a14">
-            <p:sp>
-              <p:nvSpPr>
-                <p:cNvPr id="32" name="TextBox 31"/>
-                <p:cNvSpPr txBox="1"/>
-                <p:nvPr/>
-              </p:nvSpPr>
-              <p:spPr>
-                <a:xfrm>
-                  <a:off x="2315108" y="3227363"/>
-                  <a:ext cx="385237" cy="307777"/>
-                </a:xfrm>
-                <a:prstGeom prst="rect">
-                  <a:avLst/>
-                </a:prstGeom>
-                <a:noFill/>
-              </p:spPr>
-              <p:txBody>
-                <a:bodyPr wrap="square" lIns="0" tIns="0" rIns="0" bIns="0" rtlCol="0">
-                  <a:spAutoFit/>
-                </a:bodyPr>
-                <a:lstStyle/>
-                <a:p>
-                  <a14:m>
-                    <m:oMathPara xmlns:m="http://schemas.openxmlformats.org/officeDocument/2006/math">
-                      <m:oMathParaPr>
-                        <m:jc m:val="centerGroup"/>
-                      </m:oMathParaPr>
-                      <m:oMath xmlns:m="http://schemas.openxmlformats.org/officeDocument/2006/math">
-                        <m:r>
-                          <a:rPr lang="en-CA" sz="2000" b="0" i="1" smtClean="0">
-                            <a:latin typeface="Cambria Math" charset="0"/>
-                            <a:cs typeface="Arial" panose="020B0604020202020204" pitchFamily="34" charset="0"/>
-                          </a:rPr>
-                          <m:t>𝑀</m:t>
-                        </m:r>
-                      </m:oMath>
-                    </m:oMathPara>
-                  </a14:m>
-                  <a:endParaRPr lang="en-US" sz="2000" dirty="0" smtClean="0">
-                    <a:latin typeface="Arial" panose="020B0604020202020204" pitchFamily="34" charset="0"/>
-                    <a:cs typeface="Arial" panose="020B0604020202020204" pitchFamily="34" charset="0"/>
-                  </a:endParaRPr>
-                </a:p>
-              </p:txBody>
-            </p:sp>
-          </mc:Choice>
-          <mc:Fallback>
-            <p:sp>
-              <p:nvSpPr>
-                <p:cNvPr id="32" name="TextBox 31"/>
-                <p:cNvSpPr txBox="1">
-                  <a:spLocks noRot="1" noChangeAspect="1" noMove="1" noResize="1" noEditPoints="1" noAdjustHandles="1" noChangeArrowheads="1" noChangeShapeType="1" noTextEdit="1"/>
-                </p:cNvSpPr>
-                <p:nvPr/>
-              </p:nvSpPr>
-              <p:spPr>
-                <a:xfrm>
-                  <a:off x="2315108" y="3227363"/>
-                  <a:ext cx="385237" cy="307777"/>
-                </a:xfrm>
-                <a:prstGeom prst="rect">
-                  <a:avLst/>
-                </a:prstGeom>
-                <a:blipFill rotWithShape="0">
-                  <a:blip r:embed="rId5"/>
-                  <a:stretch>
-                    <a:fillRect l="-3175" b="-10000"/>
-                  </a:stretch>
-                </a:blipFill>
-              </p:spPr>
-              <p:txBody>
-                <a:bodyPr/>
-                <a:lstStyle/>
-                <a:p>
-                  <a:r>
-                    <a:rPr lang="en-US">
-                      <a:noFill/>
-                    </a:rPr>
-                    <a:t> </a:t>
-                  </a:r>
-                </a:p>
-              </p:txBody>
-            </p:sp>
-          </mc:Fallback>
-        </mc:AlternateContent>
-        <mc:AlternateContent xmlns:mc="http://schemas.openxmlformats.org/markup-compatibility/2006">
-          <mc:Choice xmlns:a14="http://schemas.microsoft.com/office/drawing/2010/main" Requires="a14">
-            <p:sp>
-              <p:nvSpPr>
-                <p:cNvPr id="33" name="TextBox 32"/>
-                <p:cNvSpPr txBox="1"/>
-                <p:nvPr/>
-              </p:nvSpPr>
-              <p:spPr>
-                <a:xfrm>
-                  <a:off x="2655330" y="2538406"/>
-                  <a:ext cx="212046" cy="307777"/>
-                </a:xfrm>
-                <a:prstGeom prst="rect">
-                  <a:avLst/>
-                </a:prstGeom>
-                <a:noFill/>
-              </p:spPr>
-              <p:txBody>
-                <a:bodyPr wrap="none" lIns="0" tIns="0" rIns="0" bIns="0" rtlCol="0">
-                  <a:spAutoFit/>
-                </a:bodyPr>
-                <a:lstStyle/>
-                <a:p>
-                  <a14:m>
-                    <m:oMathPara xmlns:m="http://schemas.openxmlformats.org/officeDocument/2006/math">
-                      <m:oMathParaPr>
-                        <m:jc m:val="centerGroup"/>
-                      </m:oMathParaPr>
-                      <m:oMath xmlns:m="http://schemas.openxmlformats.org/officeDocument/2006/math">
-                        <m:r>
-                          <a:rPr lang="en-CA" sz="2000" b="0" i="1" smtClean="0">
-                            <a:latin typeface="Cambria Math" charset="0"/>
-                            <a:cs typeface="Arial" panose="020B0604020202020204" pitchFamily="34" charset="0"/>
-                          </a:rPr>
-                          <m:t>𝐿</m:t>
-                        </m:r>
-                      </m:oMath>
-                    </m:oMathPara>
-                  </a14:m>
-                  <a:endParaRPr lang="en-US" sz="2000" dirty="0" smtClean="0">
-                    <a:latin typeface="Arial" panose="020B0604020202020204" pitchFamily="34" charset="0"/>
-                    <a:cs typeface="Arial" panose="020B0604020202020204" pitchFamily="34" charset="0"/>
-                  </a:endParaRPr>
-                </a:p>
-              </p:txBody>
-            </p:sp>
-          </mc:Choice>
-          <mc:Fallback>
-            <p:sp>
-              <p:nvSpPr>
-                <p:cNvPr id="33" name="TextBox 32"/>
-                <p:cNvSpPr txBox="1">
-                  <a:spLocks noRot="1" noChangeAspect="1" noMove="1" noResize="1" noEditPoints="1" noAdjustHandles="1" noChangeArrowheads="1" noChangeShapeType="1" noTextEdit="1"/>
-                </p:cNvSpPr>
-                <p:nvPr/>
-              </p:nvSpPr>
-              <p:spPr>
-                <a:xfrm>
-                  <a:off x="2655330" y="2538406"/>
-                  <a:ext cx="212046" cy="307777"/>
-                </a:xfrm>
-                <a:prstGeom prst="rect">
-                  <a:avLst/>
-                </a:prstGeom>
-                <a:blipFill rotWithShape="0">
-                  <a:blip r:embed="rId6"/>
-                  <a:stretch>
-                    <a:fillRect l="-22857" r="-22857" b="-10000"/>
-                  </a:stretch>
-                </a:blipFill>
-              </p:spPr>
-              <p:txBody>
-                <a:bodyPr/>
-                <a:lstStyle/>
-                <a:p>
-                  <a:r>
-                    <a:rPr lang="en-US">
-                      <a:noFill/>
-                    </a:rPr>
-                    <a:t> </a:t>
-                  </a:r>
-                </a:p>
-              </p:txBody>
-            </p:sp>
-          </mc:Fallback>
-        </mc:AlternateContent>
-        <p:cxnSp>
-          <p:nvCxnSpPr>
-            <p:cNvPr id="24" name="Straight Arrow Connector 23"/>
-            <p:cNvCxnSpPr/>
-            <p:nvPr/>
-          </p:nvCxnSpPr>
-          <p:spPr>
-            <a:xfrm flipH="1">
-              <a:off x="1070628" y="2692294"/>
-              <a:ext cx="1476000" cy="0"/>
-            </a:xfrm>
-            <a:prstGeom prst="straightConnector1">
-              <a:avLst/>
-            </a:prstGeom>
-            <a:ln w="38100">
-              <a:solidFill>
-                <a:schemeClr val="tx1"/>
-              </a:solidFill>
-              <a:tailEnd type="triangle"/>
-            </a:ln>
-          </p:spPr>
-          <p:style>
-            <a:lnRef idx="1">
-              <a:schemeClr val="accent1"/>
-            </a:lnRef>
-            <a:fillRef idx="0">
-              <a:schemeClr val="accent1"/>
-            </a:fillRef>
-            <a:effectRef idx="0">
-              <a:schemeClr val="accent1"/>
-            </a:effectRef>
-            <a:fontRef idx="minor">
-              <a:schemeClr val="tx1"/>
-            </a:fontRef>
-          </p:style>
-        </p:cxnSp>
-        <p:cxnSp>
-          <p:nvCxnSpPr>
-            <p:cNvPr id="36" name="Straight Arrow Connector 35"/>
-            <p:cNvCxnSpPr/>
-            <p:nvPr/>
-          </p:nvCxnSpPr>
-          <p:spPr>
-            <a:xfrm>
-              <a:off x="3009129" y="2692294"/>
-              <a:ext cx="1476000" cy="0"/>
-            </a:xfrm>
-            <a:prstGeom prst="straightConnector1">
-              <a:avLst/>
-            </a:prstGeom>
-            <a:ln w="38100">
-              <a:solidFill>
-                <a:schemeClr val="tx1"/>
-              </a:solidFill>
-              <a:tailEnd type="triangle"/>
-            </a:ln>
-          </p:spPr>
-          <p:style>
-            <a:lnRef idx="1">
-              <a:schemeClr val="accent1"/>
-            </a:lnRef>
-            <a:fillRef idx="0">
-              <a:schemeClr val="accent1"/>
-            </a:fillRef>
-            <a:effectRef idx="0">
-              <a:schemeClr val="accent1"/>
-            </a:effectRef>
-            <a:fontRef idx="minor">
-              <a:schemeClr val="tx1"/>
-            </a:fontRef>
-          </p:style>
-        </p:cxnSp>
-        <mc:AlternateContent xmlns:mc="http://schemas.openxmlformats.org/markup-compatibility/2006">
-          <mc:Choice xmlns:a14="http://schemas.microsoft.com/office/drawing/2010/main" Requires="a14">
-            <p:sp>
-              <p:nvSpPr>
-                <p:cNvPr id="37" name="TextBox 36"/>
-                <p:cNvSpPr txBox="1"/>
-                <p:nvPr/>
-              </p:nvSpPr>
-              <p:spPr>
-                <a:xfrm>
-                  <a:off x="5514409" y="2543564"/>
-                  <a:ext cx="212046" cy="307777"/>
-                </a:xfrm>
-                <a:prstGeom prst="rect">
-                  <a:avLst/>
-                </a:prstGeom>
-                <a:noFill/>
-              </p:spPr>
-              <p:txBody>
-                <a:bodyPr wrap="square" lIns="0" tIns="0" rIns="0" bIns="0" rtlCol="0">
-                  <a:spAutoFit/>
-                </a:bodyPr>
-                <a:lstStyle/>
-                <a:p>
-                  <a14:m>
-                    <m:oMathPara xmlns:m="http://schemas.openxmlformats.org/officeDocument/2006/math">
-                      <m:oMathParaPr>
-                        <m:jc m:val="centerGroup"/>
-                      </m:oMathParaPr>
-                      <m:oMath xmlns:m="http://schemas.openxmlformats.org/officeDocument/2006/math">
-                        <m:r>
-                          <a:rPr lang="en-CA" sz="2000" b="0" i="1" smtClean="0">
-                            <a:latin typeface="Cambria Math" charset="0"/>
-                            <a:cs typeface="Arial" panose="020B0604020202020204" pitchFamily="34" charset="0"/>
-                          </a:rPr>
-                          <m:t>𝑑</m:t>
-                        </m:r>
-                      </m:oMath>
-                    </m:oMathPara>
-                  </a14:m>
-                  <a:endParaRPr lang="en-US" sz="2000" dirty="0" smtClean="0">
-                    <a:latin typeface="Arial" panose="020B0604020202020204" pitchFamily="34" charset="0"/>
-                    <a:cs typeface="Arial" panose="020B0604020202020204" pitchFamily="34" charset="0"/>
-                  </a:endParaRPr>
-                </a:p>
-              </p:txBody>
-            </p:sp>
-          </mc:Choice>
-          <mc:Fallback>
-            <p:sp>
-              <p:nvSpPr>
-                <p:cNvPr id="37" name="TextBox 36"/>
-                <p:cNvSpPr txBox="1">
-                  <a:spLocks noRot="1" noChangeAspect="1" noMove="1" noResize="1" noEditPoints="1" noAdjustHandles="1" noChangeArrowheads="1" noChangeShapeType="1" noTextEdit="1"/>
-                </p:cNvSpPr>
-                <p:nvPr/>
-              </p:nvSpPr>
-              <p:spPr>
-                <a:xfrm>
-                  <a:off x="5514409" y="2543564"/>
-                  <a:ext cx="212046" cy="307777"/>
-                </a:xfrm>
-                <a:prstGeom prst="rect">
-                  <a:avLst/>
-                </a:prstGeom>
-                <a:blipFill rotWithShape="0">
-                  <a:blip r:embed="rId7"/>
-                  <a:stretch>
-                    <a:fillRect l="-28571" r="-28571" b="-14000"/>
-                  </a:stretch>
-                </a:blipFill>
-              </p:spPr>
-              <p:txBody>
-                <a:bodyPr/>
-                <a:lstStyle/>
-                <a:p>
-                  <a:r>
-                    <a:rPr lang="en-US">
-                      <a:noFill/>
-                    </a:rPr>
-                    <a:t> </a:t>
-                  </a:r>
-                </a:p>
-              </p:txBody>
-            </p:sp>
-          </mc:Fallback>
-        </mc:AlternateContent>
-        <p:cxnSp>
-          <p:nvCxnSpPr>
-            <p:cNvPr id="38" name="Straight Arrow Connector 37"/>
-            <p:cNvCxnSpPr/>
-            <p:nvPr/>
-          </p:nvCxnSpPr>
-          <p:spPr>
-            <a:xfrm flipH="1">
-              <a:off x="4562261" y="2697453"/>
-              <a:ext cx="800066" cy="0"/>
-            </a:xfrm>
-            <a:prstGeom prst="straightConnector1">
-              <a:avLst/>
-            </a:prstGeom>
-            <a:ln w="38100">
-              <a:solidFill>
-                <a:schemeClr val="tx1"/>
-              </a:solidFill>
-              <a:tailEnd type="triangle"/>
-            </a:ln>
-          </p:spPr>
-          <p:style>
-            <a:lnRef idx="1">
-              <a:schemeClr val="accent1"/>
-            </a:lnRef>
-            <a:fillRef idx="0">
-              <a:schemeClr val="accent1"/>
-            </a:fillRef>
-            <a:effectRef idx="0">
-              <a:schemeClr val="accent1"/>
-            </a:effectRef>
-            <a:fontRef idx="minor">
-              <a:schemeClr val="tx1"/>
-            </a:fontRef>
-          </p:style>
-        </p:cxnSp>
-        <p:cxnSp>
-          <p:nvCxnSpPr>
-            <p:cNvPr id="46" name="Straight Arrow Connector 45"/>
-            <p:cNvCxnSpPr/>
-            <p:nvPr/>
-          </p:nvCxnSpPr>
-          <p:spPr>
-            <a:xfrm flipV="1">
-              <a:off x="5878537" y="2692294"/>
-              <a:ext cx="738000" cy="7938"/>
-            </a:xfrm>
-            <a:prstGeom prst="straightConnector1">
-              <a:avLst/>
-            </a:prstGeom>
-            <a:ln w="38100">
-              <a:solidFill>
-                <a:schemeClr val="tx1"/>
-              </a:solidFill>
-              <a:tailEnd type="triangle"/>
-            </a:ln>
-          </p:spPr>
-          <p:style>
-            <a:lnRef idx="1">
-              <a:schemeClr val="accent1"/>
-            </a:lnRef>
-            <a:fillRef idx="0">
-              <a:schemeClr val="accent1"/>
-            </a:fillRef>
-            <a:effectRef idx="0">
-              <a:schemeClr val="accent1"/>
-            </a:effectRef>
-            <a:fontRef idx="minor">
-              <a:schemeClr val="tx1"/>
-            </a:fontRef>
-          </p:style>
-        </p:cxnSp>
-      </p:grpSp>
-      <p:grpSp>
-        <p:nvGrpSpPr>
           <p:cNvPr id="132" name="Group 131"/>
           <p:cNvGrpSpPr/>
           <p:nvPr/>
@@ -24316,8 +23503,8 @@
             </a:fontRef>
           </p:style>
         </p:cxnSp>
-        <mc:AlternateContent xmlns:mc="http://schemas.openxmlformats.org/markup-compatibility/2006">
-          <mc:Choice xmlns:a14="http://schemas.microsoft.com/office/drawing/2010/main" Requires="a14">
+        <mc:AlternateContent xmlns:mc="http://schemas.openxmlformats.org/markup-compatibility/2006" xmlns:a14="http://schemas.microsoft.com/office/drawing/2010/main">
+          <mc:Choice Requires="a14">
             <p:sp>
               <p:nvSpPr>
                 <p:cNvPr id="71" name="TextBox 70"/>
@@ -24340,6 +23527,7 @@
                 </a:bodyPr>
                 <a:lstStyle/>
                 <a:p>
+                  <a:pPr/>
                   <a14:m>
                     <m:oMathPara xmlns:m="http://schemas.openxmlformats.org/officeDocument/2006/math">
                       <m:oMathParaPr>
@@ -24364,7 +23552,7 @@
               </p:txBody>
             </p:sp>
           </mc:Choice>
-          <mc:Fallback>
+          <mc:Fallback xmlns="">
             <p:sp>
               <p:nvSpPr>
                 <p:cNvPr id="71" name="TextBox 70"/>
@@ -24499,8 +23687,8 @@
             </a:p>
           </p:txBody>
         </p:sp>
-        <mc:AlternateContent xmlns:mc="http://schemas.openxmlformats.org/markup-compatibility/2006">
-          <mc:Choice xmlns:a14="http://schemas.microsoft.com/office/drawing/2010/main" Requires="a14">
+        <mc:AlternateContent xmlns:mc="http://schemas.openxmlformats.org/markup-compatibility/2006" xmlns:a14="http://schemas.microsoft.com/office/drawing/2010/main">
+          <mc:Choice Requires="a14">
             <p:sp>
               <p:nvSpPr>
                 <p:cNvPr id="74" name="TextBox 73"/>
@@ -24523,6 +23711,7 @@
                 </a:bodyPr>
                 <a:lstStyle/>
                 <a:p>
+                  <a:pPr/>
                   <a14:m>
                     <m:oMathPara xmlns:m="http://schemas.openxmlformats.org/officeDocument/2006/math">
                       <m:oMathParaPr>
@@ -24547,7 +23736,7 @@
               </p:txBody>
             </p:sp>
           </mc:Choice>
-          <mc:Fallback>
+          <mc:Fallback xmlns="">
             <p:sp>
               <p:nvSpPr>
                 <p:cNvPr id="74" name="TextBox 73"/>
@@ -24586,8 +23775,8 @@
             </p:sp>
           </mc:Fallback>
         </mc:AlternateContent>
-        <mc:AlternateContent xmlns:mc="http://schemas.openxmlformats.org/markup-compatibility/2006">
-          <mc:Choice xmlns:a14="http://schemas.microsoft.com/office/drawing/2010/main" Requires="a14">
+        <mc:AlternateContent xmlns:mc="http://schemas.openxmlformats.org/markup-compatibility/2006" xmlns:a14="http://schemas.microsoft.com/office/drawing/2010/main">
+          <mc:Choice Requires="a14">
             <p:sp>
               <p:nvSpPr>
                 <p:cNvPr id="75" name="TextBox 74"/>
@@ -24610,6 +23799,7 @@
                 </a:bodyPr>
                 <a:lstStyle/>
                 <a:p>
+                  <a:pPr/>
                   <a14:m>
                     <m:oMathPara xmlns:m="http://schemas.openxmlformats.org/officeDocument/2006/math">
                       <m:oMathParaPr>
@@ -24634,7 +23824,7 @@
               </p:txBody>
             </p:sp>
           </mc:Choice>
-          <mc:Fallback>
+          <mc:Fallback xmlns="">
             <p:sp>
               <p:nvSpPr>
                 <p:cNvPr id="75" name="TextBox 74"/>
@@ -24673,8 +23863,8 @@
             </p:sp>
           </mc:Fallback>
         </mc:AlternateContent>
-        <mc:AlternateContent xmlns:mc="http://schemas.openxmlformats.org/markup-compatibility/2006">
-          <mc:Choice xmlns:a14="http://schemas.microsoft.com/office/drawing/2010/main" Requires="a14">
+        <mc:AlternateContent xmlns:mc="http://schemas.openxmlformats.org/markup-compatibility/2006" xmlns:a14="http://schemas.microsoft.com/office/drawing/2010/main">
+          <mc:Choice Requires="a14">
             <p:sp>
               <p:nvSpPr>
                 <p:cNvPr id="76" name="TextBox 75"/>
@@ -24697,6 +23887,7 @@
                 </a:bodyPr>
                 <a:lstStyle/>
                 <a:p>
+                  <a:pPr/>
                   <a14:m>
                     <m:oMathPara xmlns:m="http://schemas.openxmlformats.org/officeDocument/2006/math">
                       <m:oMathParaPr>
@@ -24721,7 +23912,7 @@
               </p:txBody>
             </p:sp>
           </mc:Choice>
-          <mc:Fallback>
+          <mc:Fallback xmlns="">
             <p:sp>
               <p:nvSpPr>
                 <p:cNvPr id="76" name="TextBox 75"/>
@@ -24760,8 +23951,8 @@
             </p:sp>
           </mc:Fallback>
         </mc:AlternateContent>
-        <mc:AlternateContent xmlns:mc="http://schemas.openxmlformats.org/markup-compatibility/2006">
-          <mc:Choice xmlns:a14="http://schemas.microsoft.com/office/drawing/2010/main" Requires="a14">
+        <mc:AlternateContent xmlns:mc="http://schemas.openxmlformats.org/markup-compatibility/2006" xmlns:a14="http://schemas.microsoft.com/office/drawing/2010/main">
+          <mc:Choice Requires="a14">
             <p:sp>
               <p:nvSpPr>
                 <p:cNvPr id="106" name="TextBox 105"/>
@@ -24784,6 +23975,7 @@
                 </a:bodyPr>
                 <a:lstStyle/>
                 <a:p>
+                  <a:pPr/>
                   <a14:m>
                     <m:oMathPara xmlns:m="http://schemas.openxmlformats.org/officeDocument/2006/math">
                       <m:oMathParaPr>
@@ -24815,7 +24007,7 @@
               </p:txBody>
             </p:sp>
           </mc:Choice>
-          <mc:Fallback>
+          <mc:Fallback xmlns="">
             <p:sp>
               <p:nvSpPr>
                 <p:cNvPr id="106" name="TextBox 105"/>
@@ -24926,8 +24118,8 @@
             </a:fontRef>
           </p:style>
         </p:cxnSp>
-        <mc:AlternateContent xmlns:mc="http://schemas.openxmlformats.org/markup-compatibility/2006">
-          <mc:Choice xmlns:a14="http://schemas.microsoft.com/office/drawing/2010/main" Requires="a14">
+        <mc:AlternateContent xmlns:mc="http://schemas.openxmlformats.org/markup-compatibility/2006" xmlns:a14="http://schemas.microsoft.com/office/drawing/2010/main">
+          <mc:Choice Requires="a14">
             <p:sp>
               <p:nvSpPr>
                 <p:cNvPr id="109" name="TextBox 108"/>
@@ -24950,6 +24142,7 @@
                 </a:bodyPr>
                 <a:lstStyle/>
                 <a:p>
+                  <a:pPr/>
                   <a14:m>
                     <m:oMathPara xmlns:m="http://schemas.openxmlformats.org/officeDocument/2006/math">
                       <m:oMathParaPr>
@@ -24981,7 +24174,7 @@
               </p:txBody>
             </p:sp>
           </mc:Choice>
-          <mc:Fallback>
+          <mc:Fallback xmlns="">
             <p:sp>
               <p:nvSpPr>
                 <p:cNvPr id="109" name="TextBox 108"/>
@@ -25092,8 +24285,8 @@
             </a:fontRef>
           </p:style>
         </p:cxnSp>
-        <mc:AlternateContent xmlns:mc="http://schemas.openxmlformats.org/markup-compatibility/2006">
-          <mc:Choice xmlns:a14="http://schemas.microsoft.com/office/drawing/2010/main" Requires="a14">
+        <mc:AlternateContent xmlns:mc="http://schemas.openxmlformats.org/markup-compatibility/2006" xmlns:a14="http://schemas.microsoft.com/office/drawing/2010/main">
+          <mc:Choice Requires="a14">
             <p:sp>
               <p:nvSpPr>
                 <p:cNvPr id="112" name="TextBox 111"/>
@@ -25116,6 +24309,7 @@
                 </a:bodyPr>
                 <a:lstStyle/>
                 <a:p>
+                  <a:pPr/>
                   <a14:m>
                     <m:oMathPara xmlns:m="http://schemas.openxmlformats.org/officeDocument/2006/math">
                       <m:oMathParaPr>
@@ -25140,7 +24334,7 @@
               </p:txBody>
             </p:sp>
           </mc:Choice>
-          <mc:Fallback>
+          <mc:Fallback xmlns="">
             <p:sp>
               <p:nvSpPr>
                 <p:cNvPr id="112" name="TextBox 111"/>
@@ -25179,8 +24373,8 @@
             </p:sp>
           </mc:Fallback>
         </mc:AlternateContent>
-        <mc:AlternateContent xmlns:mc="http://schemas.openxmlformats.org/markup-compatibility/2006">
-          <mc:Choice xmlns:a14="http://schemas.microsoft.com/office/drawing/2010/main" Requires="a14">
+        <mc:AlternateContent xmlns:mc="http://schemas.openxmlformats.org/markup-compatibility/2006" xmlns:a14="http://schemas.microsoft.com/office/drawing/2010/main">
+          <mc:Choice Requires="a14">
             <p:sp>
               <p:nvSpPr>
                 <p:cNvPr id="113" name="TextBox 112"/>
@@ -25203,6 +24397,7 @@
                 </a:bodyPr>
                 <a:lstStyle/>
                 <a:p>
+                  <a:pPr/>
                   <a14:m>
                     <m:oMathPara xmlns:m="http://schemas.openxmlformats.org/officeDocument/2006/math">
                       <m:oMathParaPr>
@@ -25227,7 +24422,7 @@
               </p:txBody>
             </p:sp>
           </mc:Choice>
-          <mc:Fallback>
+          <mc:Fallback xmlns="">
             <p:sp>
               <p:nvSpPr>
                 <p:cNvPr id="113" name="TextBox 112"/>
@@ -25425,8 +24620,8 @@
             </a:fontRef>
           </p:style>
         </p:cxnSp>
-        <mc:AlternateContent xmlns:mc="http://schemas.openxmlformats.org/markup-compatibility/2006">
-          <mc:Choice xmlns:a14="http://schemas.microsoft.com/office/drawing/2010/main" Requires="a14">
+        <mc:AlternateContent xmlns:mc="http://schemas.openxmlformats.org/markup-compatibility/2006" xmlns:a14="http://schemas.microsoft.com/office/drawing/2010/main">
+          <mc:Choice Requires="a14">
             <p:sp>
               <p:nvSpPr>
                 <p:cNvPr id="83" name="TextBox 82"/>
@@ -25449,6 +24644,7 @@
                 </a:bodyPr>
                 <a:lstStyle/>
                 <a:p>
+                  <a:pPr/>
                   <a14:m>
                     <m:oMathPara xmlns:m="http://schemas.openxmlformats.org/officeDocument/2006/math">
                       <m:oMathParaPr>
@@ -25473,7 +24669,7 @@
               </p:txBody>
             </p:sp>
           </mc:Choice>
-          <mc:Fallback>
+          <mc:Fallback xmlns="">
             <p:sp>
               <p:nvSpPr>
                 <p:cNvPr id="83" name="TextBox 82"/>
@@ -25560,8 +24756,8 @@
             </a:p>
           </p:txBody>
         </p:sp>
-        <mc:AlternateContent xmlns:mc="http://schemas.openxmlformats.org/markup-compatibility/2006">
-          <mc:Choice xmlns:a14="http://schemas.microsoft.com/office/drawing/2010/main" Requires="a14">
+        <mc:AlternateContent xmlns:mc="http://schemas.openxmlformats.org/markup-compatibility/2006" xmlns:a14="http://schemas.microsoft.com/office/drawing/2010/main">
+          <mc:Choice Requires="a14">
             <p:sp>
               <p:nvSpPr>
                 <p:cNvPr id="86" name="TextBox 85"/>
@@ -25584,6 +24780,7 @@
                 </a:bodyPr>
                 <a:lstStyle/>
                 <a:p>
+                  <a:pPr/>
                   <a14:m>
                     <m:oMathPara xmlns:m="http://schemas.openxmlformats.org/officeDocument/2006/math">
                       <m:oMathParaPr>
@@ -25608,7 +24805,7 @@
               </p:txBody>
             </p:sp>
           </mc:Choice>
-          <mc:Fallback>
+          <mc:Fallback xmlns="">
             <p:sp>
               <p:nvSpPr>
                 <p:cNvPr id="86" name="TextBox 85"/>
@@ -25647,8 +24844,8 @@
             </p:sp>
           </mc:Fallback>
         </mc:AlternateContent>
-        <mc:AlternateContent xmlns:mc="http://schemas.openxmlformats.org/markup-compatibility/2006">
-          <mc:Choice xmlns:a14="http://schemas.microsoft.com/office/drawing/2010/main" Requires="a14">
+        <mc:AlternateContent xmlns:mc="http://schemas.openxmlformats.org/markup-compatibility/2006" xmlns:a14="http://schemas.microsoft.com/office/drawing/2010/main">
+          <mc:Choice Requires="a14">
             <p:sp>
               <p:nvSpPr>
                 <p:cNvPr id="87" name="TextBox 86"/>
@@ -25671,6 +24868,7 @@
                 </a:bodyPr>
                 <a:lstStyle/>
                 <a:p>
+                  <a:pPr/>
                   <a14:m>
                     <m:oMathPara xmlns:m="http://schemas.openxmlformats.org/officeDocument/2006/math">
                       <m:oMathParaPr>
@@ -25695,7 +24893,7 @@
               </p:txBody>
             </p:sp>
           </mc:Choice>
-          <mc:Fallback>
+          <mc:Fallback xmlns="">
             <p:sp>
               <p:nvSpPr>
                 <p:cNvPr id="87" name="TextBox 86"/>
@@ -25734,8 +24932,8 @@
             </p:sp>
           </mc:Fallback>
         </mc:AlternateContent>
-        <mc:AlternateContent xmlns:mc="http://schemas.openxmlformats.org/markup-compatibility/2006">
-          <mc:Choice xmlns:a14="http://schemas.microsoft.com/office/drawing/2010/main" Requires="a14">
+        <mc:AlternateContent xmlns:mc="http://schemas.openxmlformats.org/markup-compatibility/2006" xmlns:a14="http://schemas.microsoft.com/office/drawing/2010/main">
+          <mc:Choice Requires="a14">
             <p:sp>
               <p:nvSpPr>
                 <p:cNvPr id="88" name="TextBox 87"/>
@@ -25758,6 +24956,7 @@
                 </a:bodyPr>
                 <a:lstStyle/>
                 <a:p>
+                  <a:pPr/>
                   <a14:m>
                     <m:oMathPara xmlns:m="http://schemas.openxmlformats.org/officeDocument/2006/math">
                       <m:oMathParaPr>
@@ -25782,7 +24981,7 @@
               </p:txBody>
             </p:sp>
           </mc:Choice>
-          <mc:Fallback>
+          <mc:Fallback xmlns="">
             <p:sp>
               <p:nvSpPr>
                 <p:cNvPr id="88" name="TextBox 87"/>
@@ -26002,8 +25201,8 @@
             </a:fontRef>
           </p:style>
         </p:cxnSp>
-        <mc:AlternateContent xmlns:mc="http://schemas.openxmlformats.org/markup-compatibility/2006">
-          <mc:Choice xmlns:a14="http://schemas.microsoft.com/office/drawing/2010/main" Requires="a14">
+        <mc:AlternateContent xmlns:mc="http://schemas.openxmlformats.org/markup-compatibility/2006" xmlns:a14="http://schemas.microsoft.com/office/drawing/2010/main">
+          <mc:Choice Requires="a14">
             <p:sp>
               <p:nvSpPr>
                 <p:cNvPr id="96" name="TextBox 95"/>
@@ -26026,6 +25225,7 @@
                 </a:bodyPr>
                 <a:lstStyle/>
                 <a:p>
+                  <a:pPr/>
                   <a14:m>
                     <m:oMathPara xmlns:m="http://schemas.openxmlformats.org/officeDocument/2006/math">
                       <m:oMathParaPr>
@@ -26050,7 +25250,7 @@
               </p:txBody>
             </p:sp>
           </mc:Choice>
-          <mc:Fallback>
+          <mc:Fallback xmlns="">
             <p:sp>
               <p:nvSpPr>
                 <p:cNvPr id="96" name="TextBox 95"/>
@@ -26137,8 +25337,8 @@
             </a:p>
           </p:txBody>
         </p:sp>
-        <mc:AlternateContent xmlns:mc="http://schemas.openxmlformats.org/markup-compatibility/2006">
-          <mc:Choice xmlns:a14="http://schemas.microsoft.com/office/drawing/2010/main" Requires="a14">
+        <mc:AlternateContent xmlns:mc="http://schemas.openxmlformats.org/markup-compatibility/2006" xmlns:a14="http://schemas.microsoft.com/office/drawing/2010/main">
+          <mc:Choice Requires="a14">
             <p:sp>
               <p:nvSpPr>
                 <p:cNvPr id="99" name="TextBox 98"/>
@@ -26161,6 +25361,7 @@
                 </a:bodyPr>
                 <a:lstStyle/>
                 <a:p>
+                  <a:pPr/>
                   <a14:m>
                     <m:oMathPara xmlns:m="http://schemas.openxmlformats.org/officeDocument/2006/math">
                       <m:oMathParaPr>
@@ -26192,7 +25393,7 @@
               </p:txBody>
             </p:sp>
           </mc:Choice>
-          <mc:Fallback>
+          <mc:Fallback xmlns="">
             <p:sp>
               <p:nvSpPr>
                 <p:cNvPr id="99" name="TextBox 98"/>
@@ -26303,8 +25504,8 @@
             </a:fontRef>
           </p:style>
         </p:cxnSp>
-        <mc:AlternateContent xmlns:mc="http://schemas.openxmlformats.org/markup-compatibility/2006">
-          <mc:Choice xmlns:a14="http://schemas.microsoft.com/office/drawing/2010/main" Requires="a14">
+        <mc:AlternateContent xmlns:mc="http://schemas.openxmlformats.org/markup-compatibility/2006" xmlns:a14="http://schemas.microsoft.com/office/drawing/2010/main">
+          <mc:Choice Requires="a14">
             <p:sp>
               <p:nvSpPr>
                 <p:cNvPr id="103" name="TextBox 102"/>
@@ -26327,6 +25528,7 @@
                 </a:bodyPr>
                 <a:lstStyle/>
                 <a:p>
+                  <a:pPr/>
                   <a14:m>
                     <m:oMathPara xmlns:m="http://schemas.openxmlformats.org/officeDocument/2006/math">
                       <m:oMathParaPr>
@@ -26358,7 +25560,7 @@
               </p:txBody>
             </p:sp>
           </mc:Choice>
-          <mc:Fallback>
+          <mc:Fallback xmlns="">
             <p:sp>
               <p:nvSpPr>
                 <p:cNvPr id="103" name="TextBox 102"/>
@@ -26469,8 +25671,8 @@
             </a:fontRef>
           </p:style>
         </p:cxnSp>
-        <mc:AlternateContent xmlns:mc="http://schemas.openxmlformats.org/markup-compatibility/2006">
-          <mc:Choice xmlns:a14="http://schemas.microsoft.com/office/drawing/2010/main" Requires="a14">
+        <mc:AlternateContent xmlns:mc="http://schemas.openxmlformats.org/markup-compatibility/2006" xmlns:a14="http://schemas.microsoft.com/office/drawing/2010/main">
+          <mc:Choice Requires="a14">
             <p:sp>
               <p:nvSpPr>
                 <p:cNvPr id="116" name="TextBox 115"/>
@@ -26493,6 +25695,7 @@
                 </a:bodyPr>
                 <a:lstStyle/>
                 <a:p>
+                  <a:pPr/>
                   <a14:m>
                     <m:oMathPara xmlns:m="http://schemas.openxmlformats.org/officeDocument/2006/math">
                       <m:oMathParaPr>
@@ -26517,7 +25720,7 @@
               </p:txBody>
             </p:sp>
           </mc:Choice>
-          <mc:Fallback>
+          <mc:Fallback xmlns="">
             <p:sp>
               <p:nvSpPr>
                 <p:cNvPr id="116" name="TextBox 115"/>
@@ -26664,8 +25867,8 @@
             </a:fontRef>
           </p:style>
         </p:cxnSp>
-        <mc:AlternateContent xmlns:mc="http://schemas.openxmlformats.org/markup-compatibility/2006">
-          <mc:Choice xmlns:a14="http://schemas.microsoft.com/office/drawing/2010/main" Requires="a14">
+        <mc:AlternateContent xmlns:mc="http://schemas.openxmlformats.org/markup-compatibility/2006" xmlns:a14="http://schemas.microsoft.com/office/drawing/2010/main">
+          <mc:Choice Requires="a14">
             <p:sp>
               <p:nvSpPr>
                 <p:cNvPr id="121" name="TextBox 120"/>
@@ -26688,6 +25891,7 @@
                 </a:bodyPr>
                 <a:lstStyle/>
                 <a:p>
+                  <a:pPr/>
                   <a14:m>
                     <m:oMathPara xmlns:m="http://schemas.openxmlformats.org/officeDocument/2006/math">
                       <m:oMathParaPr>
@@ -26744,7 +25948,7 @@
               </p:txBody>
             </p:sp>
           </mc:Choice>
-          <mc:Fallback>
+          <mc:Fallback xmlns="">
             <p:sp>
               <p:nvSpPr>
                 <p:cNvPr id="121" name="TextBox 120"/>
@@ -26783,8 +25987,8 @@
             </p:sp>
           </mc:Fallback>
         </mc:AlternateContent>
-        <mc:AlternateContent xmlns:mc="http://schemas.openxmlformats.org/markup-compatibility/2006">
-          <mc:Choice xmlns:a14="http://schemas.microsoft.com/office/drawing/2010/main" Requires="a14">
+        <mc:AlternateContent xmlns:mc="http://schemas.openxmlformats.org/markup-compatibility/2006" xmlns:a14="http://schemas.microsoft.com/office/drawing/2010/main">
+          <mc:Choice Requires="a14">
             <p:sp>
               <p:nvSpPr>
                 <p:cNvPr id="123" name="TextBox 122"/>
@@ -26807,6 +26011,7 @@
                 </a:bodyPr>
                 <a:lstStyle/>
                 <a:p>
+                  <a:pPr/>
                   <a14:m>
                     <m:oMathPara xmlns:m="http://schemas.openxmlformats.org/officeDocument/2006/math">
                       <m:oMathParaPr>
@@ -26832,7 +26037,7 @@
               </p:txBody>
             </p:sp>
           </mc:Choice>
-          <mc:Fallback>
+          <mc:Fallback xmlns="">
             <p:sp>
               <p:nvSpPr>
                 <p:cNvPr id="123" name="TextBox 122"/>
@@ -26919,1281 +26124,6 @@
             </a:p>
           </p:txBody>
         </p:sp>
-      </p:grpSp>
-      <p:grpSp>
-        <p:nvGrpSpPr>
-          <p:cNvPr id="140" name="Group 139"/>
-          <p:cNvGrpSpPr/>
-          <p:nvPr/>
-        </p:nvGrpSpPr>
-        <p:grpSpPr>
-          <a:xfrm>
-            <a:off x="568845" y="2680722"/>
-            <a:ext cx="6340172" cy="960015"/>
-            <a:chOff x="568845" y="2680722"/>
-            <a:chExt cx="6340172" cy="960015"/>
-          </a:xfrm>
-        </p:grpSpPr>
-        <p:grpSp>
-          <p:nvGrpSpPr>
-            <p:cNvPr id="124" name="Group 123"/>
-            <p:cNvGrpSpPr/>
-            <p:nvPr/>
-          </p:nvGrpSpPr>
-          <p:grpSpPr>
-            <a:xfrm>
-              <a:off x="568845" y="2680722"/>
-              <a:ext cx="6267159" cy="960015"/>
-              <a:chOff x="523875" y="2746038"/>
-              <a:chExt cx="6267159" cy="960015"/>
-            </a:xfrm>
-          </p:grpSpPr>
-          <p:grpSp>
-            <p:nvGrpSpPr>
-              <p:cNvPr id="47" name="Group 46"/>
-              <p:cNvGrpSpPr/>
-              <p:nvPr/>
-            </p:nvGrpSpPr>
-            <p:grpSpPr>
-              <a:xfrm>
-                <a:off x="523875" y="2746038"/>
-                <a:ext cx="6267159" cy="960015"/>
-                <a:chOff x="645318" y="2615455"/>
-                <a:chExt cx="6267159" cy="960015"/>
-              </a:xfrm>
-            </p:grpSpPr>
-            <p:cxnSp>
-              <p:nvCxnSpPr>
-                <p:cNvPr id="48" name="Straight Arrow Connector 47"/>
-                <p:cNvCxnSpPr/>
-                <p:nvPr/>
-              </p:nvCxnSpPr>
-              <p:spPr>
-                <a:xfrm flipH="1" flipV="1">
-                  <a:off x="677311" y="3086312"/>
-                  <a:ext cx="6012000" cy="2"/>
-                </a:xfrm>
-                <a:prstGeom prst="straightConnector1">
-                  <a:avLst/>
-                </a:prstGeom>
-                <a:ln w="38100">
-                  <a:solidFill>
-                    <a:schemeClr val="tx1"/>
-                  </a:solidFill>
-                  <a:tailEnd type="triangle"/>
-                </a:ln>
-              </p:spPr>
-              <p:style>
-                <a:lnRef idx="1">
-                  <a:schemeClr val="accent1"/>
-                </a:lnRef>
-                <a:fillRef idx="0">
-                  <a:schemeClr val="accent1"/>
-                </a:fillRef>
-                <a:effectRef idx="0">
-                  <a:schemeClr val="accent1"/>
-                </a:effectRef>
-                <a:fontRef idx="minor">
-                  <a:schemeClr val="tx1"/>
-                </a:fontRef>
-              </p:style>
-            </p:cxnSp>
-            <p:sp>
-              <p:nvSpPr>
-                <p:cNvPr id="49" name="Rectangle 48"/>
-                <p:cNvSpPr/>
-                <p:nvPr/>
-              </p:nvSpPr>
-              <p:spPr>
-                <a:xfrm>
-                  <a:off x="1085618" y="2983041"/>
-                  <a:ext cx="3351471" cy="194874"/>
-                </a:xfrm>
-                <a:prstGeom prst="rect">
-                  <a:avLst/>
-                </a:prstGeom>
-                <a:solidFill>
-                  <a:schemeClr val="bg2"/>
-                </a:solidFill>
-                <a:ln w="38100">
-                  <a:solidFill>
-                    <a:schemeClr val="tx1"/>
-                  </a:solidFill>
-                </a:ln>
-              </p:spPr>
-              <p:style>
-                <a:lnRef idx="2">
-                  <a:schemeClr val="accent1">
-                    <a:shade val="50000"/>
-                  </a:schemeClr>
-                </a:lnRef>
-                <a:fillRef idx="1">
-                  <a:schemeClr val="accent1"/>
-                </a:fillRef>
-                <a:effectRef idx="0">
-                  <a:schemeClr val="accent1"/>
-                </a:effectRef>
-                <a:fontRef idx="minor">
-                  <a:schemeClr val="lt1"/>
-                </a:fontRef>
-              </p:style>
-              <p:txBody>
-                <a:bodyPr rtlCol="0" anchor="ctr"/>
-                <a:lstStyle/>
-                <a:p>
-                  <a:pPr algn="ctr"/>
-                  <a:endParaRPr lang="en-US"/>
-                </a:p>
-              </p:txBody>
-            </p:sp>
-            <mc:AlternateContent xmlns:mc="http://schemas.openxmlformats.org/markup-compatibility/2006">
-              <mc:Choice xmlns:a14="http://schemas.microsoft.com/office/drawing/2010/main" Requires="a14">
-                <p:sp>
-                  <p:nvSpPr>
-                    <p:cNvPr id="51" name="TextBox 50"/>
-                    <p:cNvSpPr txBox="1"/>
-                    <p:nvPr/>
-                  </p:nvSpPr>
-                  <p:spPr>
-                    <a:xfrm>
-                      <a:off x="6676964" y="2658521"/>
-                      <a:ext cx="235513" cy="307777"/>
-                    </a:xfrm>
-                    <a:prstGeom prst="rect">
-                      <a:avLst/>
-                    </a:prstGeom>
-                    <a:noFill/>
-                  </p:spPr>
-                  <p:txBody>
-                    <a:bodyPr wrap="none" lIns="0" tIns="0" rIns="0" bIns="0" rtlCol="0">
-                      <a:spAutoFit/>
-                    </a:bodyPr>
-                    <a:lstStyle/>
-                    <a:p>
-                      <a14:m>
-                        <m:oMathPara xmlns:m="http://schemas.openxmlformats.org/officeDocument/2006/math">
-                          <m:oMathParaPr>
-                            <m:jc m:val="centerGroup"/>
-                          </m:oMathParaPr>
-                          <m:oMath xmlns:m="http://schemas.openxmlformats.org/officeDocument/2006/math">
-                            <m:r>
-                              <a:rPr lang="en-CA" sz="2000" b="0" i="1" smtClean="0">
-                                <a:latin typeface="Cambria Math" charset="0"/>
-                                <a:cs typeface="Arial" panose="020B0604020202020204" pitchFamily="34" charset="0"/>
-                              </a:rPr>
-                              <m:t>𝑃</m:t>
-                            </m:r>
-                          </m:oMath>
-                        </m:oMathPara>
-                      </a14:m>
-                      <a:endParaRPr lang="en-US" sz="2000" dirty="0" smtClean="0">
-                        <a:latin typeface="Arial" panose="020B0604020202020204" pitchFamily="34" charset="0"/>
-                        <a:cs typeface="Arial" panose="020B0604020202020204" pitchFamily="34" charset="0"/>
-                      </a:endParaRPr>
-                    </a:p>
-                  </p:txBody>
-                </p:sp>
-              </mc:Choice>
-              <mc:Fallback>
-                <p:sp>
-                  <p:nvSpPr>
-                    <p:cNvPr id="51" name="TextBox 50"/>
-                    <p:cNvSpPr txBox="1">
-                      <a:spLocks noRot="1" noChangeAspect="1" noMove="1" noResize="1" noEditPoints="1" noAdjustHandles="1" noChangeArrowheads="1" noChangeShapeType="1" noTextEdit="1"/>
-                    </p:cNvSpPr>
-                    <p:nvPr/>
-                  </p:nvSpPr>
-                  <p:spPr>
-                    <a:xfrm>
-                      <a:off x="6676964" y="2658521"/>
-                      <a:ext cx="235513" cy="307777"/>
-                    </a:xfrm>
-                    <a:prstGeom prst="rect">
-                      <a:avLst/>
-                    </a:prstGeom>
-                    <a:blipFill rotWithShape="0">
-                      <a:blip r:embed="rId9"/>
-                      <a:stretch>
-                        <a:fillRect l="-23684" r="-21053" b="-10000"/>
-                      </a:stretch>
-                    </a:blipFill>
-                  </p:spPr>
-                  <p:txBody>
-                    <a:bodyPr/>
-                    <a:lstStyle/>
-                    <a:p>
-                      <a:r>
-                        <a:rPr lang="en-US">
-                          <a:noFill/>
-                        </a:rPr>
-                        <a:t> </a:t>
-                      </a:r>
-                    </a:p>
-                  </p:txBody>
-                </p:sp>
-              </mc:Fallback>
-            </mc:AlternateContent>
-            <mc:AlternateContent xmlns:mc="http://schemas.openxmlformats.org/markup-compatibility/2006">
-              <mc:Choice xmlns:a14="http://schemas.microsoft.com/office/drawing/2010/main" Requires="a14">
-                <p:sp>
-                  <p:nvSpPr>
-                    <p:cNvPr id="52" name="TextBox 51"/>
-                    <p:cNvSpPr txBox="1"/>
-                    <p:nvPr/>
-                  </p:nvSpPr>
-                  <p:spPr>
-                    <a:xfrm>
-                      <a:off x="645318" y="2615455"/>
-                      <a:ext cx="214546" cy="307777"/>
-                    </a:xfrm>
-                    <a:prstGeom prst="rect">
-                      <a:avLst/>
-                    </a:prstGeom>
-                    <a:noFill/>
-                  </p:spPr>
-                  <p:txBody>
-                    <a:bodyPr wrap="none" lIns="0" tIns="0" rIns="0" bIns="0" rtlCol="0">
-                      <a:spAutoFit/>
-                    </a:bodyPr>
-                    <a:lstStyle/>
-                    <a:p>
-                      <a14:m>
-                        <m:oMathPara xmlns:m="http://schemas.openxmlformats.org/officeDocument/2006/math">
-                          <m:oMathParaPr>
-                            <m:jc m:val="centerGroup"/>
-                          </m:oMathParaPr>
-                          <m:oMath xmlns:m="http://schemas.openxmlformats.org/officeDocument/2006/math">
-                            <m:r>
-                              <a:rPr lang="en-CA" sz="2000" b="0" i="1" smtClean="0">
-                                <a:latin typeface="Cambria Math" charset="0"/>
-                                <a:cs typeface="Arial" panose="020B0604020202020204" pitchFamily="34" charset="0"/>
-                              </a:rPr>
-                              <m:t>𝑥</m:t>
-                            </m:r>
-                          </m:oMath>
-                        </m:oMathPara>
-                      </a14:m>
-                      <a:endParaRPr lang="en-US" sz="2000" dirty="0" smtClean="0">
-                        <a:latin typeface="Arial" panose="020B0604020202020204" pitchFamily="34" charset="0"/>
-                        <a:cs typeface="Arial" panose="020B0604020202020204" pitchFamily="34" charset="0"/>
-                      </a:endParaRPr>
-                    </a:p>
-                  </p:txBody>
-                </p:sp>
-              </mc:Choice>
-              <mc:Fallback>
-                <p:sp>
-                  <p:nvSpPr>
-                    <p:cNvPr id="52" name="TextBox 51"/>
-                    <p:cNvSpPr txBox="1">
-                      <a:spLocks noRot="1" noChangeAspect="1" noMove="1" noResize="1" noEditPoints="1" noAdjustHandles="1" noChangeArrowheads="1" noChangeShapeType="1" noTextEdit="1"/>
-                    </p:cNvSpPr>
-                    <p:nvPr/>
-                  </p:nvSpPr>
-                  <p:spPr>
-                    <a:xfrm>
-                      <a:off x="645318" y="2615455"/>
-                      <a:ext cx="214546" cy="307777"/>
-                    </a:xfrm>
-                    <a:prstGeom prst="rect">
-                      <a:avLst/>
-                    </a:prstGeom>
-                    <a:blipFill rotWithShape="0">
-                      <a:blip r:embed="rId10"/>
-                      <a:stretch>
-                        <a:fillRect l="-11111" r="-8333" b="-2000"/>
-                      </a:stretch>
-                    </a:blipFill>
-                  </p:spPr>
-                  <p:txBody>
-                    <a:bodyPr/>
-                    <a:lstStyle/>
-                    <a:p>
-                      <a:r>
-                        <a:rPr lang="en-US">
-                          <a:noFill/>
-                        </a:rPr>
-                        <a:t> </a:t>
-                      </a:r>
-                    </a:p>
-                  </p:txBody>
-                </p:sp>
-              </mc:Fallback>
-            </mc:AlternateContent>
-            <mc:AlternateContent xmlns:mc="http://schemas.openxmlformats.org/markup-compatibility/2006">
-              <mc:Choice xmlns:a14="http://schemas.microsoft.com/office/drawing/2010/main" Requires="a14">
-                <p:sp>
-                  <p:nvSpPr>
-                    <p:cNvPr id="54" name="TextBox 53"/>
-                    <p:cNvSpPr txBox="1"/>
-                    <p:nvPr/>
-                  </p:nvSpPr>
-                  <p:spPr>
-                    <a:xfrm>
-                      <a:off x="2183851" y="3267693"/>
-                      <a:ext cx="460771" cy="307777"/>
-                    </a:xfrm>
-                    <a:prstGeom prst="rect">
-                      <a:avLst/>
-                    </a:prstGeom>
-                    <a:noFill/>
-                  </p:spPr>
-                  <p:txBody>
-                    <a:bodyPr wrap="square" lIns="0" tIns="0" rIns="0" bIns="0" rtlCol="0">
-                      <a:spAutoFit/>
-                    </a:bodyPr>
-                    <a:lstStyle/>
-                    <a:p>
-                      <a14:m>
-                        <m:oMathPara xmlns:m="http://schemas.openxmlformats.org/officeDocument/2006/math">
-                          <m:oMathParaPr>
-                            <m:jc m:val="centerGroup"/>
-                          </m:oMathParaPr>
-                          <m:oMath xmlns:m="http://schemas.openxmlformats.org/officeDocument/2006/math">
-                            <m:r>
-                              <a:rPr lang="en-CA" sz="2000" b="0" i="1" smtClean="0">
-                                <a:latin typeface="Cambria Math" charset="0"/>
-                                <a:cs typeface="Arial" panose="020B0604020202020204" pitchFamily="34" charset="0"/>
-                              </a:rPr>
-                              <m:t>𝑀</m:t>
-                            </m:r>
-                          </m:oMath>
-                        </m:oMathPara>
-                      </a14:m>
-                      <a:endParaRPr lang="en-US" sz="2000" dirty="0" smtClean="0">
-                        <a:latin typeface="Arial" panose="020B0604020202020204" pitchFamily="34" charset="0"/>
-                        <a:cs typeface="Arial" panose="020B0604020202020204" pitchFamily="34" charset="0"/>
-                      </a:endParaRPr>
-                    </a:p>
-                  </p:txBody>
-                </p:sp>
-              </mc:Choice>
-              <mc:Fallback>
-                <p:sp>
-                  <p:nvSpPr>
-                    <p:cNvPr id="54" name="TextBox 53"/>
-                    <p:cNvSpPr txBox="1">
-                      <a:spLocks noRot="1" noChangeAspect="1" noMove="1" noResize="1" noEditPoints="1" noAdjustHandles="1" noChangeArrowheads="1" noChangeShapeType="1" noTextEdit="1"/>
-                    </p:cNvSpPr>
-                    <p:nvPr/>
-                  </p:nvSpPr>
-                  <p:spPr>
-                    <a:xfrm>
-                      <a:off x="2183851" y="3267693"/>
-                      <a:ext cx="460771" cy="307777"/>
-                    </a:xfrm>
-                    <a:prstGeom prst="rect">
-                      <a:avLst/>
-                    </a:prstGeom>
-                    <a:blipFill rotWithShape="0">
-                      <a:blip r:embed="rId21"/>
-                      <a:stretch>
-                        <a:fillRect b="-10000"/>
-                      </a:stretch>
-                    </a:blipFill>
-                  </p:spPr>
-                  <p:txBody>
-                    <a:bodyPr/>
-                    <a:lstStyle/>
-                    <a:p>
-                      <a:r>
-                        <a:rPr lang="en-US">
-                          <a:noFill/>
-                        </a:rPr>
-                        <a:t> </a:t>
-                      </a:r>
-                    </a:p>
-                  </p:txBody>
-                </p:sp>
-              </mc:Fallback>
-            </mc:AlternateContent>
-            <mc:AlternateContent xmlns:mc="http://schemas.openxmlformats.org/markup-compatibility/2006">
-              <mc:Choice xmlns:a14="http://schemas.microsoft.com/office/drawing/2010/main" Requires="a14">
-                <p:sp>
-                  <p:nvSpPr>
-                    <p:cNvPr id="55" name="TextBox 54"/>
-                    <p:cNvSpPr txBox="1"/>
-                    <p:nvPr/>
-                  </p:nvSpPr>
-                  <p:spPr>
-                    <a:xfrm>
-                      <a:off x="2656700" y="2659994"/>
-                      <a:ext cx="212046" cy="307777"/>
-                    </a:xfrm>
-                    <a:prstGeom prst="rect">
-                      <a:avLst/>
-                    </a:prstGeom>
-                    <a:noFill/>
-                  </p:spPr>
-                  <p:txBody>
-                    <a:bodyPr wrap="none" lIns="0" tIns="0" rIns="0" bIns="0" rtlCol="0">
-                      <a:spAutoFit/>
-                    </a:bodyPr>
-                    <a:lstStyle/>
-                    <a:p>
-                      <a14:m>
-                        <m:oMathPara xmlns:m="http://schemas.openxmlformats.org/officeDocument/2006/math">
-                          <m:oMathParaPr>
-                            <m:jc m:val="centerGroup"/>
-                          </m:oMathParaPr>
-                          <m:oMath xmlns:m="http://schemas.openxmlformats.org/officeDocument/2006/math">
-                            <m:r>
-                              <a:rPr lang="en-CA" sz="2000" b="0" i="1" smtClean="0">
-                                <a:latin typeface="Cambria Math" charset="0"/>
-                                <a:cs typeface="Arial" panose="020B0604020202020204" pitchFamily="34" charset="0"/>
-                              </a:rPr>
-                              <m:t>𝐿</m:t>
-                            </m:r>
-                          </m:oMath>
-                        </m:oMathPara>
-                      </a14:m>
-                      <a:endParaRPr lang="en-US" sz="2000" dirty="0" smtClean="0">
-                        <a:latin typeface="Arial" panose="020B0604020202020204" pitchFamily="34" charset="0"/>
-                        <a:cs typeface="Arial" panose="020B0604020202020204" pitchFamily="34" charset="0"/>
-                      </a:endParaRPr>
-                    </a:p>
-                  </p:txBody>
-                </p:sp>
-              </mc:Choice>
-              <mc:Fallback>
-                <p:sp>
-                  <p:nvSpPr>
-                    <p:cNvPr id="55" name="TextBox 54"/>
-                    <p:cNvSpPr txBox="1">
-                      <a:spLocks noRot="1" noChangeAspect="1" noMove="1" noResize="1" noEditPoints="1" noAdjustHandles="1" noChangeArrowheads="1" noChangeShapeType="1" noTextEdit="1"/>
-                    </p:cNvSpPr>
-                    <p:nvPr/>
-                  </p:nvSpPr>
-                  <p:spPr>
-                    <a:xfrm>
-                      <a:off x="2656700" y="2659994"/>
-                      <a:ext cx="212046" cy="307777"/>
-                    </a:xfrm>
-                    <a:prstGeom prst="rect">
-                      <a:avLst/>
-                    </a:prstGeom>
-                    <a:blipFill rotWithShape="0">
-                      <a:blip r:embed="rId22"/>
-                      <a:stretch>
-                        <a:fillRect l="-22857" r="-22857" b="-9804"/>
-                      </a:stretch>
-                    </a:blipFill>
-                  </p:spPr>
-                  <p:txBody>
-                    <a:bodyPr/>
-                    <a:lstStyle/>
-                    <a:p>
-                      <a:r>
-                        <a:rPr lang="en-US">
-                          <a:noFill/>
-                        </a:rPr>
-                        <a:t> </a:t>
-                      </a:r>
-                    </a:p>
-                  </p:txBody>
-                </p:sp>
-              </mc:Fallback>
-            </mc:AlternateContent>
-            <p:cxnSp>
-              <p:nvCxnSpPr>
-                <p:cNvPr id="56" name="Straight Arrow Connector 55"/>
-                <p:cNvCxnSpPr/>
-                <p:nvPr/>
-              </p:nvCxnSpPr>
-              <p:spPr>
-                <a:xfrm flipH="1">
-                  <a:off x="1071998" y="2813882"/>
-                  <a:ext cx="1476000" cy="0"/>
-                </a:xfrm>
-                <a:prstGeom prst="straightConnector1">
-                  <a:avLst/>
-                </a:prstGeom>
-                <a:ln w="38100">
-                  <a:solidFill>
-                    <a:schemeClr val="tx1"/>
-                  </a:solidFill>
-                  <a:tailEnd type="triangle"/>
-                </a:ln>
-              </p:spPr>
-              <p:style>
-                <a:lnRef idx="1">
-                  <a:schemeClr val="accent1"/>
-                </a:lnRef>
-                <a:fillRef idx="0">
-                  <a:schemeClr val="accent1"/>
-                </a:fillRef>
-                <a:effectRef idx="0">
-                  <a:schemeClr val="accent1"/>
-                </a:effectRef>
-                <a:fontRef idx="minor">
-                  <a:schemeClr val="tx1"/>
-                </a:fontRef>
-              </p:style>
-            </p:cxnSp>
-            <p:cxnSp>
-              <p:nvCxnSpPr>
-                <p:cNvPr id="57" name="Straight Arrow Connector 56"/>
-                <p:cNvCxnSpPr/>
-                <p:nvPr/>
-              </p:nvCxnSpPr>
-              <p:spPr>
-                <a:xfrm>
-                  <a:off x="3010499" y="2813882"/>
-                  <a:ext cx="1476000" cy="0"/>
-                </a:xfrm>
-                <a:prstGeom prst="straightConnector1">
-                  <a:avLst/>
-                </a:prstGeom>
-                <a:ln w="38100">
-                  <a:solidFill>
-                    <a:schemeClr val="tx1"/>
-                  </a:solidFill>
-                  <a:tailEnd type="triangle"/>
-                </a:ln>
-              </p:spPr>
-              <p:style>
-                <a:lnRef idx="1">
-                  <a:schemeClr val="accent1"/>
-                </a:lnRef>
-                <a:fillRef idx="0">
-                  <a:schemeClr val="accent1"/>
-                </a:fillRef>
-                <a:effectRef idx="0">
-                  <a:schemeClr val="accent1"/>
-                </a:effectRef>
-                <a:fontRef idx="minor">
-                  <a:schemeClr val="tx1"/>
-                </a:fontRef>
-              </p:style>
-            </p:cxnSp>
-            <mc:AlternateContent xmlns:mc="http://schemas.openxmlformats.org/markup-compatibility/2006">
-              <mc:Choice xmlns:a14="http://schemas.microsoft.com/office/drawing/2010/main" Requires="a14">
-                <p:sp>
-                  <p:nvSpPr>
-                    <p:cNvPr id="58" name="TextBox 57"/>
-                    <p:cNvSpPr txBox="1"/>
-                    <p:nvPr/>
-                  </p:nvSpPr>
-                  <p:spPr>
-                    <a:xfrm>
-                      <a:off x="5468627" y="2653212"/>
-                      <a:ext cx="212046" cy="307777"/>
-                    </a:xfrm>
-                    <a:prstGeom prst="rect">
-                      <a:avLst/>
-                    </a:prstGeom>
-                    <a:noFill/>
-                  </p:spPr>
-                  <p:txBody>
-                    <a:bodyPr wrap="square" lIns="0" tIns="0" rIns="0" bIns="0" rtlCol="0">
-                      <a:spAutoFit/>
-                    </a:bodyPr>
-                    <a:lstStyle/>
-                    <a:p>
-                      <a14:m>
-                        <m:oMathPara xmlns:m="http://schemas.openxmlformats.org/officeDocument/2006/math">
-                          <m:oMathParaPr>
-                            <m:jc m:val="centerGroup"/>
-                          </m:oMathParaPr>
-                          <m:oMath xmlns:m="http://schemas.openxmlformats.org/officeDocument/2006/math">
-                            <m:r>
-                              <a:rPr lang="en-CA" sz="2000" b="0" i="1" smtClean="0">
-                                <a:latin typeface="Cambria Math" charset="0"/>
-                                <a:cs typeface="Arial" panose="020B0604020202020204" pitchFamily="34" charset="0"/>
-                              </a:rPr>
-                              <m:t>𝑑</m:t>
-                            </m:r>
-                          </m:oMath>
-                        </m:oMathPara>
-                      </a14:m>
-                      <a:endParaRPr lang="en-US" sz="2000" dirty="0" smtClean="0">
-                        <a:latin typeface="Arial" panose="020B0604020202020204" pitchFamily="34" charset="0"/>
-                        <a:cs typeface="Arial" panose="020B0604020202020204" pitchFamily="34" charset="0"/>
-                      </a:endParaRPr>
-                    </a:p>
-                  </p:txBody>
-                </p:sp>
-              </mc:Choice>
-              <mc:Fallback>
-                <p:sp>
-                  <p:nvSpPr>
-                    <p:cNvPr id="58" name="TextBox 57"/>
-                    <p:cNvSpPr txBox="1">
-                      <a:spLocks noRot="1" noChangeAspect="1" noMove="1" noResize="1" noEditPoints="1" noAdjustHandles="1" noChangeArrowheads="1" noChangeShapeType="1" noTextEdit="1"/>
-                    </p:cNvSpPr>
-                    <p:nvPr/>
-                  </p:nvSpPr>
-                  <p:spPr>
-                    <a:xfrm>
-                      <a:off x="5468627" y="2653212"/>
-                      <a:ext cx="212046" cy="307777"/>
-                    </a:xfrm>
-                    <a:prstGeom prst="rect">
-                      <a:avLst/>
-                    </a:prstGeom>
-                    <a:blipFill rotWithShape="0">
-                      <a:blip r:embed="rId7"/>
-                      <a:stretch>
-                        <a:fillRect l="-32353" r="-29412" b="-14000"/>
-                      </a:stretch>
-                    </a:blipFill>
-                  </p:spPr>
-                  <p:txBody>
-                    <a:bodyPr/>
-                    <a:lstStyle/>
-                    <a:p>
-                      <a:r>
-                        <a:rPr lang="en-US">
-                          <a:noFill/>
-                        </a:rPr>
-                        <a:t> </a:t>
-                      </a:r>
-                    </a:p>
-                  </p:txBody>
-                </p:sp>
-              </mc:Fallback>
-            </mc:AlternateContent>
-            <p:cxnSp>
-              <p:nvCxnSpPr>
-                <p:cNvPr id="59" name="Straight Arrow Connector 58"/>
-                <p:cNvCxnSpPr/>
-                <p:nvPr/>
-              </p:nvCxnSpPr>
-              <p:spPr>
-                <a:xfrm flipH="1">
-                  <a:off x="4516479" y="2807101"/>
-                  <a:ext cx="800066" cy="0"/>
-                </a:xfrm>
-                <a:prstGeom prst="straightConnector1">
-                  <a:avLst/>
-                </a:prstGeom>
-                <a:ln w="38100">
-                  <a:solidFill>
-                    <a:schemeClr val="tx1"/>
-                  </a:solidFill>
-                  <a:tailEnd type="triangle"/>
-                </a:ln>
-              </p:spPr>
-              <p:style>
-                <a:lnRef idx="1">
-                  <a:schemeClr val="accent1"/>
-                </a:lnRef>
-                <a:fillRef idx="0">
-                  <a:schemeClr val="accent1"/>
-                </a:fillRef>
-                <a:effectRef idx="0">
-                  <a:schemeClr val="accent1"/>
-                </a:effectRef>
-                <a:fontRef idx="minor">
-                  <a:schemeClr val="tx1"/>
-                </a:fontRef>
-              </p:style>
-            </p:cxnSp>
-            <p:cxnSp>
-              <p:nvCxnSpPr>
-                <p:cNvPr id="60" name="Straight Arrow Connector 59"/>
-                <p:cNvCxnSpPr/>
-                <p:nvPr/>
-              </p:nvCxnSpPr>
-              <p:spPr>
-                <a:xfrm flipV="1">
-                  <a:off x="5832755" y="2801942"/>
-                  <a:ext cx="738000" cy="7938"/>
-                </a:xfrm>
-                <a:prstGeom prst="straightConnector1">
-                  <a:avLst/>
-                </a:prstGeom>
-                <a:ln w="38100">
-                  <a:solidFill>
-                    <a:schemeClr val="tx1"/>
-                  </a:solidFill>
-                  <a:tailEnd type="triangle"/>
-                </a:ln>
-              </p:spPr>
-              <p:style>
-                <a:lnRef idx="1">
-                  <a:schemeClr val="accent1"/>
-                </a:lnRef>
-                <a:fillRef idx="0">
-                  <a:schemeClr val="accent1"/>
-                </a:fillRef>
-                <a:effectRef idx="0">
-                  <a:schemeClr val="accent1"/>
-                </a:effectRef>
-                <a:fontRef idx="minor">
-                  <a:schemeClr val="tx1"/>
-                </a:fontRef>
-              </p:style>
-            </p:cxnSp>
-          </p:grpSp>
-          <p:sp>
-            <p:nvSpPr>
-              <p:cNvPr id="61" name="Rectangle 60"/>
-              <p:cNvSpPr/>
-              <p:nvPr/>
-            </p:nvSpPr>
-            <p:spPr>
-              <a:xfrm>
-                <a:off x="3545166" y="3113624"/>
-                <a:ext cx="180000" cy="194874"/>
-              </a:xfrm>
-              <a:prstGeom prst="rect">
-                <a:avLst/>
-              </a:prstGeom>
-              <a:solidFill>
-                <a:schemeClr val="tx1"/>
-              </a:solidFill>
-              <a:ln w="38100">
-                <a:solidFill>
-                  <a:schemeClr val="tx1"/>
-                </a:solidFill>
-              </a:ln>
-            </p:spPr>
-            <p:style>
-              <a:lnRef idx="2">
-                <a:schemeClr val="accent1">
-                  <a:shade val="50000"/>
-                </a:schemeClr>
-              </a:lnRef>
-              <a:fillRef idx="1">
-                <a:schemeClr val="accent1"/>
-              </a:fillRef>
-              <a:effectRef idx="0">
-                <a:schemeClr val="accent1"/>
-              </a:effectRef>
-              <a:fontRef idx="minor">
-                <a:schemeClr val="lt1"/>
-              </a:fontRef>
-            </p:style>
-            <p:txBody>
-              <a:bodyPr rtlCol="0" anchor="ctr"/>
-              <a:lstStyle/>
-              <a:p>
-                <a:pPr algn="ctr"/>
-                <a:endParaRPr lang="en-US"/>
-              </a:p>
-            </p:txBody>
-          </p:sp>
-          <p:cxnSp>
-            <p:nvCxnSpPr>
-              <p:cNvPr id="65" name="Straight Arrow Connector 64"/>
-              <p:cNvCxnSpPr/>
-              <p:nvPr/>
-            </p:nvCxnSpPr>
-            <p:spPr>
-              <a:xfrm flipH="1">
-                <a:off x="3835950" y="3477657"/>
-                <a:ext cx="324000" cy="0"/>
-              </a:xfrm>
-              <a:prstGeom prst="straightConnector1">
-                <a:avLst/>
-              </a:prstGeom>
-              <a:ln w="38100">
-                <a:solidFill>
-                  <a:schemeClr val="tx1"/>
-                </a:solidFill>
-                <a:tailEnd type="triangle"/>
-              </a:ln>
-            </p:spPr>
-            <p:style>
-              <a:lnRef idx="1">
-                <a:schemeClr val="accent1"/>
-              </a:lnRef>
-              <a:fillRef idx="0">
-                <a:schemeClr val="accent1"/>
-              </a:fillRef>
-              <a:effectRef idx="0">
-                <a:schemeClr val="accent1"/>
-              </a:effectRef>
-              <a:fontRef idx="minor">
-                <a:schemeClr val="tx1"/>
-              </a:fontRef>
-            </p:style>
-          </p:cxnSp>
-          <p:cxnSp>
-            <p:nvCxnSpPr>
-              <p:cNvPr id="67" name="Straight Arrow Connector 66"/>
-              <p:cNvCxnSpPr/>
-              <p:nvPr/>
-            </p:nvCxnSpPr>
-            <p:spPr>
-              <a:xfrm>
-                <a:off x="3097985" y="3477657"/>
-                <a:ext cx="324000" cy="0"/>
-              </a:xfrm>
-              <a:prstGeom prst="straightConnector1">
-                <a:avLst/>
-              </a:prstGeom>
-              <a:ln w="38100">
-                <a:solidFill>
-                  <a:schemeClr val="tx1"/>
-                </a:solidFill>
-                <a:tailEnd type="triangle"/>
-              </a:ln>
-            </p:spPr>
-            <p:style>
-              <a:lnRef idx="1">
-                <a:schemeClr val="accent1"/>
-              </a:lnRef>
-              <a:fillRef idx="0">
-                <a:schemeClr val="accent1"/>
-              </a:fillRef>
-              <a:effectRef idx="0">
-                <a:schemeClr val="accent1"/>
-              </a:effectRef>
-              <a:fontRef idx="minor">
-                <a:schemeClr val="tx1"/>
-              </a:fontRef>
-            </p:style>
-          </p:cxnSp>
-          <p:cxnSp>
-            <p:nvCxnSpPr>
-              <p:cNvPr id="68" name="Straight Connector 67"/>
-              <p:cNvCxnSpPr/>
-              <p:nvPr/>
-            </p:nvCxnSpPr>
-            <p:spPr>
-              <a:xfrm>
-                <a:off x="3835950" y="3358281"/>
-                <a:ext cx="0" cy="239843"/>
-              </a:xfrm>
-              <a:prstGeom prst="line">
-                <a:avLst/>
-              </a:prstGeom>
-              <a:ln w="38100">
-                <a:solidFill>
-                  <a:schemeClr val="tx1"/>
-                </a:solidFill>
-              </a:ln>
-            </p:spPr>
-            <p:style>
-              <a:lnRef idx="1">
-                <a:schemeClr val="accent1"/>
-              </a:lnRef>
-              <a:fillRef idx="0">
-                <a:schemeClr val="accent1"/>
-              </a:fillRef>
-              <a:effectRef idx="0">
-                <a:schemeClr val="accent1"/>
-              </a:effectRef>
-              <a:fontRef idx="minor">
-                <a:schemeClr val="tx1"/>
-              </a:fontRef>
-            </p:style>
-          </p:cxnSp>
-          <p:cxnSp>
-            <p:nvCxnSpPr>
-              <p:cNvPr id="69" name="Straight Connector 68"/>
-              <p:cNvCxnSpPr/>
-              <p:nvPr/>
-            </p:nvCxnSpPr>
-            <p:spPr>
-              <a:xfrm>
-                <a:off x="3448351" y="3360718"/>
-                <a:ext cx="0" cy="239843"/>
-              </a:xfrm>
-              <a:prstGeom prst="line">
-                <a:avLst/>
-              </a:prstGeom>
-              <a:ln w="38100">
-                <a:solidFill>
-                  <a:schemeClr val="tx1"/>
-                </a:solidFill>
-              </a:ln>
-            </p:spPr>
-            <p:style>
-              <a:lnRef idx="1">
-                <a:schemeClr val="accent1"/>
-              </a:lnRef>
-              <a:fillRef idx="0">
-                <a:schemeClr val="accent1"/>
-              </a:fillRef>
-              <a:effectRef idx="0">
-                <a:schemeClr val="accent1"/>
-              </a:effectRef>
-              <a:fontRef idx="minor">
-                <a:schemeClr val="tx1"/>
-              </a:fontRef>
-            </p:style>
-          </p:cxnSp>
-          <mc:AlternateContent xmlns:mc="http://schemas.openxmlformats.org/markup-compatibility/2006">
-            <mc:Choice xmlns:a14="http://schemas.microsoft.com/office/drawing/2010/main" Requires="a14">
-              <p:sp>
-                <p:nvSpPr>
-                  <p:cNvPr id="70" name="TextBox 69"/>
-                  <p:cNvSpPr txBox="1"/>
-                  <p:nvPr/>
-                </p:nvSpPr>
-                <p:spPr>
-                  <a:xfrm>
-                    <a:off x="3506195" y="3317699"/>
-                    <a:ext cx="212046" cy="307777"/>
-                  </a:xfrm>
-                  <a:prstGeom prst="rect">
-                    <a:avLst/>
-                  </a:prstGeom>
-                  <a:noFill/>
-                </p:spPr>
-                <p:txBody>
-                  <a:bodyPr wrap="square" lIns="0" tIns="0" rIns="0" bIns="0" rtlCol="0">
-                    <a:spAutoFit/>
-                  </a:bodyPr>
-                  <a:lstStyle/>
-                  <a:p>
-                    <a14:m>
-                      <m:oMathPara xmlns:m="http://schemas.openxmlformats.org/officeDocument/2006/math">
-                        <m:oMathParaPr>
-                          <m:jc m:val="centerGroup"/>
-                        </m:oMathParaPr>
-                        <m:oMath xmlns:m="http://schemas.openxmlformats.org/officeDocument/2006/math">
-                          <m:r>
-                            <a:rPr lang="en-CA" sz="2000" b="0" i="1" smtClean="0">
-                              <a:latin typeface="Cambria Math" charset="0"/>
-                              <a:cs typeface="Arial" panose="020B0604020202020204" pitchFamily="34" charset="0"/>
-                            </a:rPr>
-                            <m:t>𝑑𝑥</m:t>
-                          </m:r>
-                        </m:oMath>
-                      </m:oMathPara>
-                    </a14:m>
-                    <a:endParaRPr lang="en-US" sz="2000" dirty="0" smtClean="0">
-                      <a:latin typeface="Arial" panose="020B0604020202020204" pitchFamily="34" charset="0"/>
-                      <a:cs typeface="Arial" panose="020B0604020202020204" pitchFamily="34" charset="0"/>
-                    </a:endParaRPr>
-                  </a:p>
-                </p:txBody>
-              </p:sp>
-            </mc:Choice>
-            <mc:Fallback>
-              <p:sp>
-                <p:nvSpPr>
-                  <p:cNvPr id="70" name="TextBox 69"/>
-                  <p:cNvSpPr txBox="1">
-                    <a:spLocks noRot="1" noChangeAspect="1" noMove="1" noResize="1" noEditPoints="1" noAdjustHandles="1" noChangeArrowheads="1" noChangeShapeType="1" noTextEdit="1"/>
-                  </p:cNvSpPr>
-                  <p:nvPr/>
-                </p:nvSpPr>
-                <p:spPr>
-                  <a:xfrm>
-                    <a:off x="3506195" y="3317699"/>
-                    <a:ext cx="212046" cy="307777"/>
-                  </a:xfrm>
-                  <a:prstGeom prst="rect">
-                    <a:avLst/>
-                  </a:prstGeom>
-                  <a:blipFill rotWithShape="0">
-                    <a:blip r:embed="rId23"/>
-                    <a:stretch>
-                      <a:fillRect l="-47059" r="-79412" b="-14000"/>
-                    </a:stretch>
-                  </a:blipFill>
-                </p:spPr>
-                <p:txBody>
-                  <a:bodyPr/>
-                  <a:lstStyle/>
-                  <a:p>
-                    <a:r>
-                      <a:rPr lang="en-US">
-                        <a:noFill/>
-                      </a:rPr>
-                      <a:t> </a:t>
-                    </a:r>
-                  </a:p>
-                </p:txBody>
-              </p:sp>
-            </mc:Fallback>
-          </mc:AlternateContent>
-          <p:cxnSp>
-            <p:nvCxnSpPr>
-              <p:cNvPr id="78" name="Straight Arrow Connector 77"/>
-              <p:cNvCxnSpPr/>
-              <p:nvPr/>
-            </p:nvCxnSpPr>
-            <p:spPr>
-              <a:xfrm flipH="1">
-                <a:off x="5755455" y="3227581"/>
-                <a:ext cx="800066" cy="0"/>
-              </a:xfrm>
-              <a:prstGeom prst="straightConnector1">
-                <a:avLst/>
-              </a:prstGeom>
-              <a:ln w="57150">
-                <a:solidFill>
-                  <a:srgbClr val="FF0000"/>
-                </a:solidFill>
-                <a:tailEnd type="triangle"/>
-              </a:ln>
-            </p:spPr>
-            <p:style>
-              <a:lnRef idx="1">
-                <a:schemeClr val="accent1"/>
-              </a:lnRef>
-              <a:fillRef idx="0">
-                <a:schemeClr val="accent1"/>
-              </a:fillRef>
-              <a:effectRef idx="0">
-                <a:schemeClr val="accent1"/>
-              </a:effectRef>
-              <a:fontRef idx="minor">
-                <a:schemeClr val="tx1"/>
-              </a:fontRef>
-            </p:style>
-          </p:cxnSp>
-          <mc:AlternateContent xmlns:mc="http://schemas.openxmlformats.org/markup-compatibility/2006">
-            <mc:Choice xmlns:a14="http://schemas.microsoft.com/office/drawing/2010/main" Requires="a14">
-              <p:sp>
-                <p:nvSpPr>
-                  <p:cNvPr id="119" name="TextBox 118"/>
-                  <p:cNvSpPr txBox="1"/>
-                  <p:nvPr/>
-                </p:nvSpPr>
-                <p:spPr>
-                  <a:xfrm>
-                    <a:off x="5801982" y="3302798"/>
-                    <a:ext cx="803931" cy="307777"/>
-                  </a:xfrm>
-                  <a:prstGeom prst="rect">
-                    <a:avLst/>
-                  </a:prstGeom>
-                  <a:noFill/>
-                </p:spPr>
-                <p:txBody>
-                  <a:bodyPr wrap="square" lIns="0" tIns="0" rIns="0" bIns="0" rtlCol="0">
-                    <a:spAutoFit/>
-                  </a:bodyPr>
-                  <a:lstStyle/>
-                  <a:p>
-                    <a14:m>
-                      <m:oMathPara xmlns:m="http://schemas.openxmlformats.org/officeDocument/2006/math">
-                        <m:oMathParaPr>
-                          <m:jc m:val="centerGroup"/>
-                        </m:oMathParaPr>
-                        <m:oMath xmlns:m="http://schemas.openxmlformats.org/officeDocument/2006/math">
-                          <m:r>
-                            <a:rPr lang="en-CA" sz="2000" b="0" i="1" smtClean="0">
-                              <a:solidFill>
-                                <a:srgbClr val="FF0000"/>
-                              </a:solidFill>
-                              <a:latin typeface="Cambria Math" charset="0"/>
-                              <a:cs typeface="Arial" panose="020B0604020202020204" pitchFamily="34" charset="0"/>
-                            </a:rPr>
-                            <m:t>𝑑</m:t>
-                          </m:r>
-                          <m:acc>
-                            <m:accPr>
-                              <m:chr m:val="⃗"/>
-                              <m:ctrlPr>
-                                <a:rPr lang="en-CA" sz="2000" b="0" i="1" smtClean="0">
-                                  <a:solidFill>
-                                    <a:srgbClr val="FF0000"/>
-                                  </a:solidFill>
-                                  <a:latin typeface="Cambria Math" charset="0"/>
-                                  <a:cs typeface="Arial" panose="020B0604020202020204" pitchFamily="34" charset="0"/>
-                                </a:rPr>
-                              </m:ctrlPr>
-                            </m:accPr>
-                            <m:e>
-                              <m:r>
-                                <a:rPr lang="en-CA" sz="2000" b="0" i="1" smtClean="0">
-                                  <a:solidFill>
-                                    <a:srgbClr val="FF0000"/>
-                                  </a:solidFill>
-                                  <a:latin typeface="Cambria Math" charset="0"/>
-                                  <a:cs typeface="Arial" panose="020B0604020202020204" pitchFamily="34" charset="0"/>
-                                </a:rPr>
-                                <m:t>𝑔</m:t>
-                              </m:r>
-                            </m:e>
-                          </m:acc>
-                        </m:oMath>
-                      </m:oMathPara>
-                    </a14:m>
-                    <a:endParaRPr lang="en-US" sz="2000" dirty="0" smtClean="0">
-                      <a:solidFill>
-                        <a:srgbClr val="FF0000"/>
-                      </a:solidFill>
-                      <a:latin typeface="Arial" panose="020B0604020202020204" pitchFamily="34" charset="0"/>
-                      <a:cs typeface="Arial" panose="020B0604020202020204" pitchFamily="34" charset="0"/>
-                    </a:endParaRPr>
-                  </a:p>
-                </p:txBody>
-              </p:sp>
-            </mc:Choice>
-            <mc:Fallback>
-              <p:sp>
-                <p:nvSpPr>
-                  <p:cNvPr id="119" name="TextBox 118"/>
-                  <p:cNvSpPr txBox="1">
-                    <a:spLocks noRot="1" noChangeAspect="1" noMove="1" noResize="1" noEditPoints="1" noAdjustHandles="1" noChangeArrowheads="1" noChangeShapeType="1" noTextEdit="1"/>
-                  </p:cNvSpPr>
-                  <p:nvPr/>
-                </p:nvSpPr>
-                <p:spPr>
-                  <a:xfrm>
-                    <a:off x="5801982" y="3302798"/>
-                    <a:ext cx="803931" cy="307777"/>
-                  </a:xfrm>
-                  <a:prstGeom prst="rect">
-                    <a:avLst/>
-                  </a:prstGeom>
-                  <a:blipFill rotWithShape="0">
-                    <a:blip r:embed="rId24"/>
-                    <a:stretch>
-                      <a:fillRect t="-33333" r="-18939" b="-27451"/>
-                    </a:stretch>
-                  </a:blipFill>
-                </p:spPr>
-                <p:txBody>
-                  <a:bodyPr/>
-                  <a:lstStyle/>
-                  <a:p>
-                    <a:r>
-                      <a:rPr lang="en-US">
-                        <a:noFill/>
-                      </a:rPr>
-                      <a:t> </a:t>
-                    </a:r>
-                  </a:p>
-                </p:txBody>
-              </p:sp>
-            </mc:Fallback>
-          </mc:AlternateContent>
-        </p:grpSp>
-        <p:sp>
-          <p:nvSpPr>
-            <p:cNvPr id="126" name="Oval 125"/>
-            <p:cNvSpPr/>
-            <p:nvPr/>
-          </p:nvSpPr>
-          <p:spPr>
-            <a:xfrm>
-              <a:off x="6551690" y="3117547"/>
-              <a:ext cx="108000" cy="108000"/>
-            </a:xfrm>
-            <a:prstGeom prst="ellipse">
-              <a:avLst/>
-            </a:prstGeom>
-            <a:solidFill>
-              <a:schemeClr val="tx1"/>
-            </a:solidFill>
-            <a:ln w="38100">
-              <a:solidFill>
-                <a:schemeClr val="tx1"/>
-              </a:solidFill>
-            </a:ln>
-          </p:spPr>
-          <p:style>
-            <a:lnRef idx="2">
-              <a:schemeClr val="accent1">
-                <a:shade val="50000"/>
-              </a:schemeClr>
-            </a:lnRef>
-            <a:fillRef idx="1">
-              <a:schemeClr val="accent1"/>
-            </a:fillRef>
-            <a:effectRef idx="0">
-              <a:schemeClr val="accent1"/>
-            </a:effectRef>
-            <a:fontRef idx="minor">
-              <a:schemeClr val="lt1"/>
-            </a:fontRef>
-          </p:style>
-          <p:txBody>
-            <a:bodyPr rtlCol="0" anchor="ctr"/>
-            <a:lstStyle/>
-            <a:p>
-              <a:pPr algn="ctr"/>
-              <a:endParaRPr lang="en-US"/>
-            </a:p>
-          </p:txBody>
-        </p:sp>
-        <mc:AlternateContent xmlns:mc="http://schemas.openxmlformats.org/markup-compatibility/2006">
-          <mc:Choice xmlns:a14="http://schemas.microsoft.com/office/drawing/2010/main" Requires="a14">
-            <p:sp>
-              <p:nvSpPr>
-                <p:cNvPr id="135" name="TextBox 134"/>
-                <p:cNvSpPr txBox="1"/>
-                <p:nvPr/>
-              </p:nvSpPr>
-              <p:spPr>
-                <a:xfrm>
-                  <a:off x="6695818" y="2974537"/>
-                  <a:ext cx="213199" cy="307777"/>
-                </a:xfrm>
-                <a:prstGeom prst="rect">
-                  <a:avLst/>
-                </a:prstGeom>
-                <a:noFill/>
-              </p:spPr>
-              <p:txBody>
-                <a:bodyPr wrap="none" lIns="0" tIns="0" rIns="0" bIns="0" rtlCol="0">
-                  <a:spAutoFit/>
-                </a:bodyPr>
-                <a:lstStyle/>
-                <a:p>
-                  <a14:m>
-                    <m:oMathPara xmlns:m="http://schemas.openxmlformats.org/officeDocument/2006/math">
-                      <m:oMathParaPr>
-                        <m:jc m:val="centerGroup"/>
-                      </m:oMathParaPr>
-                      <m:oMath xmlns:m="http://schemas.openxmlformats.org/officeDocument/2006/math">
-                        <m:r>
-                          <a:rPr lang="en-CA" sz="2000" b="0" i="1" smtClean="0">
-                            <a:latin typeface="Cambria Math" charset="0"/>
-                            <a:cs typeface="Arial" panose="020B0604020202020204" pitchFamily="34" charset="0"/>
-                          </a:rPr>
-                          <m:t>0</m:t>
-                        </m:r>
-                      </m:oMath>
-                    </m:oMathPara>
-                  </a14:m>
-                  <a:endParaRPr lang="en-US" sz="2000" dirty="0" smtClean="0">
-                    <a:latin typeface="Arial" panose="020B0604020202020204" pitchFamily="34" charset="0"/>
-                    <a:cs typeface="Arial" panose="020B0604020202020204" pitchFamily="34" charset="0"/>
-                  </a:endParaRPr>
-                </a:p>
-              </p:txBody>
-            </p:sp>
-          </mc:Choice>
-          <mc:Fallback>
-            <p:sp>
-              <p:nvSpPr>
-                <p:cNvPr id="135" name="TextBox 134"/>
-                <p:cNvSpPr txBox="1">
-                  <a:spLocks noRot="1" noChangeAspect="1" noMove="1" noResize="1" noEditPoints="1" noAdjustHandles="1" noChangeArrowheads="1" noChangeShapeType="1" noTextEdit="1"/>
-                </p:cNvSpPr>
-                <p:nvPr/>
-              </p:nvSpPr>
-              <p:spPr>
-                <a:xfrm>
-                  <a:off x="6695818" y="2974537"/>
-                  <a:ext cx="213199" cy="307777"/>
-                </a:xfrm>
-                <a:prstGeom prst="rect">
-                  <a:avLst/>
-                </a:prstGeom>
-                <a:blipFill rotWithShape="0">
-                  <a:blip r:embed="rId25"/>
-                  <a:stretch>
-                    <a:fillRect l="-25714" r="-25714" b="-14000"/>
-                  </a:stretch>
-                </a:blipFill>
-              </p:spPr>
-              <p:txBody>
-                <a:bodyPr/>
-                <a:lstStyle/>
-                <a:p>
-                  <a:r>
-                    <a:rPr lang="en-US">
-                      <a:noFill/>
-                    </a:rPr>
-                    <a:t> </a:t>
-                  </a:r>
-                </a:p>
-              </p:txBody>
-            </p:sp>
-          </mc:Fallback>
-        </mc:AlternateContent>
       </p:grpSp>
     </p:spTree>
     <p:extLst>

</xml_diff>